<commit_message>
Refresh Docker+Microsoft samples and slides
</commit_message>
<xml_diff>
--- a/slides/Containers-Microsoft-Universe.pptx
+++ b/slides/Containers-Microsoft-Universe.pptx
@@ -11,23 +11,25 @@
     <p:sldId id="323" r:id="rId5"/>
     <p:sldId id="327" r:id="rId6"/>
     <p:sldId id="325" r:id="rId7"/>
-    <p:sldId id="326" r:id="rId8"/>
-    <p:sldId id="328" r:id="rId9"/>
-    <p:sldId id="329" r:id="rId10"/>
-    <p:sldId id="330" r:id="rId11"/>
-    <p:sldId id="334" r:id="rId12"/>
-    <p:sldId id="336" r:id="rId13"/>
-    <p:sldId id="332" r:id="rId14"/>
-    <p:sldId id="333" r:id="rId15"/>
-    <p:sldId id="337" r:id="rId16"/>
-    <p:sldId id="338" r:id="rId17"/>
-    <p:sldId id="339" r:id="rId18"/>
-    <p:sldId id="340" r:id="rId19"/>
-    <p:sldId id="341" r:id="rId20"/>
-    <p:sldId id="342" r:id="rId21"/>
-    <p:sldId id="343" r:id="rId22"/>
-    <p:sldId id="344" r:id="rId23"/>
-    <p:sldId id="322" r:id="rId24"/>
+    <p:sldId id="346" r:id="rId8"/>
+    <p:sldId id="345" r:id="rId9"/>
+    <p:sldId id="326" r:id="rId10"/>
+    <p:sldId id="328" r:id="rId11"/>
+    <p:sldId id="329" r:id="rId12"/>
+    <p:sldId id="330" r:id="rId13"/>
+    <p:sldId id="334" r:id="rId14"/>
+    <p:sldId id="336" r:id="rId15"/>
+    <p:sldId id="332" r:id="rId16"/>
+    <p:sldId id="333" r:id="rId17"/>
+    <p:sldId id="337" r:id="rId18"/>
+    <p:sldId id="338" r:id="rId19"/>
+    <p:sldId id="339" r:id="rId20"/>
+    <p:sldId id="340" r:id="rId21"/>
+    <p:sldId id="341" r:id="rId22"/>
+    <p:sldId id="342" r:id="rId23"/>
+    <p:sldId id="343" r:id="rId24"/>
+    <p:sldId id="344" r:id="rId25"/>
+    <p:sldId id="322" r:id="rId26"/>
   </p:sldIdLst>
   <p:sldSz cx="9144000" cy="5143500" type="screen16x9"/>
   <p:notesSz cx="6858000" cy="9144000"/>
@@ -29152,10 +29154,9 @@
           <a:lstStyle/>
           <a:p>
             <a:r>
-              <a:rPr lang="de-AT" dirty="0"/>
+              <a:rPr lang="en-US" dirty="0"/>
               <a:t>Workshop</a:t>
             </a:r>
-            <a:endParaRPr lang="en-US" dirty="0"/>
           </a:p>
         </p:txBody>
       </p:sp>
@@ -29199,10 +29200,9 @@
           <a:lstStyle/>
           <a:p>
             <a:r>
-              <a:rPr lang="de-AT" dirty="0"/>
+              <a:rPr lang="en-US" dirty="0"/>
               <a:t>Container</a:t>
             </a:r>
-            <a:endParaRPr lang="en-US" dirty="0"/>
           </a:p>
         </p:txBody>
       </p:sp>
@@ -29222,10 +29222,9 @@
           <a:lstStyle/>
           <a:p>
             <a:r>
-              <a:rPr lang="de-AT"/>
+              <a:rPr lang="en-US" dirty="0"/>
               <a:t>Rainer Stropek</a:t>
             </a:r>
-            <a:endParaRPr lang="en-US" dirty="0"/>
           </a:p>
         </p:txBody>
       </p:sp>
@@ -29245,23 +29244,11 @@
           <a:lstStyle/>
           <a:p>
             <a:r>
-              <a:rPr lang="de-AT" dirty="0" err="1"/>
-              <a:t>software</a:t>
-            </a:r>
-            <a:r>
-              <a:rPr lang="de-AT" dirty="0"/>
-              <a:t> </a:t>
-            </a:r>
-            <a:r>
-              <a:rPr lang="de-AT" dirty="0" err="1"/>
-              <a:t>architects</a:t>
-            </a:r>
-            <a:r>
-              <a:rPr lang="de-AT" dirty="0"/>
-              <a:t> </a:t>
-            </a:r>
-            <a:r>
-              <a:rPr lang="de-AT" dirty="0" err="1"/>
+              <a:rPr lang="en-US" dirty="0"/>
+              <a:t>software architects </a:t>
+            </a:r>
+            <a:r>
+              <a:rPr lang="en-US" dirty="0" err="1"/>
               <a:t>gmbh</a:t>
             </a:r>
             <a:endParaRPr lang="en-US" dirty="0"/>
@@ -29284,26 +29271,30 @@
           <a:lstStyle/>
           <a:p>
             <a:r>
-              <a:rPr lang="de-AT">
+              <a:rPr lang="en-US" dirty="0">
                 <a:hlinkClick r:id="rId3"/>
               </a:rPr>
               <a:t>http://www.timecockpit.com</a:t>
             </a:r>
-            <a:endParaRPr lang="de-AT"/>
-          </a:p>
-          <a:p>
-            <a:r>
-              <a:rPr lang="de-AT">
+            <a:endParaRPr lang="en-US" dirty="0"/>
+          </a:p>
+          <a:p>
+            <a:r>
+              <a:rPr lang="en-US" dirty="0">
                 <a:hlinkClick r:id="rId4"/>
               </a:rPr>
               <a:t>rainer@timecockpit.com</a:t>
             </a:r>
-            <a:endParaRPr lang="de-AT"/>
-          </a:p>
-          <a:p>
-            <a:r>
-              <a:rPr lang="de-AT"/>
-              <a:t>@rstropek</a:t>
+            <a:endParaRPr lang="en-US" dirty="0"/>
+          </a:p>
+          <a:p>
+            <a:r>
+              <a:rPr lang="en-US" dirty="0"/>
+              <a:t>@</a:t>
+            </a:r>
+            <a:r>
+              <a:rPr lang="en-US" dirty="0" err="1"/>
+              <a:t>rstropek</a:t>
             </a:r>
             <a:endParaRPr lang="en-US" dirty="0"/>
           </a:p>
@@ -29325,22 +29316,9 @@
           <a:lstStyle/>
           <a:p>
             <a:r>
-              <a:rPr lang="de-AT" dirty="0"/>
-              <a:t>In </a:t>
-            </a:r>
-            <a:r>
-              <a:rPr lang="de-AT" dirty="0" err="1"/>
-              <a:t>the</a:t>
-            </a:r>
-            <a:r>
-              <a:rPr lang="de-AT" dirty="0"/>
-              <a:t> MS </a:t>
-            </a:r>
-            <a:r>
-              <a:rPr lang="de-AT" dirty="0" err="1"/>
-              <a:t>Universe</a:t>
-            </a:r>
-            <a:endParaRPr lang="en-US" dirty="0"/>
+              <a:rPr lang="en-US" dirty="0"/>
+              <a:t>In The MS Universe</a:t>
+            </a:r>
           </a:p>
         </p:txBody>
       </p:sp>
@@ -29360,22 +29338,21 @@
           <a:lstStyle/>
           <a:p>
             <a:r>
-              <a:rPr lang="de-AT" dirty="0"/>
+              <a:rPr lang="en-US" dirty="0"/>
               <a:t>Web</a:t>
             </a:r>
           </a:p>
           <a:p>
             <a:r>
-              <a:rPr lang="de-AT" dirty="0"/>
+              <a:rPr lang="en-US" dirty="0"/>
               <a:t>Mail</a:t>
             </a:r>
           </a:p>
           <a:p>
             <a:r>
-              <a:rPr lang="de-AT" dirty="0"/>
+              <a:rPr lang="en-US" dirty="0"/>
               <a:t>Twitter</a:t>
             </a:r>
-            <a:endParaRPr lang="en-US" dirty="0"/>
           </a:p>
         </p:txBody>
       </p:sp>
@@ -29423,6 +29400,260 @@
       </p:grpSpPr>
       <p:sp>
         <p:nvSpPr>
+          <p:cNvPr id="2" name="Title 1"/>
+          <p:cNvSpPr>
+            <a:spLocks noGrp="1"/>
+          </p:cNvSpPr>
+          <p:nvPr>
+            <p:ph type="title"/>
+          </p:nvPr>
+        </p:nvSpPr>
+        <p:spPr/>
+        <p:txBody>
+          <a:bodyPr/>
+          <a:lstStyle/>
+          <a:p>
+            <a:r>
+              <a:rPr lang="en-US" dirty="0"/>
+              <a:t>Linux on Windows</a:t>
+            </a:r>
+          </a:p>
+        </p:txBody>
+      </p:sp>
+      <p:sp>
+        <p:nvSpPr>
+          <p:cNvPr id="3" name="Text Placeholder 2"/>
+          <p:cNvSpPr>
+            <a:spLocks noGrp="1"/>
+          </p:cNvSpPr>
+          <p:nvPr>
+            <p:ph type="body" sz="quarter" idx="25"/>
+          </p:nvPr>
+        </p:nvSpPr>
+        <p:spPr/>
+        <p:txBody>
+          <a:bodyPr/>
+          <a:lstStyle/>
+          <a:p>
+            <a:r>
+              <a:rPr lang="en-US" dirty="0"/>
+              <a:t>Running Linux containers on Windows</a:t>
+            </a:r>
+          </a:p>
+        </p:txBody>
+      </p:sp>
+    </p:spTree>
+    <p:extLst>
+      <p:ext uri="{BB962C8B-B14F-4D97-AF65-F5344CB8AC3E}">
+        <p14:creationId xmlns:p14="http://schemas.microsoft.com/office/powerpoint/2010/main" val="2845066567"/>
+      </p:ext>
+    </p:extLst>
+  </p:cSld>
+  <p:clrMapOvr>
+    <a:masterClrMapping/>
+  </p:clrMapOvr>
+  <mc:AlternateContent xmlns:mc="http://schemas.openxmlformats.org/markup-compatibility/2006" xmlns:p14="http://schemas.microsoft.com/office/powerpoint/2010/main">
+    <mc:Choice Requires="p14">
+      <p:transition spd="med" p14:dur="700">
+        <p:fade/>
+      </p:transition>
+    </mc:Choice>
+    <mc:Fallback xmlns="">
+      <p:transition spd="med">
+        <p:fade/>
+      </p:transition>
+    </mc:Fallback>
+  </mc:AlternateContent>
+</p:sld>
+</file>
+
+<file path=ppt/slides/slide11.xml><?xml version="1.0" encoding="utf-8"?>
+<p:sld xmlns:a="http://schemas.openxmlformats.org/drawingml/2006/main" xmlns:r="http://schemas.openxmlformats.org/officeDocument/2006/relationships" xmlns:p="http://schemas.openxmlformats.org/presentationml/2006/main">
+  <p:cSld>
+    <p:spTree>
+      <p:nvGrpSpPr>
+        <p:cNvPr id="1" name=""/>
+        <p:cNvGrpSpPr/>
+        <p:nvPr/>
+      </p:nvGrpSpPr>
+      <p:grpSpPr>
+        <a:xfrm>
+          <a:off x="0" y="0"/>
+          <a:ext cx="0" cy="0"/>
+          <a:chOff x="0" y="0"/>
+          <a:chExt cx="0" cy="0"/>
+        </a:xfrm>
+      </p:grpSpPr>
+      <p:sp>
+        <p:nvSpPr>
+          <p:cNvPr id="4" name="Title 3"/>
+          <p:cNvSpPr>
+            <a:spLocks noGrp="1"/>
+          </p:cNvSpPr>
+          <p:nvPr>
+            <p:ph type="title"/>
+          </p:nvPr>
+        </p:nvSpPr>
+        <p:spPr/>
+        <p:txBody>
+          <a:bodyPr/>
+          <a:lstStyle/>
+          <a:p>
+            <a:r>
+              <a:rPr lang="en-US" dirty="0"/>
+              <a:t>Linux on Windows</a:t>
+            </a:r>
+          </a:p>
+        </p:txBody>
+      </p:sp>
+      <p:sp>
+        <p:nvSpPr>
+          <p:cNvPr id="5" name="Content Placeholder 4"/>
+          <p:cNvSpPr>
+            <a:spLocks noGrp="1"/>
+          </p:cNvSpPr>
+          <p:nvPr>
+            <p:ph sz="quarter" idx="12"/>
+          </p:nvPr>
+        </p:nvSpPr>
+        <p:spPr/>
+        <p:txBody>
+          <a:bodyPr/>
+          <a:lstStyle/>
+          <a:p>
+            <a:r>
+              <a:rPr lang="en-US" dirty="0"/>
+              <a:t>Use </a:t>
+            </a:r>
+            <a:r>
+              <a:rPr lang="en-US" dirty="0">
+                <a:hlinkClick r:id="rId2"/>
+              </a:rPr>
+              <a:t>Docker for Windows</a:t>
+            </a:r>
+            <a:endParaRPr lang="en-US" dirty="0"/>
+          </a:p>
+          <a:p>
+            <a:pPr lvl="1"/>
+            <a:r>
+              <a:rPr lang="en-US" dirty="0"/>
+              <a:t>Uses Hyper-V to run Linux with Docker</a:t>
+            </a:r>
+          </a:p>
+          <a:p>
+            <a:pPr lvl="1"/>
+            <a:endParaRPr lang="en-US" dirty="0"/>
+          </a:p>
+          <a:p>
+            <a:pPr lvl="1"/>
+            <a:endParaRPr lang="en-US" dirty="0"/>
+          </a:p>
+          <a:p>
+            <a:pPr lvl="1"/>
+            <a:endParaRPr lang="en-US" dirty="0"/>
+          </a:p>
+          <a:p>
+            <a:pPr lvl="1"/>
+            <a:endParaRPr lang="en-US" dirty="0"/>
+          </a:p>
+          <a:p>
+            <a:pPr lvl="1"/>
+            <a:endParaRPr lang="en-US" dirty="0"/>
+          </a:p>
+          <a:p>
+            <a:pPr lvl="1"/>
+            <a:endParaRPr lang="en-US" dirty="0"/>
+          </a:p>
+          <a:p>
+            <a:pPr lvl="1"/>
+            <a:endParaRPr lang="en-US" dirty="0"/>
+          </a:p>
+          <a:p>
+            <a:r>
+              <a:rPr lang="en-US" dirty="0"/>
+              <a:t>Run Docker client on Windows or Linux</a:t>
+            </a:r>
+          </a:p>
+        </p:txBody>
+      </p:sp>
+      <p:sp>
+        <p:nvSpPr>
+          <p:cNvPr id="6" name="Text Placeholder 5"/>
+          <p:cNvSpPr>
+            <a:spLocks noGrp="1"/>
+          </p:cNvSpPr>
+          <p:nvPr>
+            <p:ph type="body" sz="quarter" idx="23"/>
+          </p:nvPr>
+        </p:nvSpPr>
+        <p:spPr/>
+        <p:txBody>
+          <a:bodyPr/>
+          <a:lstStyle/>
+          <a:p>
+            <a:endParaRPr lang="en-US" dirty="0"/>
+          </a:p>
+        </p:txBody>
+      </p:sp>
+      <p:pic>
+        <p:nvPicPr>
+          <p:cNvPr id="2" name="Picture 1"/>
+          <p:cNvPicPr>
+            <a:picLocks noChangeAspect="1"/>
+          </p:cNvPicPr>
+          <p:nvPr/>
+        </p:nvPicPr>
+        <p:blipFill>
+          <a:blip r:embed="rId3"/>
+          <a:stretch>
+            <a:fillRect/>
+          </a:stretch>
+        </p:blipFill>
+        <p:spPr>
+          <a:xfrm>
+            <a:off x="876300" y="1817264"/>
+            <a:ext cx="4658375" cy="1552792"/>
+          </a:xfrm>
+          <a:prstGeom prst="rect">
+            <a:avLst/>
+          </a:prstGeom>
+        </p:spPr>
+      </p:pic>
+    </p:spTree>
+    <p:extLst>
+      <p:ext uri="{BB962C8B-B14F-4D97-AF65-F5344CB8AC3E}">
+        <p14:creationId xmlns:p14="http://schemas.microsoft.com/office/powerpoint/2010/main" val="1085669086"/>
+      </p:ext>
+    </p:extLst>
+  </p:cSld>
+  <p:clrMapOvr>
+    <a:masterClrMapping/>
+  </p:clrMapOvr>
+  <p:transition spd="slow">
+    <p:push/>
+  </p:transition>
+</p:sld>
+</file>
+
+<file path=ppt/slides/slide12.xml><?xml version="1.0" encoding="utf-8"?>
+<p:sld xmlns:a="http://schemas.openxmlformats.org/drawingml/2006/main" xmlns:r="http://schemas.openxmlformats.org/officeDocument/2006/relationships" xmlns:p="http://schemas.openxmlformats.org/presentationml/2006/main">
+  <p:cSld>
+    <p:spTree>
+      <p:nvGrpSpPr>
+        <p:cNvPr id="1" name=""/>
+        <p:cNvGrpSpPr/>
+        <p:nvPr/>
+      </p:nvGrpSpPr>
+      <p:grpSpPr>
+        <a:xfrm>
+          <a:off x="0" y="0"/>
+          <a:ext cx="0" cy="0"/>
+          <a:chOff x="0" y="0"/>
+          <a:chExt cx="0" cy="0"/>
+        </a:xfrm>
+      </p:grpSpPr>
+      <p:sp>
+        <p:nvSpPr>
           <p:cNvPr id="5" name="Text Placeholder 4"/>
           <p:cNvSpPr>
             <a:spLocks noGrp="1"/>
@@ -29573,7 +29804,7 @@
 </p:sld>
 </file>
 
-<file path=ppt/slides/slide11.xml><?xml version="1.0" encoding="utf-8"?>
+<file path=ppt/slides/slide13.xml><?xml version="1.0" encoding="utf-8"?>
 <p:sld xmlns:a="http://schemas.openxmlformats.org/drawingml/2006/main" xmlns:r="http://schemas.openxmlformats.org/officeDocument/2006/relationships" xmlns:p="http://schemas.openxmlformats.org/presentationml/2006/main" show="0">
   <p:cSld>
     <p:spTree>
@@ -29628,395 +29859,116 @@
           <a:lstStyle/>
           <a:p>
             <a:r>
-              <a:rPr lang="de-AT" i="1" dirty="0"/>
-              <a:t># Run </a:t>
-            </a:r>
-            <a:r>
-              <a:rPr lang="de-AT" i="1" dirty="0" err="1"/>
-              <a:t>interactive</a:t>
-            </a:r>
-            <a:r>
-              <a:rPr lang="de-AT" i="1" dirty="0"/>
-              <a:t> </a:t>
-            </a:r>
-            <a:r>
-              <a:rPr lang="de-AT" i="1" dirty="0" err="1"/>
-              <a:t>ubuntu</a:t>
-            </a:r>
-            <a:r>
-              <a:rPr lang="de-AT" i="1" dirty="0"/>
-              <a:t> </a:t>
-            </a:r>
-            <a:r>
-              <a:rPr lang="de-AT" i="1" dirty="0" err="1"/>
-              <a:t>container</a:t>
-            </a:r>
-            <a:endParaRPr lang="de-AT" i="1" dirty="0"/>
-          </a:p>
-          <a:p>
-            <a:r>
-              <a:rPr lang="de-AT" dirty="0" err="1"/>
-              <a:t>docker</a:t>
-            </a:r>
-            <a:r>
-              <a:rPr lang="de-AT" dirty="0"/>
-              <a:t> </a:t>
-            </a:r>
-            <a:r>
-              <a:rPr lang="de-AT" dirty="0" err="1"/>
-              <a:t>run</a:t>
-            </a:r>
-            <a:r>
-              <a:rPr lang="de-AT" dirty="0"/>
-              <a:t> -</a:t>
-            </a:r>
-            <a:r>
-              <a:rPr lang="de-AT" dirty="0" err="1"/>
-              <a:t>it</a:t>
-            </a:r>
-            <a:r>
-              <a:rPr lang="de-AT" dirty="0"/>
-              <a:t> --</a:t>
-            </a:r>
-            <a:r>
-              <a:rPr lang="de-AT" dirty="0" err="1"/>
-              <a:t>rm</a:t>
-            </a:r>
-            <a:r>
-              <a:rPr lang="de-AT" dirty="0"/>
-              <a:t> </a:t>
-            </a:r>
-            <a:r>
-              <a:rPr lang="de-AT" dirty="0" err="1"/>
-              <a:t>ubuntu</a:t>
-            </a:r>
-            <a:r>
-              <a:rPr lang="de-AT" dirty="0"/>
-              <a:t> /bin/</a:t>
-            </a:r>
-            <a:r>
-              <a:rPr lang="de-AT" dirty="0" err="1"/>
-              <a:t>bash</a:t>
-            </a:r>
-            <a:endParaRPr lang="de-AT" dirty="0"/>
-          </a:p>
-          <a:p>
-            <a:endParaRPr lang="de-AT" dirty="0"/>
-          </a:p>
-          <a:p>
-            <a:r>
-              <a:rPr lang="de-AT" i="1" dirty="0"/>
-              <a:t># Run </a:t>
-            </a:r>
-            <a:r>
-              <a:rPr lang="de-AT" i="1" dirty="0" err="1"/>
-              <a:t>postgres</a:t>
-            </a:r>
-            <a:r>
-              <a:rPr lang="de-AT" i="1" dirty="0"/>
-              <a:t> </a:t>
-            </a:r>
-            <a:r>
-              <a:rPr lang="de-AT" i="1" dirty="0" err="1"/>
-              <a:t>with</a:t>
-            </a:r>
-            <a:r>
-              <a:rPr lang="de-AT" i="1" dirty="0"/>
-              <a:t> </a:t>
-            </a:r>
-            <a:r>
-              <a:rPr lang="de-AT" b="1" i="1" dirty="0" err="1"/>
-              <a:t>volume</a:t>
-            </a:r>
-            <a:r>
-              <a:rPr lang="de-AT" b="1" i="1" dirty="0"/>
-              <a:t> </a:t>
-            </a:r>
-            <a:r>
-              <a:rPr lang="de-AT" b="1" i="1" dirty="0" err="1"/>
-              <a:t>mapping</a:t>
-            </a:r>
-            <a:endParaRPr lang="de-AT" b="1" i="1" dirty="0"/>
-          </a:p>
-          <a:p>
-            <a:r>
-              <a:rPr lang="de-AT" dirty="0" err="1"/>
-              <a:t>docker</a:t>
-            </a:r>
-            <a:r>
-              <a:rPr lang="de-AT" dirty="0"/>
-              <a:t> </a:t>
-            </a:r>
-            <a:r>
-              <a:rPr lang="de-AT" dirty="0" err="1"/>
-              <a:t>run</a:t>
-            </a:r>
-            <a:r>
-              <a:rPr lang="de-AT" dirty="0"/>
-              <a:t> –d --name </a:t>
-            </a:r>
-            <a:r>
-              <a:rPr lang="de-AT" dirty="0" err="1"/>
-              <a:t>postgres</a:t>
-            </a:r>
-            <a:r>
-              <a:rPr lang="de-AT" dirty="0"/>
-              <a:t> -v c:\temp\devopscon16:/dbdata </a:t>
-            </a:r>
-            <a:r>
-              <a:rPr lang="en-US" dirty="0"/>
-              <a:t>-e POSTGRES_PASSWORD=P@ssw0rd! -e PGDATA=/</a:t>
-            </a:r>
-            <a:r>
-              <a:rPr lang="en-US" dirty="0" err="1"/>
-              <a:t>dbdata</a:t>
-            </a:r>
-            <a:r>
-              <a:rPr lang="en-US" dirty="0"/>
-              <a:t> </a:t>
-            </a:r>
-            <a:r>
-              <a:rPr lang="en-US" dirty="0" err="1"/>
-              <a:t>postgres</a:t>
-            </a:r>
-            <a:endParaRPr lang="de-AT" dirty="0"/>
-          </a:p>
-          <a:p>
-            <a:r>
-              <a:rPr lang="de-AT" i="1" dirty="0"/>
-              <a:t># Show </a:t>
-            </a:r>
-            <a:r>
-              <a:rPr lang="de-AT" i="1" dirty="0" err="1"/>
-              <a:t>content</a:t>
-            </a:r>
-            <a:r>
-              <a:rPr lang="de-AT" i="1" dirty="0"/>
-              <a:t> </a:t>
-            </a:r>
-            <a:r>
-              <a:rPr lang="de-AT" i="1" dirty="0" err="1"/>
-              <a:t>of</a:t>
-            </a:r>
-            <a:r>
-              <a:rPr lang="de-AT" i="1" dirty="0"/>
-              <a:t> </a:t>
-            </a:r>
-            <a:r>
-              <a:rPr lang="de-AT" i="1" dirty="0" err="1"/>
-              <a:t>mapped</a:t>
-            </a:r>
-            <a:r>
-              <a:rPr lang="de-AT" i="1" dirty="0"/>
-              <a:t> </a:t>
-            </a:r>
-            <a:r>
-              <a:rPr lang="de-AT" i="1" dirty="0" err="1"/>
-              <a:t>volume</a:t>
-            </a:r>
-            <a:r>
-              <a:rPr lang="de-AT" i="1" dirty="0"/>
-              <a:t> on Windows</a:t>
-            </a:r>
-          </a:p>
-          <a:p>
-            <a:endParaRPr lang="de-AT" dirty="0"/>
-          </a:p>
-          <a:p>
-            <a:r>
-              <a:rPr lang="de-AT" i="1" dirty="0"/>
-              <a:t># Run </a:t>
-            </a:r>
-            <a:r>
-              <a:rPr lang="de-AT" i="1" dirty="0" err="1"/>
-              <a:t>mongo</a:t>
-            </a:r>
-            <a:r>
-              <a:rPr lang="de-AT" i="1" dirty="0"/>
-              <a:t> </a:t>
-            </a:r>
-            <a:r>
-              <a:rPr lang="de-AT" i="1" dirty="0" err="1"/>
-              <a:t>with</a:t>
-            </a:r>
-            <a:r>
-              <a:rPr lang="de-AT" i="1" dirty="0"/>
-              <a:t> </a:t>
-            </a:r>
-            <a:r>
-              <a:rPr lang="de-AT" b="1" i="1" dirty="0" err="1"/>
-              <a:t>port</a:t>
-            </a:r>
-            <a:r>
-              <a:rPr lang="de-AT" b="1" i="1" dirty="0"/>
-              <a:t> </a:t>
-            </a:r>
-            <a:r>
-              <a:rPr lang="de-AT" b="1" i="1" dirty="0" err="1"/>
-              <a:t>mapping</a:t>
-            </a:r>
-            <a:endParaRPr lang="de-AT" b="1" i="1" dirty="0"/>
-          </a:p>
-          <a:p>
-            <a:r>
-              <a:rPr lang="en-US" dirty="0" err="1"/>
-              <a:t>docker</a:t>
-            </a:r>
-            <a:r>
-              <a:rPr lang="en-US" dirty="0"/>
-              <a:t> run -d --name mongo -p 27017:27017 mongo</a:t>
-            </a:r>
-          </a:p>
-          <a:p>
-            <a:r>
-              <a:rPr lang="en-US" i="1" dirty="0"/>
+              <a:rPr lang="en-US" i="1" noProof="1"/>
+              <a:t># Run interactive ubuntu container</a:t>
+            </a:r>
+          </a:p>
+          <a:p>
+            <a:r>
+              <a:rPr lang="en-US" noProof="1"/>
+              <a:t>docker run -it --rm ubuntu /bin/bash</a:t>
+            </a:r>
+          </a:p>
+          <a:p>
+            <a:endParaRPr lang="en-US" noProof="1"/>
+          </a:p>
+          <a:p>
+            <a:r>
+              <a:rPr lang="en-US" i="1" noProof="1"/>
+              <a:t># Run postgres with </a:t>
+            </a:r>
+            <a:r>
+              <a:rPr lang="en-US" b="1" i="1" noProof="1"/>
+              <a:t>volume mapping</a:t>
+            </a:r>
+          </a:p>
+          <a:p>
+            <a:r>
+              <a:rPr lang="en-US" noProof="1"/>
+              <a:t>docker run –d --name postgres -v c:\temp\data:/dbdata -e POSTGRES_PASSWORD=P@ssw0rd! -e PGDATA=/dbdata postgres</a:t>
+            </a:r>
+          </a:p>
+          <a:p>
+            <a:r>
+              <a:rPr lang="en-US" i="1" noProof="1"/>
+              <a:t># Show content of mapped volume on Windows</a:t>
+            </a:r>
+          </a:p>
+          <a:p>
+            <a:endParaRPr lang="en-US" noProof="1"/>
+          </a:p>
+          <a:p>
+            <a:r>
+              <a:rPr lang="en-US" i="1" noProof="1"/>
+              <a:t># Run mongo with </a:t>
+            </a:r>
+            <a:r>
+              <a:rPr lang="en-US" b="1" i="1" noProof="1"/>
+              <a:t>port mapping</a:t>
+            </a:r>
+          </a:p>
+          <a:p>
+            <a:r>
+              <a:rPr lang="en-US" noProof="1"/>
+              <a:t>docker run -d --name mongo -p 27017:27017 mongo</a:t>
+            </a:r>
+          </a:p>
+          <a:p>
+            <a:r>
+              <a:rPr lang="en-US" i="1" noProof="1"/>
               <a:t># Use mongo client under Windows to access mongo in container</a:t>
             </a:r>
           </a:p>
           <a:p>
-            <a:endParaRPr lang="en-US" dirty="0"/>
-          </a:p>
-          <a:p>
-            <a:r>
-              <a:rPr lang="de-AT" dirty="0"/>
+            <a:endParaRPr lang="en-US" noProof="1"/>
+          </a:p>
+          <a:p>
+            <a:r>
+              <a:rPr lang="en-US" noProof="1"/>
               <a:t># Run .NET Core on Linux</a:t>
             </a:r>
           </a:p>
           <a:p>
             <a:r>
-              <a:rPr lang="de-AT" dirty="0" err="1"/>
-              <a:t>docker</a:t>
-            </a:r>
-            <a:r>
-              <a:rPr lang="de-AT" dirty="0"/>
-              <a:t> </a:t>
-            </a:r>
-            <a:r>
-              <a:rPr lang="de-AT" dirty="0" err="1"/>
-              <a:t>run</a:t>
-            </a:r>
-            <a:r>
-              <a:rPr lang="de-AT" dirty="0"/>
-              <a:t> -</a:t>
-            </a:r>
-            <a:r>
-              <a:rPr lang="de-AT" dirty="0" err="1"/>
-              <a:t>it</a:t>
-            </a:r>
-            <a:r>
-              <a:rPr lang="de-AT" dirty="0"/>
-              <a:t> --</a:t>
-            </a:r>
-            <a:r>
-              <a:rPr lang="de-AT" dirty="0" err="1"/>
-              <a:t>rm</a:t>
-            </a:r>
-            <a:r>
-              <a:rPr lang="de-AT" dirty="0"/>
-              <a:t> </a:t>
-            </a:r>
-            <a:r>
-              <a:rPr lang="de-AT" dirty="0" err="1"/>
-              <a:t>microsoft</a:t>
-            </a:r>
-            <a:r>
-              <a:rPr lang="de-AT" dirty="0"/>
-              <a:t>/</a:t>
-            </a:r>
-            <a:r>
-              <a:rPr lang="de-AT" dirty="0" err="1"/>
-              <a:t>dotnet</a:t>
-            </a:r>
-            <a:r>
-              <a:rPr lang="de-AT" dirty="0"/>
-              <a:t> /bin/</a:t>
-            </a:r>
-            <a:r>
-              <a:rPr lang="de-AT" dirty="0" err="1"/>
-              <a:t>bash</a:t>
-            </a:r>
-            <a:endParaRPr lang="de-AT" dirty="0"/>
-          </a:p>
-          <a:p>
-            <a:r>
-              <a:rPr lang="de-AT" dirty="0" err="1"/>
-              <a:t>mkdir</a:t>
-            </a:r>
-            <a:r>
-              <a:rPr lang="de-AT" dirty="0"/>
-              <a:t> /</a:t>
-            </a:r>
-            <a:r>
-              <a:rPr lang="de-AT" dirty="0" err="1"/>
-              <a:t>demo</a:t>
-            </a:r>
-            <a:endParaRPr lang="de-AT" dirty="0"/>
-          </a:p>
-          <a:p>
-            <a:r>
-              <a:rPr lang="de-AT" dirty="0"/>
-              <a:t>cd /</a:t>
-            </a:r>
-            <a:r>
-              <a:rPr lang="de-AT" dirty="0" err="1"/>
-              <a:t>demo</a:t>
-            </a:r>
-            <a:endParaRPr lang="de-AT" dirty="0"/>
-          </a:p>
-          <a:p>
-            <a:r>
-              <a:rPr lang="de-AT" dirty="0" err="1"/>
-              <a:t>dotnet</a:t>
-            </a:r>
-            <a:r>
-              <a:rPr lang="de-AT" dirty="0"/>
-              <a:t> </a:t>
-            </a:r>
-            <a:r>
-              <a:rPr lang="de-AT" dirty="0" err="1"/>
-              <a:t>new</a:t>
-            </a:r>
-            <a:endParaRPr lang="de-AT" dirty="0"/>
-          </a:p>
-          <a:p>
-            <a:r>
-              <a:rPr lang="de-AT" dirty="0" err="1"/>
-              <a:t>ls</a:t>
-            </a:r>
-            <a:r>
-              <a:rPr lang="de-AT" dirty="0"/>
-              <a:t> –la</a:t>
-            </a:r>
-          </a:p>
-          <a:p>
-            <a:r>
-              <a:rPr lang="de-AT" dirty="0" err="1"/>
-              <a:t>dotnet</a:t>
-            </a:r>
-            <a:r>
-              <a:rPr lang="de-AT" dirty="0"/>
-              <a:t> </a:t>
-            </a:r>
-            <a:r>
-              <a:rPr lang="de-AT" dirty="0" err="1"/>
-              <a:t>restore</a:t>
-            </a:r>
-            <a:endParaRPr lang="de-AT" dirty="0"/>
-          </a:p>
-          <a:p>
-            <a:r>
-              <a:rPr lang="de-AT" dirty="0" err="1"/>
-              <a:t>dotnet</a:t>
-            </a:r>
-            <a:r>
-              <a:rPr lang="de-AT" dirty="0"/>
-              <a:t> </a:t>
-            </a:r>
-            <a:r>
-              <a:rPr lang="de-AT" dirty="0" err="1"/>
-              <a:t>run</a:t>
-            </a:r>
-            <a:endParaRPr lang="en-US" dirty="0"/>
+              <a:rPr lang="en-US" noProof="1"/>
+              <a:t>docker run -it --rm microsoft/dotnet /bin/bash</a:t>
+            </a:r>
+          </a:p>
+          <a:p>
+            <a:r>
+              <a:rPr lang="en-US" noProof="1"/>
+              <a:t>mkdir /demo</a:t>
+            </a:r>
+          </a:p>
+          <a:p>
+            <a:r>
+              <a:rPr lang="en-US" noProof="1"/>
+              <a:t>cd /demo</a:t>
+            </a:r>
+          </a:p>
+          <a:p>
+            <a:r>
+              <a:rPr lang="en-US" noProof="1"/>
+              <a:t>dotnet new</a:t>
+            </a:r>
+          </a:p>
+          <a:p>
+            <a:r>
+              <a:rPr lang="en-US" noProof="1"/>
+              <a:t>ls –la</a:t>
+            </a:r>
+          </a:p>
+          <a:p>
+            <a:r>
+              <a:rPr lang="en-US" noProof="1"/>
+              <a:t>dotnet restore</a:t>
+            </a:r>
+          </a:p>
+          <a:p>
+            <a:r>
+              <a:rPr lang="en-US" noProof="1"/>
+              <a:t>dotnet run</a:t>
+            </a:r>
           </a:p>
         </p:txBody>
       </p:sp>
@@ -30055,104 +30007,22 @@
           <a:lstStyle/>
           <a:p>
             <a:r>
-              <a:rPr lang="de-AT" dirty="0" err="1"/>
+              <a:rPr lang="en-US" dirty="0"/>
               <a:t>Prerequisites</a:t>
             </a:r>
-            <a:endParaRPr lang="de-AT" dirty="0"/>
           </a:p>
           <a:p>
             <a:pPr lvl="1"/>
             <a:r>
-              <a:rPr lang="de-AT" dirty="0"/>
-              <a:t>Docker </a:t>
-            </a:r>
-            <a:r>
-              <a:rPr lang="de-AT" dirty="0" err="1"/>
-              <a:t>for</a:t>
-            </a:r>
-            <a:r>
-              <a:rPr lang="de-AT" dirty="0"/>
-              <a:t> Windows </a:t>
-            </a:r>
-            <a:r>
-              <a:rPr lang="de-AT" dirty="0" err="1"/>
-              <a:t>installed</a:t>
-            </a:r>
-            <a:r>
-              <a:rPr lang="de-AT" dirty="0"/>
-              <a:t> </a:t>
-            </a:r>
-            <a:r>
-              <a:rPr lang="de-AT" dirty="0" err="1"/>
-              <a:t>and</a:t>
-            </a:r>
-            <a:r>
-              <a:rPr lang="de-AT" dirty="0"/>
-              <a:t> </a:t>
-            </a:r>
-            <a:r>
-              <a:rPr lang="de-AT" dirty="0" err="1"/>
-              <a:t>configured</a:t>
-            </a:r>
-            <a:endParaRPr lang="de-AT" dirty="0"/>
+              <a:rPr lang="en-US" dirty="0"/>
+              <a:t>Docker for Windows installed and configured</a:t>
+            </a:r>
           </a:p>
           <a:p>
             <a:pPr lvl="1"/>
             <a:r>
-              <a:rPr lang="de-AT" dirty="0" err="1"/>
-              <a:t>Don‘t</a:t>
-            </a:r>
-            <a:r>
-              <a:rPr lang="de-AT" dirty="0"/>
-              <a:t> </a:t>
-            </a:r>
-            <a:r>
-              <a:rPr lang="de-AT" dirty="0" err="1"/>
-              <a:t>forget</a:t>
-            </a:r>
-            <a:r>
-              <a:rPr lang="de-AT" dirty="0"/>
-              <a:t> </a:t>
-            </a:r>
-            <a:r>
-              <a:rPr lang="de-AT" dirty="0" err="1"/>
-              <a:t>to</a:t>
-            </a:r>
-            <a:r>
-              <a:rPr lang="de-AT" dirty="0"/>
-              <a:t> </a:t>
-            </a:r>
-            <a:r>
-              <a:rPr lang="de-AT" dirty="0" err="1"/>
-              <a:t>share</a:t>
-            </a:r>
-            <a:r>
-              <a:rPr lang="de-AT" dirty="0"/>
-              <a:t> </a:t>
-            </a:r>
-            <a:r>
-              <a:rPr lang="de-AT" dirty="0" err="1"/>
-              <a:t>drive</a:t>
-            </a:r>
-            <a:r>
-              <a:rPr lang="de-AT" dirty="0"/>
-              <a:t> in Docker </a:t>
-            </a:r>
-            <a:r>
-              <a:rPr lang="de-AT" dirty="0" err="1"/>
-              <a:t>for</a:t>
-            </a:r>
-            <a:r>
-              <a:rPr lang="de-AT" dirty="0"/>
-              <a:t> Windows </a:t>
-            </a:r>
-            <a:r>
-              <a:rPr lang="de-AT" dirty="0" err="1"/>
-              <a:t>settings</a:t>
-            </a:r>
-            <a:r>
-              <a:rPr lang="de-AT" dirty="0"/>
-              <a:t>!</a:t>
+              <a:rPr lang="en-US" dirty="0"/>
+              <a:t>Don‘t forget to share drive in Docker for Windows settings!</a:t>
             </a:r>
           </a:p>
         </p:txBody>
@@ -30216,7 +30086,7 @@
 </p:sld>
 </file>
 
-<file path=ppt/slides/slide12.xml><?xml version="1.0" encoding="utf-8"?>
+<file path=ppt/slides/slide14.xml><?xml version="1.0" encoding="utf-8"?>
 <p:sld xmlns:a="http://schemas.openxmlformats.org/drawingml/2006/main" xmlns:r="http://schemas.openxmlformats.org/officeDocument/2006/relationships" xmlns:p="http://schemas.openxmlformats.org/presentationml/2006/main">
   <p:cSld>
     <p:spTree>
@@ -30302,7 +30172,7 @@
 </p:sld>
 </file>
 
-<file path=ppt/slides/slide13.xml><?xml version="1.0" encoding="utf-8"?>
+<file path=ppt/slides/slide15.xml><?xml version="1.0" encoding="utf-8"?>
 <p:sld xmlns:a="http://schemas.openxmlformats.org/drawingml/2006/main" xmlns:r="http://schemas.openxmlformats.org/officeDocument/2006/relationships" xmlns:p="http://schemas.openxmlformats.org/presentationml/2006/main">
   <p:cSld>
     <p:spTree>
@@ -30357,38 +30227,22 @@
           <a:lstStyle/>
           <a:p>
             <a:r>
-              <a:rPr lang="en-US" dirty="0">
-                <a:hlinkClick r:id="rId2"/>
-              </a:rPr>
-              <a:t>Windows Container</a:t>
-            </a:r>
-            <a:r>
               <a:rPr lang="en-US" dirty="0"/>
-              <a:t> Preview</a:t>
+              <a:t>OS Support</a:t>
             </a:r>
           </a:p>
           <a:p>
             <a:pPr lvl="1"/>
             <a:r>
               <a:rPr lang="en-US" dirty="0"/>
-              <a:t>Windows Server 2016 Preview</a:t>
+              <a:t>Windows Server 2016</a:t>
             </a:r>
           </a:p>
           <a:p>
             <a:pPr lvl="1"/>
             <a:r>
               <a:rPr lang="en-US" dirty="0"/>
-              <a:t>Windows 10 Insider Build (</a:t>
-            </a:r>
-            <a:r>
-              <a:rPr lang="en-US" dirty="0">
-                <a:hlinkClick r:id="rId3"/>
-              </a:rPr>
-              <a:t>Anniversary update</a:t>
-            </a:r>
-            <a:r>
-              <a:rPr lang="en-US" dirty="0"/>
-              <a:t>)</a:t>
+              <a:t>Windows 10 (Hyper-V Container)</a:t>
             </a:r>
           </a:p>
           <a:p>
@@ -30416,6 +30270,90 @@
               <a:rPr lang="en-US" dirty="0"/>
               <a:t>Runs inside of Windows Nano Server VM</a:t>
             </a:r>
+          </a:p>
+          <a:p>
+            <a:pPr lvl="1"/>
+            <a:r>
+              <a:rPr lang="en-US" sz="1400" dirty="0" err="1">
+                <a:latin typeface="Lucida Console" panose="020B0609040504020204" pitchFamily="49" charset="0"/>
+              </a:rPr>
+              <a:t>docker</a:t>
+            </a:r>
+            <a:r>
+              <a:rPr lang="en-US" sz="1400" dirty="0">
+                <a:latin typeface="Lucida Console" panose="020B0609040504020204" pitchFamily="49" charset="0"/>
+              </a:rPr>
+              <a:t> run -it --</a:t>
+            </a:r>
+            <a:r>
+              <a:rPr lang="en-US" sz="1400" dirty="0" err="1">
+                <a:latin typeface="Lucida Console" panose="020B0609040504020204" pitchFamily="49" charset="0"/>
+              </a:rPr>
+              <a:t>rm</a:t>
+            </a:r>
+            <a:r>
+              <a:rPr lang="en-US" sz="1400" dirty="0">
+                <a:latin typeface="Lucida Console" panose="020B0609040504020204" pitchFamily="49" charset="0"/>
+              </a:rPr>
+              <a:t> </a:t>
+            </a:r>
+            <a:r>
+              <a:rPr lang="en-US" sz="1400" dirty="0">
+                <a:solidFill>
+                  <a:srgbClr val="FF0000"/>
+                </a:solidFill>
+                <a:latin typeface="Lucida Console" panose="020B0609040504020204" pitchFamily="49" charset="0"/>
+              </a:rPr>
+              <a:t>--isolation=</a:t>
+            </a:r>
+            <a:r>
+              <a:rPr lang="en-US" sz="1400" dirty="0" err="1">
+                <a:solidFill>
+                  <a:srgbClr val="FF0000"/>
+                </a:solidFill>
+                <a:latin typeface="Lucida Console" panose="020B0609040504020204" pitchFamily="49" charset="0"/>
+              </a:rPr>
+              <a:t>hyperv</a:t>
+            </a:r>
+            <a:r>
+              <a:rPr lang="en-US" sz="1400" dirty="0">
+                <a:latin typeface="Lucida Console" panose="020B0609040504020204" pitchFamily="49" charset="0"/>
+              </a:rPr>
+              <a:t> </a:t>
+            </a:r>
+            <a:r>
+              <a:rPr lang="en-US" sz="1400" dirty="0" err="1">
+                <a:latin typeface="Lucida Console" panose="020B0609040504020204" pitchFamily="49" charset="0"/>
+              </a:rPr>
+              <a:t>microsoft</a:t>
+            </a:r>
+            <a:r>
+              <a:rPr lang="en-US" sz="1400" dirty="0">
+                <a:latin typeface="Lucida Console" panose="020B0609040504020204" pitchFamily="49" charset="0"/>
+              </a:rPr>
+              <a:t>/</a:t>
+            </a:r>
+            <a:r>
+              <a:rPr lang="en-US" sz="1400" dirty="0" err="1">
+                <a:latin typeface="Lucida Console" panose="020B0609040504020204" pitchFamily="49" charset="0"/>
+              </a:rPr>
+              <a:t>nanoserver</a:t>
+            </a:r>
+            <a:r>
+              <a:rPr lang="en-US" sz="1400" dirty="0">
+                <a:latin typeface="Lucida Console" panose="020B0609040504020204" pitchFamily="49" charset="0"/>
+              </a:rPr>
+              <a:t> </a:t>
+            </a:r>
+            <a:r>
+              <a:rPr lang="en-US" sz="1400" dirty="0" err="1">
+                <a:latin typeface="Lucida Console" panose="020B0609040504020204" pitchFamily="49" charset="0"/>
+              </a:rPr>
+              <a:t>cmd</a:t>
+            </a:r>
+            <a:endParaRPr lang="en-US" sz="1400" dirty="0">
+              <a:latin typeface="Lucida Console" panose="020B0609040504020204" pitchFamily="49" charset="0"/>
+            </a:endParaRPr>
           </a:p>
         </p:txBody>
       </p:sp>
@@ -30442,570 +30380,6 @@
     <p:extLst>
       <p:ext uri="{BB962C8B-B14F-4D97-AF65-F5344CB8AC3E}">
         <p14:creationId xmlns:p14="http://schemas.microsoft.com/office/powerpoint/2010/main" val="2760824347"/>
-      </p:ext>
-    </p:extLst>
-  </p:cSld>
-  <p:clrMapOvr>
-    <a:masterClrMapping/>
-  </p:clrMapOvr>
-  <p:transition spd="slow">
-    <p:push/>
-  </p:transition>
-</p:sld>
-</file>
-
-<file path=ppt/slides/slide14.xml><?xml version="1.0" encoding="utf-8"?>
-<p:sld xmlns:a="http://schemas.openxmlformats.org/drawingml/2006/main" xmlns:r="http://schemas.openxmlformats.org/officeDocument/2006/relationships" xmlns:p="http://schemas.openxmlformats.org/presentationml/2006/main">
-  <p:cSld>
-    <p:spTree>
-      <p:nvGrpSpPr>
-        <p:cNvPr id="1" name=""/>
-        <p:cNvGrpSpPr/>
-        <p:nvPr/>
-      </p:nvGrpSpPr>
-      <p:grpSpPr>
-        <a:xfrm>
-          <a:off x="0" y="0"/>
-          <a:ext cx="0" cy="0"/>
-          <a:chOff x="0" y="0"/>
-          <a:chExt cx="0" cy="0"/>
-        </a:xfrm>
-      </p:grpSpPr>
-      <p:sp>
-        <p:nvSpPr>
-          <p:cNvPr id="5" name="Text Placeholder 4"/>
-          <p:cNvSpPr>
-            <a:spLocks noGrp="1"/>
-          </p:cNvSpPr>
-          <p:nvPr>
-            <p:ph type="body" sz="quarter" idx="16"/>
-          </p:nvPr>
-        </p:nvSpPr>
-        <p:spPr/>
-        <p:txBody>
-          <a:bodyPr/>
-          <a:lstStyle/>
-          <a:p>
-            <a:r>
-              <a:rPr lang="en-US" dirty="0"/>
-              <a:t>Windows Container</a:t>
-            </a:r>
-          </a:p>
-        </p:txBody>
-      </p:sp>
-      <p:sp>
-        <p:nvSpPr>
-          <p:cNvPr id="6" name="Text Placeholder 5"/>
-          <p:cNvSpPr>
-            <a:spLocks noGrp="1"/>
-          </p:cNvSpPr>
-          <p:nvPr>
-            <p:ph type="body" sz="quarter" idx="24"/>
-          </p:nvPr>
-        </p:nvSpPr>
-        <p:spPr/>
-        <p:txBody>
-          <a:bodyPr/>
-          <a:lstStyle/>
-          <a:p>
-            <a:r>
-              <a:rPr lang="en-US" dirty="0"/>
-              <a:t>Nano Server with Docker</a:t>
-            </a:r>
-          </a:p>
-          <a:p>
-            <a:pPr lvl="1"/>
-            <a:r>
-              <a:rPr lang="en-US" dirty="0"/>
-              <a:t>Setup (PowerShell)</a:t>
-            </a:r>
-          </a:p>
-          <a:p>
-            <a:pPr lvl="1"/>
-            <a:r>
-              <a:rPr lang="en-US" dirty="0"/>
-              <a:t>Hyper-V</a:t>
-            </a:r>
-          </a:p>
-          <a:p>
-            <a:r>
-              <a:rPr lang="en-US" dirty="0"/>
-              <a:t>Connect Docker client</a:t>
-            </a:r>
-          </a:p>
-          <a:p>
-            <a:pPr lvl="1"/>
-            <a:r>
-              <a:rPr lang="en-US" dirty="0"/>
-              <a:t>Docker client on Host</a:t>
-            </a:r>
-          </a:p>
-          <a:p>
-            <a:pPr lvl="1"/>
-            <a:r>
-              <a:rPr lang="en-US" dirty="0"/>
-              <a:t>Remote Docker client</a:t>
-            </a:r>
-          </a:p>
-          <a:p>
-            <a:r>
-              <a:rPr lang="en-US" dirty="0"/>
-              <a:t>Container scenarios</a:t>
-            </a:r>
-          </a:p>
-          <a:p>
-            <a:pPr lvl="1"/>
-            <a:r>
-              <a:rPr lang="en-US" dirty="0"/>
-              <a:t>Interactive container</a:t>
-            </a:r>
-          </a:p>
-          <a:p>
-            <a:pPr lvl="1"/>
-            <a:r>
-              <a:rPr lang="en-US" dirty="0" err="1">
-                <a:hlinkClick r:id="rId2"/>
-              </a:rPr>
-              <a:t>Dockerfiles</a:t>
-            </a:r>
-            <a:r>
-              <a:rPr lang="en-US" dirty="0">
-                <a:hlinkClick r:id="rId2"/>
-              </a:rPr>
-              <a:t> on Windows</a:t>
-            </a:r>
-            <a:endParaRPr lang="en-US" dirty="0"/>
-          </a:p>
-          <a:p>
-            <a:pPr lvl="1"/>
-            <a:r>
-              <a:rPr lang="en-US" dirty="0"/>
-              <a:t>Volume mapping</a:t>
-            </a:r>
-          </a:p>
-        </p:txBody>
-      </p:sp>
-      <p:sp>
-        <p:nvSpPr>
-          <p:cNvPr id="7" name="Text Placeholder 6"/>
-          <p:cNvSpPr>
-            <a:spLocks noGrp="1"/>
-          </p:cNvSpPr>
-          <p:nvPr>
-            <p:ph type="body" sz="quarter" idx="25"/>
-          </p:nvPr>
-        </p:nvSpPr>
-        <p:spPr/>
-        <p:txBody>
-          <a:bodyPr/>
-          <a:lstStyle/>
-          <a:p>
-            <a:endParaRPr lang="en-US" dirty="0"/>
-          </a:p>
-        </p:txBody>
-      </p:sp>
-      <p:sp>
-        <p:nvSpPr>
-          <p:cNvPr id="8" name="Text Placeholder 7"/>
-          <p:cNvSpPr>
-            <a:spLocks noGrp="1"/>
-          </p:cNvSpPr>
-          <p:nvPr>
-            <p:ph type="body" sz="quarter" idx="26"/>
-          </p:nvPr>
-        </p:nvSpPr>
-        <p:spPr/>
-        <p:txBody>
-          <a:bodyPr/>
-          <a:lstStyle/>
-          <a:p>
-            <a:endParaRPr lang="en-US" dirty="0"/>
-          </a:p>
-        </p:txBody>
-      </p:sp>
-    </p:spTree>
-    <p:extLst>
-      <p:ext uri="{BB962C8B-B14F-4D97-AF65-F5344CB8AC3E}">
-        <p14:creationId xmlns:p14="http://schemas.microsoft.com/office/powerpoint/2010/main" val="1144713619"/>
-      </p:ext>
-    </p:extLst>
-  </p:cSld>
-  <p:clrMapOvr>
-    <a:masterClrMapping/>
-  </p:clrMapOvr>
-  <p:transition spd="slow">
-    <p:push/>
-  </p:transition>
-</p:sld>
-</file>
-
-<file path=ppt/slides/slide15.xml><?xml version="1.0" encoding="utf-8"?>
-<p:sld xmlns:a="http://schemas.openxmlformats.org/drawingml/2006/main" xmlns:r="http://schemas.openxmlformats.org/officeDocument/2006/relationships" xmlns:p="http://schemas.openxmlformats.org/presentationml/2006/main" show="0">
-  <p:cSld>
-    <p:spTree>
-      <p:nvGrpSpPr>
-        <p:cNvPr id="1" name=""/>
-        <p:cNvGrpSpPr/>
-        <p:nvPr/>
-      </p:nvGrpSpPr>
-      <p:grpSpPr>
-        <a:xfrm>
-          <a:off x="0" y="0"/>
-          <a:ext cx="0" cy="0"/>
-          <a:chOff x="0" y="0"/>
-          <a:chExt cx="0" cy="0"/>
-        </a:xfrm>
-      </p:grpSpPr>
-      <p:sp>
-        <p:nvSpPr>
-          <p:cNvPr id="6" name="Title 5"/>
-          <p:cNvSpPr>
-            <a:spLocks noGrp="1"/>
-          </p:cNvSpPr>
-          <p:nvPr>
-            <p:ph type="title"/>
-          </p:nvPr>
-        </p:nvSpPr>
-        <p:spPr/>
-        <p:txBody>
-          <a:bodyPr/>
-          <a:lstStyle/>
-          <a:p>
-            <a:r>
-              <a:rPr lang="de-AT" dirty="0"/>
-              <a:t>Demo</a:t>
-            </a:r>
-          </a:p>
-        </p:txBody>
-      </p:sp>
-      <p:sp>
-        <p:nvSpPr>
-          <p:cNvPr id="7" name="Content Placeholder 6"/>
-          <p:cNvSpPr>
-            <a:spLocks noGrp="1"/>
-          </p:cNvSpPr>
-          <p:nvPr>
-            <p:ph sz="quarter" idx="22"/>
-          </p:nvPr>
-        </p:nvSpPr>
-        <p:spPr/>
-        <p:txBody>
-          <a:bodyPr/>
-          <a:lstStyle/>
-          <a:p>
-            <a:r>
-              <a:rPr lang="sv-SE" i="1" dirty="0"/>
-              <a:t># Ping Docker host on Nano Server</a:t>
-            </a:r>
-          </a:p>
-          <a:p>
-            <a:r>
-              <a:rPr lang="sv-SE" dirty="0"/>
-              <a:t>docker -H tcp://169.254.165.219:2375 info</a:t>
-            </a:r>
-            <a:endParaRPr lang="de-AT" dirty="0"/>
-          </a:p>
-          <a:p>
-            <a:r>
-              <a:rPr lang="de-AT" dirty="0" err="1"/>
-              <a:t>set</a:t>
-            </a:r>
-            <a:r>
-              <a:rPr lang="de-AT" dirty="0"/>
-              <a:t> </a:t>
-            </a:r>
-            <a:r>
-              <a:rPr lang="de-AT" dirty="0" err="1"/>
-              <a:t>DOCKER_HOSt</a:t>
-            </a:r>
-            <a:r>
-              <a:rPr lang="de-AT" dirty="0"/>
-              <a:t>=</a:t>
-            </a:r>
-            <a:r>
-              <a:rPr lang="sv-SE" dirty="0"/>
-              <a:t>tcp://169.254.165.219:2375</a:t>
-            </a:r>
-          </a:p>
-          <a:p>
-            <a:r>
-              <a:rPr lang="sv-SE" dirty="0"/>
-              <a:t>docker info</a:t>
-            </a:r>
-          </a:p>
-          <a:p>
-            <a:r>
-              <a:rPr lang="sv-SE" dirty="0"/>
-              <a:t>docker ps -a</a:t>
-            </a:r>
-          </a:p>
-          <a:p>
-            <a:r>
-              <a:rPr lang="sv-SE" dirty="0"/>
-              <a:t>docker images</a:t>
-            </a:r>
-          </a:p>
-          <a:p>
-            <a:endParaRPr lang="sv-SE" dirty="0"/>
-          </a:p>
-          <a:p>
-            <a:r>
-              <a:rPr lang="sv-SE" i="1" dirty="0"/>
-              <a:t># Run ’dir’ inside a short-lived Nano Server container</a:t>
-            </a:r>
-          </a:p>
-          <a:p>
-            <a:r>
-              <a:rPr lang="en-US" dirty="0" err="1"/>
-              <a:t>docker</a:t>
-            </a:r>
-            <a:r>
-              <a:rPr lang="en-US" dirty="0"/>
-              <a:t> run -it --</a:t>
-            </a:r>
-            <a:r>
-              <a:rPr lang="en-US" dirty="0" err="1"/>
-              <a:t>rm</a:t>
-            </a:r>
-            <a:r>
-              <a:rPr lang="en-US" dirty="0"/>
-              <a:t> </a:t>
-            </a:r>
-            <a:r>
-              <a:rPr lang="en-US" dirty="0" err="1"/>
-              <a:t>nanoserver</a:t>
-            </a:r>
-            <a:r>
-              <a:rPr lang="en-US" dirty="0"/>
-              <a:t> </a:t>
-            </a:r>
-            <a:r>
-              <a:rPr lang="en-US" dirty="0" err="1"/>
-              <a:t>cmd</a:t>
-            </a:r>
-            <a:r>
-              <a:rPr lang="en-US" dirty="0"/>
-              <a:t> /C </a:t>
-            </a:r>
-            <a:r>
-              <a:rPr lang="en-US" dirty="0" err="1"/>
-              <a:t>dir</a:t>
-            </a:r>
-            <a:endParaRPr lang="en-US" dirty="0"/>
-          </a:p>
-          <a:p>
-            <a:endParaRPr lang="sv-SE" dirty="0"/>
-          </a:p>
-          <a:p>
-            <a:r>
-              <a:rPr lang="sv-SE" i="1" dirty="0"/>
-              <a:t># Build Dockerfile, install IIS (details about IIS on Nano see </a:t>
-            </a:r>
-            <a:br>
-              <a:rPr lang="sv-SE" i="1" dirty="0"/>
-            </a:br>
-            <a:r>
-              <a:rPr lang="sv-SE" i="1" dirty="0"/>
-              <a:t># </a:t>
-            </a:r>
-            <a:r>
-              <a:rPr lang="sv-SE" i="1" dirty="0">
-                <a:hlinkClick r:id="rId2"/>
-              </a:rPr>
-              <a:t>https://technet.microsoft.com/en-us/library/mt627783.aspx</a:t>
-            </a:r>
-            <a:r>
-              <a:rPr lang="sv-SE" i="1" dirty="0"/>
-              <a:t>)</a:t>
-            </a:r>
-          </a:p>
-          <a:p>
-            <a:r>
-              <a:rPr lang="sv-SE" dirty="0"/>
-              <a:t>docker build -t myiis .</a:t>
-            </a:r>
-          </a:p>
-          <a:p>
-            <a:r>
-              <a:rPr lang="sv-SE" dirty="0"/>
-              <a:t>docker images</a:t>
-            </a:r>
-          </a:p>
-          <a:p>
-            <a:r>
-              <a:rPr lang="sv-SE" dirty="0"/>
-              <a:t>docker run -it --rm myiis</a:t>
-            </a:r>
-          </a:p>
-          <a:p>
-            <a:r>
-              <a:rPr lang="sv-SE" dirty="0"/>
-              <a:t>cd \install</a:t>
-            </a:r>
-          </a:p>
-          <a:p>
-            <a:r>
-              <a:rPr lang="sv-SE" dirty="0"/>
-              <a:t>dism /online /apply-unattend:.\unattend.xml</a:t>
-            </a:r>
-          </a:p>
-          <a:p>
-            <a:r>
-              <a:rPr lang="sv-SE" dirty="0"/>
-              <a:t>net start w3svc</a:t>
-            </a:r>
-          </a:p>
-          <a:p>
-            <a:endParaRPr lang="sv-SE" dirty="0"/>
-          </a:p>
-          <a:p>
-            <a:r>
-              <a:rPr lang="sv-SE" i="1" dirty="0"/>
-              <a:t># On Docker host (Enter-PSSession)</a:t>
-            </a:r>
-          </a:p>
-          <a:p>
-            <a:r>
-              <a:rPr lang="sv-SE" dirty="0"/>
-              <a:t>echo Hello &gt; c:\temp\greeting.txt</a:t>
-            </a:r>
-          </a:p>
-          <a:p>
-            <a:r>
-              <a:rPr lang="sv-SE" dirty="0"/>
-              <a:t>c:\docker\docker.exe </a:t>
-            </a:r>
-            <a:r>
-              <a:rPr lang="de-AT" dirty="0" err="1"/>
-              <a:t>run</a:t>
-            </a:r>
-            <a:r>
-              <a:rPr lang="de-AT" dirty="0"/>
-              <a:t> --</a:t>
-            </a:r>
-            <a:r>
-              <a:rPr lang="de-AT" dirty="0" err="1"/>
-              <a:t>rm</a:t>
-            </a:r>
-            <a:r>
-              <a:rPr lang="de-AT" dirty="0"/>
-              <a:t> -v c:\temp:c:\somedir </a:t>
-            </a:r>
-            <a:r>
-              <a:rPr lang="de-AT" dirty="0" err="1"/>
-              <a:t>nanoserver</a:t>
-            </a:r>
-            <a:r>
-              <a:rPr lang="de-AT" dirty="0"/>
-              <a:t> </a:t>
-            </a:r>
-            <a:r>
-              <a:rPr lang="de-AT" dirty="0" err="1"/>
-              <a:t>cmd</a:t>
-            </a:r>
-            <a:r>
-              <a:rPr lang="de-AT" dirty="0"/>
-              <a:t> /C type \</a:t>
-            </a:r>
-            <a:r>
-              <a:rPr lang="de-AT" dirty="0" err="1"/>
-              <a:t>somedir</a:t>
-            </a:r>
-            <a:r>
-              <a:rPr lang="de-AT" dirty="0"/>
-              <a:t>\greeting.txt </a:t>
-            </a:r>
-          </a:p>
-          <a:p>
-            <a:endParaRPr lang="sv-SE" dirty="0"/>
-          </a:p>
-        </p:txBody>
-      </p:sp>
-      <p:sp>
-        <p:nvSpPr>
-          <p:cNvPr id="8" name="Text Placeholder 7"/>
-          <p:cNvSpPr>
-            <a:spLocks noGrp="1"/>
-          </p:cNvSpPr>
-          <p:nvPr>
-            <p:ph type="body" sz="quarter" idx="23"/>
-          </p:nvPr>
-        </p:nvSpPr>
-        <p:spPr/>
-        <p:txBody>
-          <a:bodyPr/>
-          <a:lstStyle/>
-          <a:p>
-            <a:endParaRPr lang="de-AT"/>
-          </a:p>
-        </p:txBody>
-      </p:sp>
-      <p:sp>
-        <p:nvSpPr>
-          <p:cNvPr id="9" name="Text Placeholder 8"/>
-          <p:cNvSpPr>
-            <a:spLocks noGrp="1"/>
-          </p:cNvSpPr>
-          <p:nvPr>
-            <p:ph type="body" sz="quarter" idx="24"/>
-          </p:nvPr>
-        </p:nvSpPr>
-        <p:spPr/>
-        <p:txBody>
-          <a:bodyPr/>
-          <a:lstStyle/>
-          <a:p>
-            <a:r>
-              <a:rPr lang="de-AT" dirty="0" err="1"/>
-              <a:t>Prerequisites</a:t>
-            </a:r>
-            <a:endParaRPr lang="de-AT" dirty="0"/>
-          </a:p>
-          <a:p>
-            <a:pPr lvl="1"/>
-            <a:r>
-              <a:rPr lang="de-AT" dirty="0"/>
-              <a:t>Nano Server on Hyper-V </a:t>
-            </a:r>
-            <a:r>
-              <a:rPr lang="de-AT" dirty="0" err="1"/>
-              <a:t>with</a:t>
-            </a:r>
-            <a:r>
-              <a:rPr lang="de-AT" dirty="0"/>
-              <a:t> Container </a:t>
-            </a:r>
-            <a:r>
-              <a:rPr lang="de-AT" dirty="0" err="1"/>
-              <a:t>support</a:t>
-            </a:r>
-            <a:endParaRPr lang="de-AT" dirty="0"/>
-          </a:p>
-        </p:txBody>
-      </p:sp>
-      <p:sp>
-        <p:nvSpPr>
-          <p:cNvPr id="10" name="Text Placeholder 9"/>
-          <p:cNvSpPr>
-            <a:spLocks noGrp="1"/>
-          </p:cNvSpPr>
-          <p:nvPr>
-            <p:ph type="body" sz="quarter" idx="25"/>
-          </p:nvPr>
-        </p:nvSpPr>
-        <p:spPr/>
-        <p:txBody>
-          <a:bodyPr/>
-          <a:lstStyle/>
-          <a:p>
-            <a:endParaRPr lang="de-AT"/>
-          </a:p>
-        </p:txBody>
-      </p:sp>
-    </p:spTree>
-    <p:extLst>
-      <p:ext uri="{BB962C8B-B14F-4D97-AF65-F5344CB8AC3E}">
-        <p14:creationId xmlns:p14="http://schemas.microsoft.com/office/powerpoint/2010/main" val="3026475013"/>
       </p:ext>
     </p:extLst>
   </p:cSld>
@@ -31037,12 +30411,12 @@
       </p:grpSpPr>
       <p:sp>
         <p:nvSpPr>
-          <p:cNvPr id="2" name="Title 1"/>
+          <p:cNvPr id="5" name="Text Placeholder 4"/>
           <p:cNvSpPr>
             <a:spLocks noGrp="1"/>
           </p:cNvSpPr>
           <p:nvPr>
-            <p:ph type="title"/>
+            <p:ph type="body" sz="quarter" idx="16"/>
           </p:nvPr>
         </p:nvSpPr>
         <p:spPr/>
@@ -31052,14 +30426,106 @@
           <a:p>
             <a:r>
               <a:rPr lang="en-US" dirty="0"/>
-              <a:t>Docker on Azure</a:t>
+              <a:t>Windows Container</a:t>
             </a:r>
           </a:p>
         </p:txBody>
       </p:sp>
       <p:sp>
         <p:nvSpPr>
-          <p:cNvPr id="3" name="Text Placeholder 2"/>
+          <p:cNvPr id="6" name="Text Placeholder 5"/>
+          <p:cNvSpPr>
+            <a:spLocks noGrp="1"/>
+          </p:cNvSpPr>
+          <p:nvPr>
+            <p:ph type="body" sz="quarter" idx="24"/>
+          </p:nvPr>
+        </p:nvSpPr>
+        <p:spPr/>
+        <p:txBody>
+          <a:bodyPr/>
+          <a:lstStyle/>
+          <a:p>
+            <a:r>
+              <a:rPr lang="en-US" dirty="0"/>
+              <a:t>Nano Server with Docker</a:t>
+            </a:r>
+          </a:p>
+          <a:p>
+            <a:pPr lvl="1"/>
+            <a:r>
+              <a:rPr lang="en-US" dirty="0"/>
+              <a:t>Setup (PowerShell)</a:t>
+            </a:r>
+          </a:p>
+          <a:p>
+            <a:pPr lvl="1"/>
+            <a:r>
+              <a:rPr lang="en-US" dirty="0"/>
+              <a:t>Hyper-V</a:t>
+            </a:r>
+          </a:p>
+          <a:p>
+            <a:r>
+              <a:rPr lang="en-US" dirty="0"/>
+              <a:t>Connect Docker client</a:t>
+            </a:r>
+          </a:p>
+          <a:p>
+            <a:pPr lvl="1"/>
+            <a:r>
+              <a:rPr lang="en-US" dirty="0"/>
+              <a:t>Docker client on Host</a:t>
+            </a:r>
+          </a:p>
+          <a:p>
+            <a:pPr lvl="1"/>
+            <a:r>
+              <a:rPr lang="en-US" dirty="0"/>
+              <a:t>Remote Docker client</a:t>
+            </a:r>
+          </a:p>
+          <a:p>
+            <a:r>
+              <a:rPr lang="en-US" dirty="0"/>
+              <a:t>Container scenarios</a:t>
+            </a:r>
+          </a:p>
+          <a:p>
+            <a:pPr lvl="1"/>
+            <a:r>
+              <a:rPr lang="en-US" dirty="0"/>
+              <a:t>Interactive container</a:t>
+            </a:r>
+          </a:p>
+          <a:p>
+            <a:pPr lvl="1"/>
+            <a:r>
+              <a:rPr lang="en-US" dirty="0" err="1">
+                <a:hlinkClick r:id="rId2"/>
+              </a:rPr>
+              <a:t>Dockerfiles</a:t>
+            </a:r>
+            <a:r>
+              <a:rPr lang="en-US" dirty="0">
+                <a:hlinkClick r:id="rId2"/>
+              </a:rPr>
+              <a:t> on Windows</a:t>
+            </a:r>
+            <a:endParaRPr lang="en-US" dirty="0"/>
+          </a:p>
+          <a:p>
+            <a:pPr lvl="1"/>
+            <a:r>
+              <a:rPr lang="en-US" dirty="0"/>
+              <a:t>Volume mapping</a:t>
+            </a:r>
+          </a:p>
+        </p:txBody>
+      </p:sp>
+      <p:sp>
+        <p:nvSpPr>
+          <p:cNvPr id="7" name="Text Placeholder 6"/>
           <p:cNvSpPr>
             <a:spLocks noGrp="1"/>
           </p:cNvSpPr>
@@ -31072,40 +30538,47 @@
           <a:bodyPr/>
           <a:lstStyle/>
           <a:p>
-            <a:r>
-              <a:rPr lang="en-US" dirty="0"/>
-              <a:t>Running containers in Azure</a:t>
-            </a:r>
+            <a:endParaRPr lang="en-US" dirty="0"/>
+          </a:p>
+        </p:txBody>
+      </p:sp>
+      <p:sp>
+        <p:nvSpPr>
+          <p:cNvPr id="8" name="Text Placeholder 7"/>
+          <p:cNvSpPr>
+            <a:spLocks noGrp="1"/>
+          </p:cNvSpPr>
+          <p:nvPr>
+            <p:ph type="body" sz="quarter" idx="26"/>
+          </p:nvPr>
+        </p:nvSpPr>
+        <p:spPr/>
+        <p:txBody>
+          <a:bodyPr/>
+          <a:lstStyle/>
+          <a:p>
+            <a:endParaRPr lang="en-US" dirty="0"/>
           </a:p>
         </p:txBody>
       </p:sp>
     </p:spTree>
     <p:extLst>
       <p:ext uri="{BB962C8B-B14F-4D97-AF65-F5344CB8AC3E}">
-        <p14:creationId xmlns:p14="http://schemas.microsoft.com/office/powerpoint/2010/main" val="2753095540"/>
+        <p14:creationId xmlns:p14="http://schemas.microsoft.com/office/powerpoint/2010/main" val="1144713619"/>
       </p:ext>
     </p:extLst>
   </p:cSld>
   <p:clrMapOvr>
     <a:masterClrMapping/>
   </p:clrMapOvr>
-  <mc:AlternateContent xmlns:mc="http://schemas.openxmlformats.org/markup-compatibility/2006" xmlns:p14="http://schemas.microsoft.com/office/powerpoint/2010/main">
-    <mc:Choice Requires="p14">
-      <p:transition spd="med" p14:dur="700">
-        <p:fade/>
-      </p:transition>
-    </mc:Choice>
-    <mc:Fallback xmlns="">
-      <p:transition spd="med">
-        <p:fade/>
-      </p:transition>
-    </mc:Fallback>
-  </mc:AlternateContent>
+  <p:transition spd="slow">
+    <p:push/>
+  </p:transition>
 </p:sld>
 </file>
 
 <file path=ppt/slides/slide17.xml><?xml version="1.0" encoding="utf-8"?>
-<p:sld xmlns:a="http://schemas.openxmlformats.org/drawingml/2006/main" xmlns:r="http://schemas.openxmlformats.org/officeDocument/2006/relationships" xmlns:p="http://schemas.openxmlformats.org/presentationml/2006/main">
+<p:sld xmlns:a="http://schemas.openxmlformats.org/drawingml/2006/main" xmlns:r="http://schemas.openxmlformats.org/officeDocument/2006/relationships" xmlns:p="http://schemas.openxmlformats.org/presentationml/2006/main" show="0">
   <p:cSld>
     <p:spTree>
       <p:nvGrpSpPr>
@@ -31123,7 +30596,7 @@
       </p:grpSpPr>
       <p:sp>
         <p:nvSpPr>
-          <p:cNvPr id="4" name="Title 3"/>
+          <p:cNvPr id="6" name="Title 5"/>
           <p:cNvSpPr>
             <a:spLocks noGrp="1"/>
           </p:cNvSpPr>
@@ -31137,20 +30610,20 @@
           <a:lstStyle/>
           <a:p>
             <a:r>
-              <a:rPr lang="en-US" dirty="0"/>
-              <a:t>Docker on Azure</a:t>
+              <a:rPr lang="de-AT" dirty="0"/>
+              <a:t>Demo</a:t>
             </a:r>
           </a:p>
         </p:txBody>
       </p:sp>
       <p:sp>
         <p:nvSpPr>
-          <p:cNvPr id="5" name="Content Placeholder 4"/>
+          <p:cNvPr id="7" name="Content Placeholder 6"/>
           <p:cNvSpPr>
             <a:spLocks noGrp="1"/>
           </p:cNvSpPr>
           <p:nvPr>
-            <p:ph sz="quarter" idx="12"/>
+            <p:ph sz="quarter" idx="22"/>
           </p:nvPr>
         </p:nvSpPr>
         <p:spPr/>
@@ -31159,104 +30632,162 @@
           <a:lstStyle/>
           <a:p>
             <a:r>
-              <a:rPr lang="en-US" dirty="0"/>
-              <a:t>Docker support in </a:t>
-            </a:r>
-            <a:r>
-              <a:rPr lang="en-US" i="1" dirty="0"/>
-              <a:t>Azure Resource Manager</a:t>
-            </a:r>
-            <a:r>
-              <a:rPr lang="en-US" dirty="0"/>
-              <a:t> (ARM)</a:t>
-            </a:r>
-            <a:endParaRPr lang="en-US" dirty="0">
-              <a:hlinkClick r:id="rId2"/>
-            </a:endParaRPr>
-          </a:p>
-          <a:p>
-            <a:pPr lvl="1"/>
-            <a:r>
-              <a:rPr lang="en-US" dirty="0">
+              <a:rPr lang="en-US" i="1" noProof="1"/>
+              <a:t># Ping Docker host on Nano Server</a:t>
+            </a:r>
+          </a:p>
+          <a:p>
+            <a:r>
+              <a:rPr lang="en-US" noProof="1"/>
+              <a:t>docker -H tcp://169.254.165.219:2375 info</a:t>
+            </a:r>
+          </a:p>
+          <a:p>
+            <a:r>
+              <a:rPr lang="en-US" noProof="1"/>
+              <a:t>set DOCKER_HOST=tcp://169.254.165.219:2375</a:t>
+            </a:r>
+          </a:p>
+          <a:p>
+            <a:r>
+              <a:rPr lang="en-US" noProof="1"/>
+              <a:t>docker info</a:t>
+            </a:r>
+          </a:p>
+          <a:p>
+            <a:r>
+              <a:rPr lang="en-US" noProof="1"/>
+              <a:t>docker ps -a</a:t>
+            </a:r>
+          </a:p>
+          <a:p>
+            <a:r>
+              <a:rPr lang="en-US" noProof="1"/>
+              <a:t>docker images</a:t>
+            </a:r>
+          </a:p>
+          <a:p>
+            <a:endParaRPr lang="en-US" noProof="1"/>
+          </a:p>
+          <a:p>
+            <a:r>
+              <a:rPr lang="en-US" i="1" noProof="1"/>
+              <a:t># Run ’dir’ inside a short-lived Nano Server container</a:t>
+            </a:r>
+          </a:p>
+          <a:p>
+            <a:r>
+              <a:rPr lang="en-US" noProof="1"/>
+              <a:t>docker run -it --rm nanoserver cmd /C dir</a:t>
+            </a:r>
+          </a:p>
+          <a:p>
+            <a:endParaRPr lang="en-US" noProof="1"/>
+          </a:p>
+          <a:p>
+            <a:r>
+              <a:rPr lang="en-US" i="1" noProof="1"/>
+              <a:t># Run existing IIS image (source: Microsoft)</a:t>
+            </a:r>
+          </a:p>
+          <a:p>
+            <a:r>
+              <a:rPr lang="en-US" noProof="1"/>
+              <a:t>docker run -d -p 80:80 microsoft/iis cmd ping localhost -t</a:t>
+            </a:r>
+            <a:endParaRPr lang="en-US" noProof="1"/>
+          </a:p>
+          <a:p>
+            <a:endParaRPr lang="en-US" noProof="1"/>
+          </a:p>
+          <a:p>
+            <a:r>
+              <a:rPr lang="en-US" i="1" noProof="1"/>
+              <a:t># Build Dockerfile, install IIS (details about IIS on Nano see </a:t>
+            </a:r>
+            <a:br>
+              <a:rPr lang="en-US" i="1" noProof="1"/>
+            </a:br>
+            <a:r>
+              <a:rPr lang="en-US" i="1" noProof="1"/>
+              <a:t># </a:t>
+            </a:r>
+            <a:r>
+              <a:rPr lang="en-US" i="1" noProof="1">
                 <a:hlinkClick r:id="rId2"/>
               </a:rPr>
-              <a:t>Extension for Docker on Linux</a:t>
-            </a:r>
-            <a:endParaRPr lang="en-US" dirty="0"/>
-          </a:p>
-          <a:p>
-            <a:pPr lvl="1"/>
-            <a:r>
-              <a:rPr lang="en-US" dirty="0">
-                <a:hlinkClick r:id="rId3"/>
-              </a:rPr>
-              <a:t>Ready-made ARM-templates</a:t>
-            </a:r>
-            <a:r>
-              <a:rPr lang="en-US" dirty="0"/>
-              <a:t> (e.g. </a:t>
-            </a:r>
-            <a:r>
-              <a:rPr lang="en-US" dirty="0">
-                <a:hlinkClick r:id="rId4"/>
-              </a:rPr>
-              <a:t>Docker on Ubuntu</a:t>
-            </a:r>
-            <a:r>
-              <a:rPr lang="en-US" dirty="0"/>
+              <a:t>https://technet.microsoft.com/en-us/library/mt627783.aspx</a:t>
+            </a:r>
+            <a:r>
+              <a:rPr lang="en-US" i="1" noProof="1"/>
               <a:t>)</a:t>
             </a:r>
           </a:p>
           <a:p>
-            <a:pPr marL="13800"/>
-            <a:r>
-              <a:rPr lang="en-US" dirty="0">
-                <a:hlinkClick r:id="rId5"/>
-              </a:rPr>
-              <a:t>Azure driver</a:t>
-            </a:r>
-            <a:r>
-              <a:rPr lang="en-US" dirty="0"/>
-              <a:t> for </a:t>
-            </a:r>
-            <a:r>
-              <a:rPr lang="en-US" i="1" dirty="0"/>
-              <a:t>Docker Machine</a:t>
-            </a:r>
-          </a:p>
-          <a:p>
-            <a:r>
-              <a:rPr lang="en-US" dirty="0">
-                <a:hlinkClick r:id="rId6"/>
-              </a:rPr>
-              <a:t>Azure Container Services (ACS)</a:t>
-            </a:r>
-            <a:endParaRPr lang="en-US" dirty="0"/>
-          </a:p>
-          <a:p>
-            <a:r>
-              <a:rPr lang="en-US" dirty="0"/>
-              <a:t>Storage</a:t>
-            </a:r>
-            <a:endParaRPr lang="en-US" dirty="0">
-              <a:hlinkClick r:id="rId7"/>
-            </a:endParaRPr>
-          </a:p>
-          <a:p>
-            <a:pPr lvl="1"/>
-            <a:r>
-              <a:rPr lang="en-US" dirty="0">
-                <a:hlinkClick r:id="rId7"/>
-              </a:rPr>
-              <a:t>Docker Volume Driver for Azure File Storage</a:t>
-            </a:r>
-            <a:endParaRPr lang="en-US" dirty="0"/>
+            <a:r>
+              <a:rPr lang="en-US" noProof="1"/>
+              <a:t>docker build -t myiis .</a:t>
+            </a:r>
+          </a:p>
+          <a:p>
+            <a:r>
+              <a:rPr lang="en-US" noProof="1"/>
+              <a:t>docker images</a:t>
+            </a:r>
+          </a:p>
+          <a:p>
+            <a:r>
+              <a:rPr lang="en-US" noProof="1"/>
+              <a:t>docker run -it --rm myiis</a:t>
+            </a:r>
+          </a:p>
+          <a:p>
+            <a:r>
+              <a:rPr lang="en-US" noProof="1"/>
+              <a:t>cd \install</a:t>
+            </a:r>
+          </a:p>
+          <a:p>
+            <a:r>
+              <a:rPr lang="en-US" noProof="1"/>
+              <a:t>dism /online /apply-unattend:.\unattend.xml</a:t>
+            </a:r>
+          </a:p>
+          <a:p>
+            <a:r>
+              <a:rPr lang="en-US" noProof="1"/>
+              <a:t>net start w3svc</a:t>
+            </a:r>
+          </a:p>
+          <a:p>
+            <a:endParaRPr lang="en-US" noProof="1"/>
+          </a:p>
+          <a:p>
+            <a:r>
+              <a:rPr lang="en-US" i="1" noProof="1"/>
+              <a:t># On Docker host (Enter-PSSession)</a:t>
+            </a:r>
+          </a:p>
+          <a:p>
+            <a:r>
+              <a:rPr lang="en-US" noProof="1"/>
+              <a:t>echo Hello &gt; c:\temp\greeting.txt</a:t>
+            </a:r>
+          </a:p>
+          <a:p>
+            <a:r>
+              <a:rPr lang="en-US" noProof="1"/>
+              <a:t>c:\docker\docker.exe run --rm -v c:\temp:c:\somedir nanoserver cmd /C type \somedir\greeting.txt </a:t>
+            </a:r>
+          </a:p>
+          <a:p>
+            <a:endParaRPr lang="en-US" noProof="1"/>
           </a:p>
         </p:txBody>
       </p:sp>
       <p:sp>
         <p:nvSpPr>
-          <p:cNvPr id="6" name="Text Placeholder 5"/>
+          <p:cNvPr id="8" name="Text Placeholder 7"/>
           <p:cNvSpPr>
             <a:spLocks noGrp="1"/>
           </p:cNvSpPr>
@@ -31269,14 +30800,62 @@
           <a:bodyPr/>
           <a:lstStyle/>
           <a:p>
-            <a:endParaRPr lang="en-US" dirty="0"/>
+            <a:endParaRPr lang="de-AT"/>
+          </a:p>
+        </p:txBody>
+      </p:sp>
+      <p:sp>
+        <p:nvSpPr>
+          <p:cNvPr id="9" name="Text Placeholder 8"/>
+          <p:cNvSpPr>
+            <a:spLocks noGrp="1"/>
+          </p:cNvSpPr>
+          <p:nvPr>
+            <p:ph type="body" sz="quarter" idx="24"/>
+          </p:nvPr>
+        </p:nvSpPr>
+        <p:spPr/>
+        <p:txBody>
+          <a:bodyPr/>
+          <a:lstStyle/>
+          <a:p>
+            <a:r>
+              <a:rPr lang="en-US" dirty="0"/>
+              <a:t>Prerequisites</a:t>
+            </a:r>
+          </a:p>
+          <a:p>
+            <a:pPr lvl="1"/>
+            <a:r>
+              <a:rPr lang="en-US" dirty="0"/>
+              <a:t>Nano Server on Hyper-V with Container support</a:t>
+            </a:r>
+          </a:p>
+        </p:txBody>
+      </p:sp>
+      <p:sp>
+        <p:nvSpPr>
+          <p:cNvPr id="10" name="Text Placeholder 9"/>
+          <p:cNvSpPr>
+            <a:spLocks noGrp="1"/>
+          </p:cNvSpPr>
+          <p:nvPr>
+            <p:ph type="body" sz="quarter" idx="25"/>
+          </p:nvPr>
+        </p:nvSpPr>
+        <p:spPr/>
+        <p:txBody>
+          <a:bodyPr/>
+          <a:lstStyle/>
+          <a:p>
+            <a:endParaRPr lang="de-AT"/>
           </a:p>
         </p:txBody>
       </p:sp>
     </p:spTree>
     <p:extLst>
       <p:ext uri="{BB962C8B-B14F-4D97-AF65-F5344CB8AC3E}">
-        <p14:creationId xmlns:p14="http://schemas.microsoft.com/office/powerpoint/2010/main" val="3067379427"/>
+        <p14:creationId xmlns:p14="http://schemas.microsoft.com/office/powerpoint/2010/main" val="3026475013"/>
       </p:ext>
     </p:extLst>
   </p:cSld>
@@ -31308,12 +30887,12 @@
       </p:grpSpPr>
       <p:sp>
         <p:nvSpPr>
-          <p:cNvPr id="5" name="Text Placeholder 4"/>
+          <p:cNvPr id="2" name="Title 1"/>
           <p:cNvSpPr>
             <a:spLocks noGrp="1"/>
           </p:cNvSpPr>
           <p:nvPr>
-            <p:ph type="body" sz="quarter" idx="16"/>
+            <p:ph type="title"/>
           </p:nvPr>
         </p:nvSpPr>
         <p:spPr/>
@@ -31323,70 +30902,14 @@
           <a:p>
             <a:r>
               <a:rPr lang="en-US" dirty="0"/>
-              <a:t>Containers in Azure</a:t>
+              <a:t>Docker on Azure</a:t>
             </a:r>
           </a:p>
         </p:txBody>
       </p:sp>
       <p:sp>
         <p:nvSpPr>
-          <p:cNvPr id="6" name="Text Placeholder 5"/>
-          <p:cNvSpPr>
-            <a:spLocks noGrp="1"/>
-          </p:cNvSpPr>
-          <p:nvPr>
-            <p:ph type="body" sz="quarter" idx="24"/>
-          </p:nvPr>
-        </p:nvSpPr>
-        <p:spPr/>
-        <p:txBody>
-          <a:bodyPr/>
-          <a:lstStyle/>
-          <a:p>
-            <a:r>
-              <a:rPr lang="en-US" dirty="0"/>
-              <a:t>Docker Machine</a:t>
-            </a:r>
-          </a:p>
-          <a:p>
-            <a:pPr lvl="1"/>
-            <a:r>
-              <a:rPr lang="en-US" dirty="0"/>
-              <a:t>Azure Driver</a:t>
-            </a:r>
-          </a:p>
-          <a:p>
-            <a:r>
-              <a:rPr lang="en-US" dirty="0"/>
-              <a:t>ARM with Docker</a:t>
-            </a:r>
-          </a:p>
-          <a:p>
-            <a:pPr lvl="1"/>
-            <a:r>
-              <a:rPr lang="en-US" dirty="0"/>
-              <a:t>Using </a:t>
-            </a:r>
-            <a:r>
-              <a:rPr lang="en-US" dirty="0" err="1"/>
-              <a:t>Quickstart</a:t>
-            </a:r>
-            <a:r>
-              <a:rPr lang="en-US" dirty="0"/>
-              <a:t> Template</a:t>
-            </a:r>
-          </a:p>
-          <a:p>
-            <a:r>
-              <a:rPr lang="en-US" dirty="0"/>
-              <a:t>Volume driver for Files</a:t>
-            </a:r>
-          </a:p>
-        </p:txBody>
-      </p:sp>
-      <p:sp>
-        <p:nvSpPr>
-          <p:cNvPr id="7" name="Text Placeholder 6"/>
+          <p:cNvPr id="3" name="Text Placeholder 2"/>
           <p:cNvSpPr>
             <a:spLocks noGrp="1"/>
           </p:cNvSpPr>
@@ -31399,47 +30922,40 @@
           <a:bodyPr/>
           <a:lstStyle/>
           <a:p>
-            <a:endParaRPr lang="en-US" dirty="0"/>
-          </a:p>
-        </p:txBody>
-      </p:sp>
-      <p:sp>
-        <p:nvSpPr>
-          <p:cNvPr id="8" name="Text Placeholder 7"/>
-          <p:cNvSpPr>
-            <a:spLocks noGrp="1"/>
-          </p:cNvSpPr>
-          <p:nvPr>
-            <p:ph type="body" sz="quarter" idx="26"/>
-          </p:nvPr>
-        </p:nvSpPr>
-        <p:spPr/>
-        <p:txBody>
-          <a:bodyPr/>
-          <a:lstStyle/>
-          <a:p>
-            <a:endParaRPr lang="en-US" dirty="0"/>
+            <a:r>
+              <a:rPr lang="en-US" dirty="0"/>
+              <a:t>Running containers in Azure</a:t>
+            </a:r>
           </a:p>
         </p:txBody>
       </p:sp>
     </p:spTree>
     <p:extLst>
       <p:ext uri="{BB962C8B-B14F-4D97-AF65-F5344CB8AC3E}">
-        <p14:creationId xmlns:p14="http://schemas.microsoft.com/office/powerpoint/2010/main" val="2339745574"/>
+        <p14:creationId xmlns:p14="http://schemas.microsoft.com/office/powerpoint/2010/main" val="2753095540"/>
       </p:ext>
     </p:extLst>
   </p:cSld>
   <p:clrMapOvr>
     <a:masterClrMapping/>
   </p:clrMapOvr>
-  <p:transition spd="slow">
-    <p:push/>
-  </p:transition>
+  <mc:AlternateContent xmlns:mc="http://schemas.openxmlformats.org/markup-compatibility/2006" xmlns:p14="http://schemas.microsoft.com/office/powerpoint/2010/main">
+    <mc:Choice Requires="p14">
+      <p:transition spd="med" p14:dur="700">
+        <p:fade/>
+      </p:transition>
+    </mc:Choice>
+    <mc:Fallback xmlns="">
+      <p:transition spd="med">
+        <p:fade/>
+      </p:transition>
+    </mc:Fallback>
+  </mc:AlternateContent>
 </p:sld>
 </file>
 
 <file path=ppt/slides/slide19.xml><?xml version="1.0" encoding="utf-8"?>
-<p:sld xmlns:a="http://schemas.openxmlformats.org/drawingml/2006/main" xmlns:r="http://schemas.openxmlformats.org/officeDocument/2006/relationships" xmlns:p="http://schemas.openxmlformats.org/presentationml/2006/main" show="0">
+<p:sld xmlns:a="http://schemas.openxmlformats.org/drawingml/2006/main" xmlns:r="http://schemas.openxmlformats.org/officeDocument/2006/relationships" xmlns:p="http://schemas.openxmlformats.org/presentationml/2006/main">
   <p:cSld>
     <p:spTree>
       <p:nvGrpSpPr>
@@ -31457,7 +30973,7 @@
       </p:grpSpPr>
       <p:sp>
         <p:nvSpPr>
-          <p:cNvPr id="6" name="Title 5"/>
+          <p:cNvPr id="4" name="Title 3"/>
           <p:cNvSpPr>
             <a:spLocks noGrp="1"/>
           </p:cNvSpPr>
@@ -31471,20 +30987,20 @@
           <a:lstStyle/>
           <a:p>
             <a:r>
-              <a:rPr lang="de-AT" dirty="0"/>
-              <a:t>Demo</a:t>
+              <a:rPr lang="en-US" dirty="0"/>
+              <a:t>Docker on Azure</a:t>
             </a:r>
           </a:p>
         </p:txBody>
       </p:sp>
       <p:sp>
         <p:nvSpPr>
-          <p:cNvPr id="7" name="Content Placeholder 6"/>
+          <p:cNvPr id="5" name="Content Placeholder 4"/>
           <p:cNvSpPr>
             <a:spLocks noGrp="1"/>
           </p:cNvSpPr>
           <p:nvPr>
-            <p:ph sz="quarter" idx="22"/>
+            <p:ph sz="quarter" idx="12"/>
           </p:nvPr>
         </p:nvSpPr>
         <p:spPr/>
@@ -31493,161 +31009,104 @@
           <a:lstStyle/>
           <a:p>
             <a:r>
-              <a:rPr lang="de-AT" dirty="0" err="1"/>
-              <a:t>docker-machine</a:t>
-            </a:r>
-            <a:r>
-              <a:rPr lang="de-AT" dirty="0"/>
-              <a:t> </a:t>
-            </a:r>
-            <a:r>
-              <a:rPr lang="de-AT" dirty="0" err="1"/>
-              <a:t>create</a:t>
-            </a:r>
-            <a:r>
-              <a:rPr lang="de-AT" dirty="0"/>
-              <a:t> --driver </a:t>
-            </a:r>
-            <a:r>
-              <a:rPr lang="de-AT" dirty="0" err="1"/>
-              <a:t>azure</a:t>
-            </a:r>
-            <a:r>
-              <a:rPr lang="de-AT" dirty="0"/>
-              <a:t> --</a:t>
-            </a:r>
-            <a:r>
-              <a:rPr lang="de-AT" dirty="0" err="1"/>
-              <a:t>azure-subscription-id</a:t>
-            </a:r>
-            <a:r>
-              <a:rPr lang="de-AT" dirty="0"/>
-              <a:t> 00000000-0000-0000-0000-000000000000 doc16-demo</a:t>
-            </a:r>
-          </a:p>
-          <a:p>
-            <a:r>
-              <a:rPr lang="de-AT" i="1" dirty="0"/>
-              <a:t># Show </a:t>
-            </a:r>
-            <a:r>
-              <a:rPr lang="de-AT" i="1" dirty="0" err="1"/>
-              <a:t>result</a:t>
-            </a:r>
-            <a:r>
-              <a:rPr lang="de-AT" i="1" dirty="0"/>
-              <a:t> in Azure Portal</a:t>
-            </a:r>
-          </a:p>
-          <a:p>
-            <a:endParaRPr lang="sv-SE" dirty="0"/>
-          </a:p>
-          <a:p>
-            <a:r>
-              <a:rPr lang="sv-SE" i="1" dirty="0"/>
-              <a:t># Create volume on Azure files</a:t>
-            </a:r>
-          </a:p>
-          <a:p>
-            <a:r>
-              <a:rPr lang="sv-SE" dirty="0"/>
-              <a:t>docker volume ls</a:t>
-            </a:r>
-          </a:p>
-          <a:p>
-            <a:r>
-              <a:rPr lang="en-US" dirty="0" err="1"/>
-              <a:t>docker</a:t>
-            </a:r>
-            <a:r>
               <a:rPr lang="en-US" dirty="0"/>
-              <a:t> volume create -d </a:t>
-            </a:r>
-            <a:r>
-              <a:rPr lang="en-US" dirty="0" err="1"/>
-              <a:t>azurefile</a:t>
+              <a:t>Docker support in </a:t>
+            </a:r>
+            <a:r>
+              <a:rPr lang="en-US" i="1" dirty="0"/>
+              <a:t>Azure Resource Manager</a:t>
             </a:r>
             <a:r>
               <a:rPr lang="en-US" dirty="0"/>
-              <a:t> --name </a:t>
-            </a:r>
-            <a:r>
-              <a:rPr lang="en-US" dirty="0" err="1"/>
-              <a:t>myvol</a:t>
+              <a:t> (ARM)</a:t>
+            </a:r>
+            <a:endParaRPr lang="en-US" dirty="0">
+              <a:hlinkClick r:id="rId2"/>
+            </a:endParaRPr>
+          </a:p>
+          <a:p>
+            <a:pPr lvl="1"/>
+            <a:r>
+              <a:rPr lang="en-US" dirty="0">
+                <a:hlinkClick r:id="rId2"/>
+              </a:rPr>
+              <a:t>Extension for Docker on Linux</a:t>
+            </a:r>
+            <a:endParaRPr lang="en-US" dirty="0"/>
+          </a:p>
+          <a:p>
+            <a:pPr lvl="1"/>
+            <a:r>
+              <a:rPr lang="en-US" dirty="0">
+                <a:hlinkClick r:id="rId3"/>
+              </a:rPr>
+              <a:t>Ready-made ARM-templates</a:t>
             </a:r>
             <a:r>
               <a:rPr lang="en-US" dirty="0"/>
-              <a:t> -o share=doc16</a:t>
-            </a:r>
-          </a:p>
-          <a:p>
-            <a:r>
-              <a:rPr lang="sv-SE" dirty="0"/>
-              <a:t>docker volume ls</a:t>
-            </a:r>
-          </a:p>
-          <a:p>
-            <a:r>
-              <a:rPr lang="en-US" dirty="0" err="1"/>
-              <a:t>docker</a:t>
+              <a:t> (e.g. </a:t>
+            </a:r>
+            <a:r>
+              <a:rPr lang="en-US" dirty="0">
+                <a:hlinkClick r:id="rId4"/>
+              </a:rPr>
+              <a:t>Docker on Ubuntu</a:t>
             </a:r>
             <a:r>
               <a:rPr lang="en-US" dirty="0"/>
-              <a:t> run -it --</a:t>
-            </a:r>
-            <a:r>
-              <a:rPr lang="en-US" dirty="0" err="1"/>
-              <a:t>rm</a:t>
+              <a:t>)</a:t>
+            </a:r>
+          </a:p>
+          <a:p>
+            <a:pPr marL="13800"/>
+            <a:r>
+              <a:rPr lang="en-US" dirty="0">
+                <a:hlinkClick r:id="rId5"/>
+              </a:rPr>
+              <a:t>Azure driver</a:t>
             </a:r>
             <a:r>
               <a:rPr lang="en-US" dirty="0"/>
-              <a:t> -v </a:t>
-            </a:r>
-            <a:r>
-              <a:rPr lang="en-US" dirty="0" err="1"/>
-              <a:t>myvol</a:t>
-            </a:r>
+              <a:t> for </a:t>
+            </a:r>
+            <a:r>
+              <a:rPr lang="en-US" i="1" dirty="0"/>
+              <a:t>Docker Machine</a:t>
+            </a:r>
+          </a:p>
+          <a:p>
+            <a:r>
+              <a:rPr lang="en-US" dirty="0">
+                <a:hlinkClick r:id="rId6"/>
+              </a:rPr>
+              <a:t>Azure Container Services (ACS)</a:t>
+            </a:r>
+            <a:endParaRPr lang="en-US" dirty="0"/>
+          </a:p>
+          <a:p>
             <a:r>
               <a:rPr lang="en-US" dirty="0"/>
-              <a:t>:/data </a:t>
-            </a:r>
-            <a:r>
-              <a:rPr lang="en-US" dirty="0" err="1"/>
-              <a:t>ubuntu</a:t>
-            </a:r>
-            <a:r>
-              <a:rPr lang="en-US" dirty="0"/>
-              <a:t> /bin/bash</a:t>
-            </a:r>
-          </a:p>
-          <a:p>
-            <a:r>
-              <a:rPr lang="en-US" dirty="0"/>
-              <a:t>	cd /data</a:t>
-            </a:r>
-          </a:p>
-          <a:p>
-            <a:r>
-              <a:rPr lang="en-US" dirty="0"/>
-              <a:t>	echo Hello &gt; greeting.txt</a:t>
-            </a:r>
-          </a:p>
-          <a:p>
-            <a:r>
-              <a:rPr lang="en-US" i="1" dirty="0"/>
-              <a:t>	# Show result </a:t>
-            </a:r>
-            <a:r>
-              <a:rPr lang="en-US" i="1"/>
-              <a:t>in Azure Portal</a:t>
-            </a:r>
-            <a:endParaRPr lang="en-US" i="1" dirty="0"/>
+              <a:t>Storage</a:t>
+            </a:r>
+            <a:endParaRPr lang="en-US" dirty="0">
+              <a:hlinkClick r:id="rId7"/>
+            </a:endParaRPr>
+          </a:p>
+          <a:p>
+            <a:pPr lvl="1"/>
+            <a:r>
+              <a:rPr lang="en-US" dirty="0">
+                <a:hlinkClick r:id="rId7"/>
+              </a:rPr>
+              <a:t>Docker Volume Driver for Azure File Storage</a:t>
+            </a:r>
+            <a:endParaRPr lang="en-US" dirty="0"/>
           </a:p>
         </p:txBody>
       </p:sp>
       <p:sp>
         <p:nvSpPr>
-          <p:cNvPr id="8" name="Text Placeholder 7"/>
+          <p:cNvPr id="6" name="Text Placeholder 5"/>
           <p:cNvSpPr>
             <a:spLocks noGrp="1"/>
           </p:cNvSpPr>
@@ -31660,112 +31119,14 @@
           <a:bodyPr/>
           <a:lstStyle/>
           <a:p>
-            <a:endParaRPr lang="de-AT"/>
-          </a:p>
-        </p:txBody>
-      </p:sp>
-      <p:sp>
-        <p:nvSpPr>
-          <p:cNvPr id="9" name="Text Placeholder 8"/>
-          <p:cNvSpPr>
-            <a:spLocks noGrp="1"/>
-          </p:cNvSpPr>
-          <p:nvPr>
-            <p:ph type="body" sz="quarter" idx="24"/>
-          </p:nvPr>
-        </p:nvSpPr>
-        <p:spPr/>
-        <p:txBody>
-          <a:bodyPr/>
-          <a:lstStyle/>
-          <a:p>
-            <a:r>
-              <a:rPr lang="de-AT" dirty="0" err="1"/>
-              <a:t>Prerequisites</a:t>
-            </a:r>
-            <a:endParaRPr lang="de-AT" dirty="0"/>
-          </a:p>
-          <a:p>
-            <a:pPr lvl="1"/>
-            <a:r>
-              <a:rPr lang="de-AT" dirty="0"/>
-              <a:t>Docker </a:t>
-            </a:r>
-            <a:r>
-              <a:rPr lang="de-AT" dirty="0" err="1"/>
-              <a:t>Machine</a:t>
-            </a:r>
-            <a:r>
-              <a:rPr lang="de-AT" dirty="0"/>
-              <a:t> </a:t>
-            </a:r>
-            <a:r>
-              <a:rPr lang="de-AT" dirty="0" err="1"/>
-              <a:t>installed</a:t>
-            </a:r>
-            <a:endParaRPr lang="de-AT" dirty="0"/>
-          </a:p>
-          <a:p>
-            <a:pPr lvl="1"/>
-            <a:r>
-              <a:rPr lang="de-AT" dirty="0"/>
-              <a:t>Docker Driver </a:t>
-            </a:r>
-            <a:r>
-              <a:rPr lang="de-AT" dirty="0" err="1"/>
-              <a:t>for</a:t>
-            </a:r>
-            <a:r>
-              <a:rPr lang="de-AT" dirty="0"/>
-              <a:t> Azure Files </a:t>
-            </a:r>
-            <a:r>
-              <a:rPr lang="de-AT" dirty="0" err="1"/>
-              <a:t>installed</a:t>
-            </a:r>
-            <a:r>
-              <a:rPr lang="de-AT" dirty="0"/>
-              <a:t> </a:t>
-            </a:r>
-            <a:r>
-              <a:rPr lang="de-AT" dirty="0" err="1"/>
-              <a:t>and</a:t>
-            </a:r>
-            <a:r>
-              <a:rPr lang="de-AT" dirty="0"/>
-              <a:t> </a:t>
-            </a:r>
-            <a:r>
-              <a:rPr lang="de-AT" dirty="0" err="1"/>
-              <a:t>configured</a:t>
-            </a:r>
-            <a:endParaRPr lang="de-AT" dirty="0"/>
-          </a:p>
-        </p:txBody>
-      </p:sp>
-      <p:sp>
-        <p:nvSpPr>
-          <p:cNvPr id="10" name="Text Placeholder 9"/>
-          <p:cNvSpPr>
-            <a:spLocks noGrp="1"/>
-          </p:cNvSpPr>
-          <p:nvPr>
-            <p:ph type="body" sz="quarter" idx="25"/>
-          </p:nvPr>
-        </p:nvSpPr>
-        <p:spPr/>
-        <p:txBody>
-          <a:bodyPr/>
-          <a:lstStyle/>
-          <a:p>
-            <a:endParaRPr lang="de-AT"/>
+            <a:endParaRPr lang="en-US" dirty="0"/>
           </a:p>
         </p:txBody>
       </p:sp>
     </p:spTree>
     <p:extLst>
       <p:ext uri="{BB962C8B-B14F-4D97-AF65-F5344CB8AC3E}">
-        <p14:creationId xmlns:p14="http://schemas.microsoft.com/office/powerpoint/2010/main" val="3933312432"/>
+        <p14:creationId xmlns:p14="http://schemas.microsoft.com/office/powerpoint/2010/main" val="3067379427"/>
       </p:ext>
     </p:extLst>
   </p:cSld>
@@ -31848,14 +31209,28 @@
             <a:pPr lvl="1"/>
             <a:r>
               <a:rPr lang="en-US" dirty="0"/>
-              <a:t>Azure MVP, MS Regional Director</a:t>
+              <a:t>MVP Microsoft Azure</a:t>
             </a:r>
           </a:p>
           <a:p>
             <a:pPr lvl="1"/>
             <a:r>
               <a:rPr lang="en-US" dirty="0"/>
-              <a:t>IT-Visions</a:t>
+              <a:t>MVP Development Technologies</a:t>
+            </a:r>
+          </a:p>
+          <a:p>
+            <a:pPr lvl="1"/>
+            <a:r>
+              <a:rPr lang="en-US" dirty="0"/>
+              <a:t>MS Regional Director</a:t>
+            </a:r>
+          </a:p>
+          <a:p>
+            <a:pPr lvl="1"/>
+            <a:r>
+              <a:rPr lang="en-US" dirty="0"/>
+              <a:t>Senior Consultant IT-Visions</a:t>
             </a:r>
           </a:p>
           <a:p>
@@ -32009,6 +31384,495 @@
       </p:grpSpPr>
       <p:sp>
         <p:nvSpPr>
+          <p:cNvPr id="5" name="Text Placeholder 4"/>
+          <p:cNvSpPr>
+            <a:spLocks noGrp="1"/>
+          </p:cNvSpPr>
+          <p:nvPr>
+            <p:ph type="body" sz="quarter" idx="16"/>
+          </p:nvPr>
+        </p:nvSpPr>
+        <p:spPr/>
+        <p:txBody>
+          <a:bodyPr/>
+          <a:lstStyle/>
+          <a:p>
+            <a:r>
+              <a:rPr lang="en-US" dirty="0"/>
+              <a:t>Containers in Azure</a:t>
+            </a:r>
+          </a:p>
+        </p:txBody>
+      </p:sp>
+      <p:sp>
+        <p:nvSpPr>
+          <p:cNvPr id="6" name="Text Placeholder 5"/>
+          <p:cNvSpPr>
+            <a:spLocks noGrp="1"/>
+          </p:cNvSpPr>
+          <p:nvPr>
+            <p:ph type="body" sz="quarter" idx="24"/>
+          </p:nvPr>
+        </p:nvSpPr>
+        <p:spPr/>
+        <p:txBody>
+          <a:bodyPr/>
+          <a:lstStyle/>
+          <a:p>
+            <a:r>
+              <a:rPr lang="en-US" dirty="0"/>
+              <a:t>Docker Machine</a:t>
+            </a:r>
+          </a:p>
+          <a:p>
+            <a:pPr lvl="1"/>
+            <a:r>
+              <a:rPr lang="en-US" dirty="0"/>
+              <a:t>Azure Driver</a:t>
+            </a:r>
+          </a:p>
+          <a:p>
+            <a:r>
+              <a:rPr lang="en-US" dirty="0"/>
+              <a:t>ARM with Docker</a:t>
+            </a:r>
+          </a:p>
+          <a:p>
+            <a:pPr lvl="1"/>
+            <a:r>
+              <a:rPr lang="en-US" dirty="0"/>
+              <a:t>Using </a:t>
+            </a:r>
+            <a:r>
+              <a:rPr lang="en-US" dirty="0" err="1"/>
+              <a:t>Quickstart</a:t>
+            </a:r>
+            <a:r>
+              <a:rPr lang="en-US" dirty="0"/>
+              <a:t> Template</a:t>
+            </a:r>
+          </a:p>
+          <a:p>
+            <a:r>
+              <a:rPr lang="en-US" dirty="0"/>
+              <a:t>Volume driver for Files</a:t>
+            </a:r>
+          </a:p>
+        </p:txBody>
+      </p:sp>
+      <p:sp>
+        <p:nvSpPr>
+          <p:cNvPr id="7" name="Text Placeholder 6"/>
+          <p:cNvSpPr>
+            <a:spLocks noGrp="1"/>
+          </p:cNvSpPr>
+          <p:nvPr>
+            <p:ph type="body" sz="quarter" idx="25"/>
+          </p:nvPr>
+        </p:nvSpPr>
+        <p:spPr/>
+        <p:txBody>
+          <a:bodyPr/>
+          <a:lstStyle/>
+          <a:p>
+            <a:endParaRPr lang="en-US" dirty="0"/>
+          </a:p>
+        </p:txBody>
+      </p:sp>
+      <p:sp>
+        <p:nvSpPr>
+          <p:cNvPr id="8" name="Text Placeholder 7"/>
+          <p:cNvSpPr>
+            <a:spLocks noGrp="1"/>
+          </p:cNvSpPr>
+          <p:nvPr>
+            <p:ph type="body" sz="quarter" idx="26"/>
+          </p:nvPr>
+        </p:nvSpPr>
+        <p:spPr/>
+        <p:txBody>
+          <a:bodyPr/>
+          <a:lstStyle/>
+          <a:p>
+            <a:endParaRPr lang="en-US" dirty="0"/>
+          </a:p>
+        </p:txBody>
+      </p:sp>
+    </p:spTree>
+    <p:extLst>
+      <p:ext uri="{BB962C8B-B14F-4D97-AF65-F5344CB8AC3E}">
+        <p14:creationId xmlns:p14="http://schemas.microsoft.com/office/powerpoint/2010/main" val="2339745574"/>
+      </p:ext>
+    </p:extLst>
+  </p:cSld>
+  <p:clrMapOvr>
+    <a:masterClrMapping/>
+  </p:clrMapOvr>
+  <p:transition spd="slow">
+    <p:push/>
+  </p:transition>
+</p:sld>
+</file>
+
+<file path=ppt/slides/slide21.xml><?xml version="1.0" encoding="utf-8"?>
+<p:sld xmlns:a="http://schemas.openxmlformats.org/drawingml/2006/main" xmlns:r="http://schemas.openxmlformats.org/officeDocument/2006/relationships" xmlns:p="http://schemas.openxmlformats.org/presentationml/2006/main" show="0">
+  <p:cSld>
+    <p:spTree>
+      <p:nvGrpSpPr>
+        <p:cNvPr id="1" name=""/>
+        <p:cNvGrpSpPr/>
+        <p:nvPr/>
+      </p:nvGrpSpPr>
+      <p:grpSpPr>
+        <a:xfrm>
+          <a:off x="0" y="0"/>
+          <a:ext cx="0" cy="0"/>
+          <a:chOff x="0" y="0"/>
+          <a:chExt cx="0" cy="0"/>
+        </a:xfrm>
+      </p:grpSpPr>
+      <p:sp>
+        <p:nvSpPr>
+          <p:cNvPr id="6" name="Title 5"/>
+          <p:cNvSpPr>
+            <a:spLocks noGrp="1"/>
+          </p:cNvSpPr>
+          <p:nvPr>
+            <p:ph type="title"/>
+          </p:nvPr>
+        </p:nvSpPr>
+        <p:spPr/>
+        <p:txBody>
+          <a:bodyPr/>
+          <a:lstStyle/>
+          <a:p>
+            <a:r>
+              <a:rPr lang="de-AT" dirty="0"/>
+              <a:t>Demo</a:t>
+            </a:r>
+          </a:p>
+        </p:txBody>
+      </p:sp>
+      <p:sp>
+        <p:nvSpPr>
+          <p:cNvPr id="7" name="Content Placeholder 6"/>
+          <p:cNvSpPr>
+            <a:spLocks noGrp="1"/>
+          </p:cNvSpPr>
+          <p:nvPr>
+            <p:ph sz="quarter" idx="22"/>
+          </p:nvPr>
+        </p:nvSpPr>
+        <p:spPr/>
+        <p:txBody>
+          <a:bodyPr/>
+          <a:lstStyle/>
+          <a:p>
+            <a:r>
+              <a:rPr lang="de-AT" dirty="0" err="1"/>
+              <a:t>docker-machine</a:t>
+            </a:r>
+            <a:r>
+              <a:rPr lang="de-AT" dirty="0"/>
+              <a:t> </a:t>
+            </a:r>
+            <a:r>
+              <a:rPr lang="de-AT" dirty="0" err="1"/>
+              <a:t>create</a:t>
+            </a:r>
+            <a:r>
+              <a:rPr lang="de-AT" dirty="0"/>
+              <a:t> --driver </a:t>
+            </a:r>
+            <a:r>
+              <a:rPr lang="de-AT" dirty="0" err="1"/>
+              <a:t>azure</a:t>
+            </a:r>
+            <a:r>
+              <a:rPr lang="de-AT" dirty="0"/>
+              <a:t> --</a:t>
+            </a:r>
+            <a:r>
+              <a:rPr lang="de-AT" dirty="0" err="1"/>
+              <a:t>azure-subscription-id</a:t>
+            </a:r>
+            <a:r>
+              <a:rPr lang="de-AT" dirty="0"/>
+              <a:t> 00000000-0000-0000-0000-000000000000 doc16-demo</a:t>
+            </a:r>
+          </a:p>
+          <a:p>
+            <a:r>
+              <a:rPr lang="de-AT" i="1" dirty="0"/>
+              <a:t># Show </a:t>
+            </a:r>
+            <a:r>
+              <a:rPr lang="de-AT" i="1" dirty="0" err="1"/>
+              <a:t>result</a:t>
+            </a:r>
+            <a:r>
+              <a:rPr lang="de-AT" i="1" dirty="0"/>
+              <a:t> in Azure Portal</a:t>
+            </a:r>
+          </a:p>
+          <a:p>
+            <a:endParaRPr lang="sv-SE" dirty="0"/>
+          </a:p>
+          <a:p>
+            <a:r>
+              <a:rPr lang="sv-SE" i="1" dirty="0"/>
+              <a:t># Create volume on Azure files</a:t>
+            </a:r>
+          </a:p>
+          <a:p>
+            <a:r>
+              <a:rPr lang="sv-SE" dirty="0"/>
+              <a:t>docker volume ls</a:t>
+            </a:r>
+          </a:p>
+          <a:p>
+            <a:r>
+              <a:rPr lang="en-US" dirty="0" err="1"/>
+              <a:t>docker</a:t>
+            </a:r>
+            <a:r>
+              <a:rPr lang="en-US" dirty="0"/>
+              <a:t> volume create -d </a:t>
+            </a:r>
+            <a:r>
+              <a:rPr lang="en-US" dirty="0" err="1"/>
+              <a:t>azurefile</a:t>
+            </a:r>
+            <a:r>
+              <a:rPr lang="en-US" dirty="0"/>
+              <a:t> --name </a:t>
+            </a:r>
+            <a:r>
+              <a:rPr lang="en-US" dirty="0" err="1"/>
+              <a:t>myvol</a:t>
+            </a:r>
+            <a:r>
+              <a:rPr lang="en-US" dirty="0"/>
+              <a:t> -o share=doc16</a:t>
+            </a:r>
+          </a:p>
+          <a:p>
+            <a:r>
+              <a:rPr lang="sv-SE" dirty="0"/>
+              <a:t>docker volume ls</a:t>
+            </a:r>
+          </a:p>
+          <a:p>
+            <a:r>
+              <a:rPr lang="en-US" dirty="0" err="1"/>
+              <a:t>docker</a:t>
+            </a:r>
+            <a:r>
+              <a:rPr lang="en-US" dirty="0"/>
+              <a:t> run -it --</a:t>
+            </a:r>
+            <a:r>
+              <a:rPr lang="en-US" dirty="0" err="1"/>
+              <a:t>rm</a:t>
+            </a:r>
+            <a:r>
+              <a:rPr lang="en-US" dirty="0"/>
+              <a:t> -v </a:t>
+            </a:r>
+            <a:r>
+              <a:rPr lang="en-US" dirty="0" err="1"/>
+              <a:t>myvol</a:t>
+            </a:r>
+            <a:r>
+              <a:rPr lang="en-US" dirty="0"/>
+              <a:t>:/data </a:t>
+            </a:r>
+            <a:r>
+              <a:rPr lang="en-US" dirty="0" err="1"/>
+              <a:t>ubuntu</a:t>
+            </a:r>
+            <a:r>
+              <a:rPr lang="en-US" dirty="0"/>
+              <a:t> /bin/bash</a:t>
+            </a:r>
+          </a:p>
+          <a:p>
+            <a:r>
+              <a:rPr lang="en-US" dirty="0"/>
+              <a:t>	cd /data</a:t>
+            </a:r>
+          </a:p>
+          <a:p>
+            <a:r>
+              <a:rPr lang="en-US" dirty="0"/>
+              <a:t>	echo Hello &gt; greeting.txt</a:t>
+            </a:r>
+          </a:p>
+          <a:p>
+            <a:r>
+              <a:rPr lang="en-US" i="1" dirty="0"/>
+              <a:t>	# Show result </a:t>
+            </a:r>
+            <a:r>
+              <a:rPr lang="en-US" i="1"/>
+              <a:t>in Azure Portal</a:t>
+            </a:r>
+            <a:endParaRPr lang="en-US" i="1" dirty="0"/>
+          </a:p>
+        </p:txBody>
+      </p:sp>
+      <p:sp>
+        <p:nvSpPr>
+          <p:cNvPr id="8" name="Text Placeholder 7"/>
+          <p:cNvSpPr>
+            <a:spLocks noGrp="1"/>
+          </p:cNvSpPr>
+          <p:nvPr>
+            <p:ph type="body" sz="quarter" idx="23"/>
+          </p:nvPr>
+        </p:nvSpPr>
+        <p:spPr/>
+        <p:txBody>
+          <a:bodyPr/>
+          <a:lstStyle/>
+          <a:p>
+            <a:endParaRPr lang="de-AT"/>
+          </a:p>
+        </p:txBody>
+      </p:sp>
+      <p:sp>
+        <p:nvSpPr>
+          <p:cNvPr id="9" name="Text Placeholder 8"/>
+          <p:cNvSpPr>
+            <a:spLocks noGrp="1"/>
+          </p:cNvSpPr>
+          <p:nvPr>
+            <p:ph type="body" sz="quarter" idx="24"/>
+          </p:nvPr>
+        </p:nvSpPr>
+        <p:spPr/>
+        <p:txBody>
+          <a:bodyPr/>
+          <a:lstStyle/>
+          <a:p>
+            <a:r>
+              <a:rPr lang="de-AT" dirty="0" err="1"/>
+              <a:t>Prerequisites</a:t>
+            </a:r>
+            <a:endParaRPr lang="de-AT" dirty="0"/>
+          </a:p>
+          <a:p>
+            <a:pPr lvl="1"/>
+            <a:r>
+              <a:rPr lang="de-AT" dirty="0"/>
+              <a:t>Docker </a:t>
+            </a:r>
+            <a:r>
+              <a:rPr lang="de-AT" dirty="0" err="1"/>
+              <a:t>Machine</a:t>
+            </a:r>
+            <a:r>
+              <a:rPr lang="de-AT" dirty="0"/>
+              <a:t> </a:t>
+            </a:r>
+            <a:r>
+              <a:rPr lang="de-AT" dirty="0" err="1"/>
+              <a:t>installed</a:t>
+            </a:r>
+            <a:endParaRPr lang="de-AT" dirty="0"/>
+          </a:p>
+          <a:p>
+            <a:pPr lvl="1"/>
+            <a:r>
+              <a:rPr lang="de-AT" dirty="0"/>
+              <a:t>Docker Driver </a:t>
+            </a:r>
+            <a:r>
+              <a:rPr lang="de-AT" dirty="0" err="1"/>
+              <a:t>for</a:t>
+            </a:r>
+            <a:r>
+              <a:rPr lang="de-AT" dirty="0"/>
+              <a:t> Azure Files </a:t>
+            </a:r>
+            <a:r>
+              <a:rPr lang="de-AT" dirty="0" err="1"/>
+              <a:t>installed</a:t>
+            </a:r>
+            <a:r>
+              <a:rPr lang="de-AT" dirty="0"/>
+              <a:t> </a:t>
+            </a:r>
+            <a:r>
+              <a:rPr lang="de-AT" dirty="0" err="1"/>
+              <a:t>and</a:t>
+            </a:r>
+            <a:r>
+              <a:rPr lang="de-AT" dirty="0"/>
+              <a:t> </a:t>
+            </a:r>
+            <a:r>
+              <a:rPr lang="de-AT" dirty="0" err="1"/>
+              <a:t>configured</a:t>
+            </a:r>
+            <a:endParaRPr lang="de-AT" dirty="0"/>
+          </a:p>
+        </p:txBody>
+      </p:sp>
+      <p:sp>
+        <p:nvSpPr>
+          <p:cNvPr id="10" name="Text Placeholder 9"/>
+          <p:cNvSpPr>
+            <a:spLocks noGrp="1"/>
+          </p:cNvSpPr>
+          <p:nvPr>
+            <p:ph type="body" sz="quarter" idx="25"/>
+          </p:nvPr>
+        </p:nvSpPr>
+        <p:spPr/>
+        <p:txBody>
+          <a:bodyPr/>
+          <a:lstStyle/>
+          <a:p>
+            <a:endParaRPr lang="de-AT"/>
+          </a:p>
+        </p:txBody>
+      </p:sp>
+    </p:spTree>
+    <p:extLst>
+      <p:ext uri="{BB962C8B-B14F-4D97-AF65-F5344CB8AC3E}">
+        <p14:creationId xmlns:p14="http://schemas.microsoft.com/office/powerpoint/2010/main" val="3933312432"/>
+      </p:ext>
+    </p:extLst>
+  </p:cSld>
+  <p:clrMapOvr>
+    <a:masterClrMapping/>
+  </p:clrMapOvr>
+  <p:transition spd="slow">
+    <p:push/>
+  </p:transition>
+</p:sld>
+</file>
+
+<file path=ppt/slides/slide22.xml><?xml version="1.0" encoding="utf-8"?>
+<p:sld xmlns:a="http://schemas.openxmlformats.org/drawingml/2006/main" xmlns:r="http://schemas.openxmlformats.org/officeDocument/2006/relationships" xmlns:p="http://schemas.openxmlformats.org/presentationml/2006/main">
+  <p:cSld>
+    <p:spTree>
+      <p:nvGrpSpPr>
+        <p:cNvPr id="1" name=""/>
+        <p:cNvGrpSpPr/>
+        <p:nvPr/>
+      </p:nvGrpSpPr>
+      <p:grpSpPr>
+        <a:xfrm>
+          <a:off x="0" y="0"/>
+          <a:ext cx="0" cy="0"/>
+          <a:chOff x="0" y="0"/>
+          <a:chExt cx="0" cy="0"/>
+        </a:xfrm>
+      </p:grpSpPr>
+      <p:sp>
+        <p:nvSpPr>
           <p:cNvPr id="2" name="Title 1"/>
           <p:cNvSpPr>
             <a:spLocks noGrp="1"/>
@@ -32073,7 +31937,7 @@
 </p:sld>
 </file>
 
-<file path=ppt/slides/slide21.xml><?xml version="1.0" encoding="utf-8"?>
+<file path=ppt/slides/slide23.xml><?xml version="1.0" encoding="utf-8"?>
 <p:sld xmlns:a="http://schemas.openxmlformats.org/drawingml/2006/main" xmlns:r="http://schemas.openxmlformats.org/officeDocument/2006/relationships" xmlns:p="http://schemas.openxmlformats.org/presentationml/2006/main">
   <p:cSld>
     <p:spTree>
@@ -32247,7 +32111,7 @@
 </p:sld>
 </file>
 
-<file path=ppt/slides/slide22.xml><?xml version="1.0" encoding="utf-8"?>
+<file path=ppt/slides/slide24.xml><?xml version="1.0" encoding="utf-8"?>
 <p:sld xmlns:a="http://schemas.openxmlformats.org/drawingml/2006/main" xmlns:r="http://schemas.openxmlformats.org/officeDocument/2006/relationships" xmlns:p="http://schemas.openxmlformats.org/presentationml/2006/main">
   <p:cSld>
     <p:spTree>
@@ -32576,19 +32440,6 @@
           <a:p>
             <a:r>
               <a:rPr lang="en-US" dirty="0"/>
-              <a:t>Previews, previews, previews</a:t>
-            </a:r>
-          </a:p>
-          <a:p>
-            <a:pPr lvl="1"/>
-            <a:r>
-              <a:rPr lang="en-US" dirty="0"/>
-              <a:t>What is available? What will come?</a:t>
-            </a:r>
-          </a:p>
-          <a:p>
-            <a:r>
-              <a:rPr lang="en-US" dirty="0"/>
               <a:t>Demos, demos, demos</a:t>
             </a:r>
           </a:p>
@@ -32793,68 +32644,27 @@
             </a:r>
           </a:p>
           <a:p>
+            <a:pPr lvl="1"/>
             <a:r>
               <a:rPr lang="en-US" dirty="0"/>
-              <a:t>Linux containers on Windows</a:t>
+              <a:t>In Windows shell</a:t>
             </a:r>
           </a:p>
           <a:p>
             <a:pPr lvl="1"/>
+            <a:r>
+              <a:rPr lang="en-US" dirty="0"/>
+              <a:t>In Bash shell (</a:t>
+            </a:r>
             <a:r>
               <a:rPr lang="en-US" dirty="0">
                 <a:hlinkClick r:id="rId2"/>
               </a:rPr>
-              <a:t>Docker Toolbox</a:t>
+              <a:t>Bash on Ubuntu on Windows</a:t>
             </a:r>
             <a:r>
               <a:rPr lang="en-US" dirty="0"/>
-              <a:t> (driver for Hyper-V available)</a:t>
-            </a:r>
-          </a:p>
-          <a:p>
-            <a:pPr lvl="1"/>
-            <a:r>
-              <a:rPr lang="en-US" dirty="0">
-                <a:hlinkClick r:id="rId3"/>
-              </a:rPr>
-              <a:t>Docker for Windows</a:t>
-            </a:r>
-            <a:r>
-              <a:rPr lang="en-US" dirty="0"/>
-              <a:t> (Beta)</a:t>
-            </a:r>
-          </a:p>
-          <a:p>
-            <a:r>
-              <a:rPr lang="en-US" dirty="0"/>
-              <a:t>Windows containers on Windows</a:t>
-            </a:r>
-          </a:p>
-          <a:p>
-            <a:pPr lvl="1"/>
-            <a:r>
-              <a:rPr lang="en-US" dirty="0">
-                <a:hlinkClick r:id="rId4"/>
-              </a:rPr>
-              <a:t>Windows Server containers</a:t>
-            </a:r>
-            <a:endParaRPr lang="en-US" dirty="0"/>
-          </a:p>
-          <a:p>
-            <a:pPr lvl="1"/>
-            <a:r>
-              <a:rPr lang="en-US" dirty="0">
-                <a:hlinkClick r:id="rId5"/>
-              </a:rPr>
-              <a:t>Hyper-V containers</a:t>
-            </a:r>
-            <a:endParaRPr lang="en-US" dirty="0"/>
-          </a:p>
-          <a:p>
-            <a:pPr lvl="1"/>
-            <a:r>
-              <a:rPr lang="en-US" dirty="0"/>
-              <a:t>Docker support on Windows Server 2016 and Windows 10</a:t>
+              <a:t>)</a:t>
             </a:r>
           </a:p>
         </p:txBody>
@@ -32913,6 +32723,165 @@
       </p:grpSpPr>
       <p:sp>
         <p:nvSpPr>
+          <p:cNvPr id="2" name="Text Placeholder 1"/>
+          <p:cNvSpPr>
+            <a:spLocks noGrp="1"/>
+          </p:cNvSpPr>
+          <p:nvPr>
+            <p:ph type="body" sz="quarter" idx="16"/>
+          </p:nvPr>
+        </p:nvSpPr>
+        <p:spPr/>
+        <p:txBody>
+          <a:bodyPr/>
+          <a:lstStyle/>
+          <a:p>
+            <a:r>
+              <a:rPr lang="de-AT" dirty="0"/>
+              <a:t>Docker Client</a:t>
+            </a:r>
+          </a:p>
+        </p:txBody>
+      </p:sp>
+      <p:sp>
+        <p:nvSpPr>
+          <p:cNvPr id="3" name="Text Placeholder 2"/>
+          <p:cNvSpPr>
+            <a:spLocks noGrp="1"/>
+          </p:cNvSpPr>
+          <p:nvPr>
+            <p:ph type="body" sz="quarter" idx="24"/>
+          </p:nvPr>
+        </p:nvSpPr>
+        <p:spPr/>
+        <p:txBody>
+          <a:bodyPr/>
+          <a:lstStyle/>
+          <a:p>
+            <a:r>
+              <a:rPr lang="de-AT" dirty="0"/>
+              <a:t>Windows Shell</a:t>
+            </a:r>
+          </a:p>
+          <a:p>
+            <a:r>
+              <a:rPr lang="en-US" dirty="0"/>
+              <a:t>Ubuntu subsystem for Windows</a:t>
+            </a:r>
+          </a:p>
+          <a:p>
+            <a:pPr lvl="1"/>
+            <a:r>
+              <a:rPr lang="en-US" dirty="0"/>
+              <a:t>Not Docker, not Hyper-V</a:t>
+            </a:r>
+          </a:p>
+          <a:p>
+            <a:pPr lvl="1"/>
+            <a:r>
+              <a:rPr lang="en-US" dirty="0"/>
+              <a:t>Pico processes</a:t>
+            </a:r>
+          </a:p>
+          <a:p>
+            <a:r>
+              <a:rPr lang="de-AT" dirty="0" err="1"/>
+              <a:t>Bash</a:t>
+            </a:r>
+            <a:r>
+              <a:rPr lang="de-AT" dirty="0"/>
+              <a:t> on Ubuntu on Windows</a:t>
+            </a:r>
+          </a:p>
+          <a:p>
+            <a:pPr lvl="1"/>
+            <a:r>
+              <a:rPr lang="de-AT" dirty="0"/>
+              <a:t>Advantage: </a:t>
+            </a:r>
+            <a:r>
+              <a:rPr lang="de-AT" dirty="0" err="1">
+                <a:hlinkClick r:id="rId2"/>
+              </a:rPr>
+              <a:t>Completion</a:t>
+            </a:r>
+            <a:endParaRPr lang="de-AT" dirty="0"/>
+          </a:p>
+        </p:txBody>
+      </p:sp>
+      <p:sp>
+        <p:nvSpPr>
+          <p:cNvPr id="4" name="Text Placeholder 3"/>
+          <p:cNvSpPr>
+            <a:spLocks noGrp="1"/>
+          </p:cNvSpPr>
+          <p:nvPr>
+            <p:ph type="body" sz="quarter" idx="25"/>
+          </p:nvPr>
+        </p:nvSpPr>
+        <p:spPr/>
+        <p:txBody>
+          <a:bodyPr/>
+          <a:lstStyle/>
+          <a:p>
+            <a:endParaRPr lang="de-AT"/>
+          </a:p>
+        </p:txBody>
+      </p:sp>
+      <p:sp>
+        <p:nvSpPr>
+          <p:cNvPr id="5" name="Text Placeholder 4"/>
+          <p:cNvSpPr>
+            <a:spLocks noGrp="1"/>
+          </p:cNvSpPr>
+          <p:nvPr>
+            <p:ph type="body" sz="quarter" idx="26"/>
+          </p:nvPr>
+        </p:nvSpPr>
+        <p:spPr/>
+        <p:txBody>
+          <a:bodyPr/>
+          <a:lstStyle/>
+          <a:p>
+            <a:endParaRPr lang="de-AT"/>
+          </a:p>
+        </p:txBody>
+      </p:sp>
+    </p:spTree>
+    <p:extLst>
+      <p:ext uri="{BB962C8B-B14F-4D97-AF65-F5344CB8AC3E}">
+        <p14:creationId xmlns:p14="http://schemas.microsoft.com/office/powerpoint/2010/main" val="3578241534"/>
+      </p:ext>
+    </p:extLst>
+  </p:cSld>
+  <p:clrMapOvr>
+    <a:masterClrMapping/>
+  </p:clrMapOvr>
+  <p:transition spd="slow">
+    <p:push/>
+  </p:transition>
+</p:sld>
+</file>
+
+<file path=ppt/slides/slide7.xml><?xml version="1.0" encoding="utf-8"?>
+<p:sld xmlns:a="http://schemas.openxmlformats.org/drawingml/2006/main" xmlns:r="http://schemas.openxmlformats.org/officeDocument/2006/relationships" xmlns:p="http://schemas.openxmlformats.org/presentationml/2006/main" showMasterPhAnim="0">
+  <p:cSld>
+    <p:spTree>
+      <p:nvGrpSpPr>
+        <p:cNvPr id="1" name=""/>
+        <p:cNvGrpSpPr/>
+        <p:nvPr/>
+      </p:nvGrpSpPr>
+      <p:grpSpPr>
+        <a:xfrm>
+          <a:off x="0" y="0"/>
+          <a:ext cx="0" cy="0"/>
+          <a:chOff x="0" y="0"/>
+          <a:chExt cx="0" cy="0"/>
+        </a:xfrm>
+      </p:grpSpPr>
+      <p:sp>
+        <p:nvSpPr>
           <p:cNvPr id="7" name="Title 6"/>
           <p:cNvSpPr>
             <a:spLocks noGrp="1"/>
@@ -32957,6 +32926,516 @@
           <a:p>
             <a:r>
               <a:rPr lang="en-US" dirty="0"/>
+              <a:t>Docker client on Windows</a:t>
+            </a:r>
+          </a:p>
+          <a:p>
+            <a:pPr lvl="1"/>
+            <a:r>
+              <a:rPr lang="en-US" dirty="0"/>
+              <a:t>In Windows shell</a:t>
+            </a:r>
+          </a:p>
+          <a:p>
+            <a:pPr lvl="1"/>
+            <a:r>
+              <a:rPr lang="en-US" dirty="0"/>
+              <a:t>In Bash shell (</a:t>
+            </a:r>
+            <a:r>
+              <a:rPr lang="en-US" dirty="0">
+                <a:hlinkClick r:id="rId2"/>
+              </a:rPr>
+              <a:t>Bash on Ubuntu on Windows</a:t>
+            </a:r>
+            <a:r>
+              <a:rPr lang="en-US" dirty="0"/>
+              <a:t>)</a:t>
+            </a:r>
+          </a:p>
+          <a:p>
+            <a:r>
+              <a:rPr lang="en-US" dirty="0"/>
+              <a:t>Linux containers on Windows</a:t>
+            </a:r>
+          </a:p>
+          <a:p>
+            <a:pPr lvl="1"/>
+            <a:r>
+              <a:rPr lang="en-US" dirty="0">
+                <a:hlinkClick r:id="rId3"/>
+              </a:rPr>
+              <a:t>Docker for Windows</a:t>
+            </a:r>
+            <a:endParaRPr lang="en-US" dirty="0"/>
+          </a:p>
+          <a:p>
+            <a:r>
+              <a:rPr lang="en-US" dirty="0"/>
+              <a:t>Windows containers on Windows</a:t>
+            </a:r>
+          </a:p>
+          <a:p>
+            <a:pPr lvl="1"/>
+            <a:r>
+              <a:rPr lang="en-US" dirty="0">
+                <a:hlinkClick r:id="rId4"/>
+              </a:rPr>
+              <a:t>Windows Server containers</a:t>
+            </a:r>
+            <a:endParaRPr lang="en-US" dirty="0"/>
+          </a:p>
+          <a:p>
+            <a:pPr lvl="1"/>
+            <a:r>
+              <a:rPr lang="en-US" dirty="0">
+                <a:hlinkClick r:id="rId5"/>
+              </a:rPr>
+              <a:t>Hyper-V containers</a:t>
+            </a:r>
+            <a:endParaRPr lang="en-US" dirty="0"/>
+          </a:p>
+          <a:p>
+            <a:pPr lvl="1"/>
+            <a:r>
+              <a:rPr lang="en-US" dirty="0"/>
+              <a:t>Docker support on Windows Server 2016 and </a:t>
+            </a:r>
+            <a:r>
+              <a:rPr lang="en-US" dirty="0">
+                <a:hlinkClick r:id="rId6"/>
+              </a:rPr>
+              <a:t>Windows 10</a:t>
+            </a:r>
+            <a:endParaRPr lang="en-US" dirty="0"/>
+          </a:p>
+        </p:txBody>
+      </p:sp>
+      <p:sp>
+        <p:nvSpPr>
+          <p:cNvPr id="9" name="Text Placeholder 8"/>
+          <p:cNvSpPr>
+            <a:spLocks noGrp="1"/>
+          </p:cNvSpPr>
+          <p:nvPr>
+            <p:ph type="body" sz="quarter" idx="23"/>
+          </p:nvPr>
+        </p:nvSpPr>
+        <p:spPr/>
+        <p:txBody>
+          <a:bodyPr/>
+          <a:lstStyle/>
+          <a:p>
+            <a:endParaRPr lang="en-US" dirty="0"/>
+          </a:p>
+        </p:txBody>
+      </p:sp>
+    </p:spTree>
+    <p:extLst>
+      <p:ext uri="{BB962C8B-B14F-4D97-AF65-F5344CB8AC3E}">
+        <p14:creationId xmlns:p14="http://schemas.microsoft.com/office/powerpoint/2010/main" val="2168930805"/>
+      </p:ext>
+    </p:extLst>
+  </p:cSld>
+  <p:clrMapOvr>
+    <a:masterClrMapping/>
+  </p:clrMapOvr>
+  <p:transition spd="slow">
+    <p:push/>
+  </p:transition>
+  <p:timing>
+    <p:tnLst>
+      <p:par>
+        <p:cTn id="1" dur="indefinite" restart="never" nodeType="tmRoot">
+          <p:childTnLst>
+            <p:seq concurrent="1" nextAc="seek">
+              <p:cTn id="2" dur="indefinite" nodeType="mainSeq">
+                <p:childTnLst>
+                  <p:par>
+                    <p:cTn id="3" fill="hold">
+                      <p:stCondLst>
+                        <p:cond delay="indefinite"/>
+                      </p:stCondLst>
+                      <p:childTnLst>
+                        <p:par>
+                          <p:cTn id="4" fill="hold">
+                            <p:stCondLst>
+                              <p:cond delay="0"/>
+                            </p:stCondLst>
+                            <p:childTnLst>
+                              <p:par>
+                                <p:cTn id="5" presetID="10" presetClass="entr" presetSubtype="0" fill="hold" grpId="0" nodeType="clickEffect">
+                                  <p:stCondLst>
+                                    <p:cond delay="0"/>
+                                  </p:stCondLst>
+                                  <p:childTnLst>
+                                    <p:set>
+                                      <p:cBhvr>
+                                        <p:cTn id="6" dur="1" fill="hold">
+                                          <p:stCondLst>
+                                            <p:cond delay="0"/>
+                                          </p:stCondLst>
+                                        </p:cTn>
+                                        <p:tgtEl>
+                                          <p:spTgt spid="8">
+                                            <p:txEl>
+                                              <p:pRg st="3" end="3"/>
+                                            </p:txEl>
+                                          </p:spTgt>
+                                        </p:tgtEl>
+                                        <p:attrNameLst>
+                                          <p:attrName>style.visibility</p:attrName>
+                                        </p:attrNameLst>
+                                      </p:cBhvr>
+                                      <p:to>
+                                        <p:strVal val="visible"/>
+                                      </p:to>
+                                    </p:set>
+                                    <p:animEffect transition="in" filter="fade">
+                                      <p:cBhvr>
+                                        <p:cTn id="7" dur="500"/>
+                                        <p:tgtEl>
+                                          <p:spTgt spid="8">
+                                            <p:txEl>
+                                              <p:pRg st="3" end="3"/>
+                                            </p:txEl>
+                                          </p:spTgt>
+                                        </p:tgtEl>
+                                      </p:cBhvr>
+                                    </p:animEffect>
+                                  </p:childTnLst>
+                                </p:cTn>
+                              </p:par>
+                              <p:par>
+                                <p:cTn id="8" presetID="10" presetClass="entr" presetSubtype="0" fill="hold" grpId="0" nodeType="withEffect">
+                                  <p:stCondLst>
+                                    <p:cond delay="0"/>
+                                  </p:stCondLst>
+                                  <p:childTnLst>
+                                    <p:set>
+                                      <p:cBhvr>
+                                        <p:cTn id="9" dur="1" fill="hold">
+                                          <p:stCondLst>
+                                            <p:cond delay="0"/>
+                                          </p:stCondLst>
+                                        </p:cTn>
+                                        <p:tgtEl>
+                                          <p:spTgt spid="8">
+                                            <p:txEl>
+                                              <p:pRg st="4" end="4"/>
+                                            </p:txEl>
+                                          </p:spTgt>
+                                        </p:tgtEl>
+                                        <p:attrNameLst>
+                                          <p:attrName>style.visibility</p:attrName>
+                                        </p:attrNameLst>
+                                      </p:cBhvr>
+                                      <p:to>
+                                        <p:strVal val="visible"/>
+                                      </p:to>
+                                    </p:set>
+                                    <p:animEffect transition="in" filter="fade">
+                                      <p:cBhvr>
+                                        <p:cTn id="10" dur="500"/>
+                                        <p:tgtEl>
+                                          <p:spTgt spid="8">
+                                            <p:txEl>
+                                              <p:pRg st="4" end="4"/>
+                                            </p:txEl>
+                                          </p:spTgt>
+                                        </p:tgtEl>
+                                      </p:cBhvr>
+                                    </p:animEffect>
+                                  </p:childTnLst>
+                                </p:cTn>
+                              </p:par>
+                            </p:childTnLst>
+                          </p:cTn>
+                        </p:par>
+                      </p:childTnLst>
+                    </p:cTn>
+                  </p:par>
+                  <p:par>
+                    <p:cTn id="11" fill="hold">
+                      <p:stCondLst>
+                        <p:cond delay="indefinite"/>
+                      </p:stCondLst>
+                      <p:childTnLst>
+                        <p:par>
+                          <p:cTn id="12" fill="hold">
+                            <p:stCondLst>
+                              <p:cond delay="0"/>
+                            </p:stCondLst>
+                            <p:childTnLst>
+                              <p:par>
+                                <p:cTn id="13" presetID="10" presetClass="entr" presetSubtype="0" fill="hold" grpId="0" nodeType="clickEffect">
+                                  <p:stCondLst>
+                                    <p:cond delay="0"/>
+                                  </p:stCondLst>
+                                  <p:childTnLst>
+                                    <p:set>
+                                      <p:cBhvr>
+                                        <p:cTn id="14" dur="1" fill="hold">
+                                          <p:stCondLst>
+                                            <p:cond delay="0"/>
+                                          </p:stCondLst>
+                                        </p:cTn>
+                                        <p:tgtEl>
+                                          <p:spTgt spid="8">
+                                            <p:txEl>
+                                              <p:pRg st="5" end="5"/>
+                                            </p:txEl>
+                                          </p:spTgt>
+                                        </p:tgtEl>
+                                        <p:attrNameLst>
+                                          <p:attrName>style.visibility</p:attrName>
+                                        </p:attrNameLst>
+                                      </p:cBhvr>
+                                      <p:to>
+                                        <p:strVal val="visible"/>
+                                      </p:to>
+                                    </p:set>
+                                    <p:animEffect transition="in" filter="fade">
+                                      <p:cBhvr>
+                                        <p:cTn id="15" dur="500"/>
+                                        <p:tgtEl>
+                                          <p:spTgt spid="8">
+                                            <p:txEl>
+                                              <p:pRg st="5" end="5"/>
+                                            </p:txEl>
+                                          </p:spTgt>
+                                        </p:tgtEl>
+                                      </p:cBhvr>
+                                    </p:animEffect>
+                                  </p:childTnLst>
+                                </p:cTn>
+                              </p:par>
+                              <p:par>
+                                <p:cTn id="16" presetID="10" presetClass="entr" presetSubtype="0" fill="hold" grpId="0" nodeType="withEffect">
+                                  <p:stCondLst>
+                                    <p:cond delay="0"/>
+                                  </p:stCondLst>
+                                  <p:childTnLst>
+                                    <p:set>
+                                      <p:cBhvr>
+                                        <p:cTn id="17" dur="1" fill="hold">
+                                          <p:stCondLst>
+                                            <p:cond delay="0"/>
+                                          </p:stCondLst>
+                                        </p:cTn>
+                                        <p:tgtEl>
+                                          <p:spTgt spid="8">
+                                            <p:txEl>
+                                              <p:pRg st="6" end="6"/>
+                                            </p:txEl>
+                                          </p:spTgt>
+                                        </p:tgtEl>
+                                        <p:attrNameLst>
+                                          <p:attrName>style.visibility</p:attrName>
+                                        </p:attrNameLst>
+                                      </p:cBhvr>
+                                      <p:to>
+                                        <p:strVal val="visible"/>
+                                      </p:to>
+                                    </p:set>
+                                    <p:animEffect transition="in" filter="fade">
+                                      <p:cBhvr>
+                                        <p:cTn id="18" dur="500"/>
+                                        <p:tgtEl>
+                                          <p:spTgt spid="8">
+                                            <p:txEl>
+                                              <p:pRg st="6" end="6"/>
+                                            </p:txEl>
+                                          </p:spTgt>
+                                        </p:tgtEl>
+                                      </p:cBhvr>
+                                    </p:animEffect>
+                                  </p:childTnLst>
+                                </p:cTn>
+                              </p:par>
+                              <p:par>
+                                <p:cTn id="19" presetID="10" presetClass="entr" presetSubtype="0" fill="hold" grpId="0" nodeType="withEffect">
+                                  <p:stCondLst>
+                                    <p:cond delay="0"/>
+                                  </p:stCondLst>
+                                  <p:childTnLst>
+                                    <p:set>
+                                      <p:cBhvr>
+                                        <p:cTn id="20" dur="1" fill="hold">
+                                          <p:stCondLst>
+                                            <p:cond delay="0"/>
+                                          </p:stCondLst>
+                                        </p:cTn>
+                                        <p:tgtEl>
+                                          <p:spTgt spid="8">
+                                            <p:txEl>
+                                              <p:pRg st="7" end="7"/>
+                                            </p:txEl>
+                                          </p:spTgt>
+                                        </p:tgtEl>
+                                        <p:attrNameLst>
+                                          <p:attrName>style.visibility</p:attrName>
+                                        </p:attrNameLst>
+                                      </p:cBhvr>
+                                      <p:to>
+                                        <p:strVal val="visible"/>
+                                      </p:to>
+                                    </p:set>
+                                    <p:animEffect transition="in" filter="fade">
+                                      <p:cBhvr>
+                                        <p:cTn id="21" dur="500"/>
+                                        <p:tgtEl>
+                                          <p:spTgt spid="8">
+                                            <p:txEl>
+                                              <p:pRg st="7" end="7"/>
+                                            </p:txEl>
+                                          </p:spTgt>
+                                        </p:tgtEl>
+                                      </p:cBhvr>
+                                    </p:animEffect>
+                                  </p:childTnLst>
+                                </p:cTn>
+                              </p:par>
+                              <p:par>
+                                <p:cTn id="22" presetID="10" presetClass="entr" presetSubtype="0" fill="hold" grpId="0" nodeType="withEffect">
+                                  <p:stCondLst>
+                                    <p:cond delay="0"/>
+                                  </p:stCondLst>
+                                  <p:childTnLst>
+                                    <p:set>
+                                      <p:cBhvr>
+                                        <p:cTn id="23" dur="1" fill="hold">
+                                          <p:stCondLst>
+                                            <p:cond delay="0"/>
+                                          </p:stCondLst>
+                                        </p:cTn>
+                                        <p:tgtEl>
+                                          <p:spTgt spid="8">
+                                            <p:txEl>
+                                              <p:pRg st="8" end="8"/>
+                                            </p:txEl>
+                                          </p:spTgt>
+                                        </p:tgtEl>
+                                        <p:attrNameLst>
+                                          <p:attrName>style.visibility</p:attrName>
+                                        </p:attrNameLst>
+                                      </p:cBhvr>
+                                      <p:to>
+                                        <p:strVal val="visible"/>
+                                      </p:to>
+                                    </p:set>
+                                    <p:animEffect transition="in" filter="fade">
+                                      <p:cBhvr>
+                                        <p:cTn id="24" dur="500"/>
+                                        <p:tgtEl>
+                                          <p:spTgt spid="8">
+                                            <p:txEl>
+                                              <p:pRg st="8" end="8"/>
+                                            </p:txEl>
+                                          </p:spTgt>
+                                        </p:tgtEl>
+                                      </p:cBhvr>
+                                    </p:animEffect>
+                                  </p:childTnLst>
+                                </p:cTn>
+                              </p:par>
+                            </p:childTnLst>
+                          </p:cTn>
+                        </p:par>
+                      </p:childTnLst>
+                    </p:cTn>
+                  </p:par>
+                </p:childTnLst>
+              </p:cTn>
+              <p:prevCondLst>
+                <p:cond evt="onPrev" delay="0">
+                  <p:tgtEl>
+                    <p:sldTgt/>
+                  </p:tgtEl>
+                </p:cond>
+              </p:prevCondLst>
+              <p:nextCondLst>
+                <p:cond evt="onNext" delay="0">
+                  <p:tgtEl>
+                    <p:sldTgt/>
+                  </p:tgtEl>
+                </p:cond>
+              </p:nextCondLst>
+            </p:seq>
+          </p:childTnLst>
+        </p:cTn>
+      </p:par>
+    </p:tnLst>
+    <p:bldLst>
+      <p:bldP spid="8" grpId="0" uiExpand="1" build="p"/>
+    </p:bldLst>
+  </p:timing>
+</p:sld>
+</file>
+
+<file path=ppt/slides/slide8.xml><?xml version="1.0" encoding="utf-8"?>
+<p:sld xmlns:a="http://schemas.openxmlformats.org/drawingml/2006/main" xmlns:r="http://schemas.openxmlformats.org/officeDocument/2006/relationships" xmlns:p="http://schemas.openxmlformats.org/presentationml/2006/main">
+  <p:cSld>
+    <p:spTree>
+      <p:nvGrpSpPr>
+        <p:cNvPr id="1" name=""/>
+        <p:cNvGrpSpPr/>
+        <p:nvPr/>
+      </p:nvGrpSpPr>
+      <p:grpSpPr>
+        <a:xfrm>
+          <a:off x="0" y="0"/>
+          <a:ext cx="0" cy="0"/>
+          <a:chOff x="0" y="0"/>
+          <a:chExt cx="0" cy="0"/>
+        </a:xfrm>
+      </p:grpSpPr>
+      <p:sp>
+        <p:nvSpPr>
+          <p:cNvPr id="7" name="Title 6"/>
+          <p:cNvSpPr>
+            <a:spLocks noGrp="1"/>
+          </p:cNvSpPr>
+          <p:nvPr>
+            <p:ph type="title"/>
+          </p:nvPr>
+        </p:nvSpPr>
+        <p:spPr/>
+        <p:txBody>
+          <a:bodyPr/>
+          <a:lstStyle/>
+          <a:p>
+            <a:r>
+              <a:rPr lang="en-US" dirty="0"/>
+              <a:t>Microsoft </a:t>
+            </a:r>
+            <a:r>
+              <a:rPr lang="en-US" dirty="0">
+                <a:sym typeface="Webdings" panose="05030102010509060703" pitchFamily="18" charset="2"/>
+              </a:rPr>
+              <a:t> Containers</a:t>
+            </a:r>
+            <a:endParaRPr lang="en-US" dirty="0"/>
+          </a:p>
+        </p:txBody>
+      </p:sp>
+      <p:sp>
+        <p:nvSpPr>
+          <p:cNvPr id="8" name="Content Placeholder 7"/>
+          <p:cNvSpPr>
+            <a:spLocks noGrp="1"/>
+          </p:cNvSpPr>
+          <p:nvPr>
+            <p:ph sz="quarter" idx="12"/>
+          </p:nvPr>
+        </p:nvSpPr>
+        <p:spPr/>
+        <p:txBody>
+          <a:bodyPr/>
+          <a:lstStyle/>
+          <a:p>
+            <a:r>
+              <a:rPr lang="en-US" dirty="0"/>
               <a:t>Ready-made containers</a:t>
             </a:r>
           </a:p>
@@ -32997,13 +33476,19 @@
           <a:p>
             <a:pPr lvl="1"/>
             <a:r>
-              <a:rPr lang="en-US" dirty="0"/>
-              <a:t>Docker Machine with </a:t>
-            </a:r>
-            <a:r>
               <a:rPr lang="en-US" dirty="0">
                 <a:hlinkClick r:id="rId3"/>
               </a:rPr>
+              <a:t>Docker Machine</a:t>
+            </a:r>
+            <a:r>
+              <a:rPr lang="en-US" dirty="0"/>
+              <a:t> with </a:t>
+            </a:r>
+            <a:r>
+              <a:rPr lang="en-US" dirty="0">
+                <a:hlinkClick r:id="rId4"/>
+              </a:rPr>
               <a:t>Azure driver</a:t>
             </a:r>
             <a:endParaRPr lang="en-US" dirty="0"/>
@@ -33012,32 +33497,41 @@
             <a:pPr lvl="1"/>
             <a:r>
               <a:rPr lang="en-US" dirty="0"/>
-              <a:t>Run clusters (DC/OS and Docker Swarm) with </a:t>
-            </a:r>
-            <a:r>
-              <a:rPr lang="en-US" i="1" dirty="0"/>
+              <a:t>Run clusters (DC/OS, Docker Swarm, Kubernetes) with </a:t>
+            </a:r>
+            <a:r>
+              <a:rPr lang="en-US" dirty="0">
+                <a:hlinkClick r:id="rId5"/>
+              </a:rPr>
               <a:t>Azure Container Service</a:t>
             </a:r>
+            <a:endParaRPr lang="en-US" dirty="0"/>
           </a:p>
           <a:p>
             <a:r>
               <a:rPr lang="en-US" dirty="0"/>
-              <a:t>Ubuntu subsystem for Windows</a:t>
+              <a:t>Visual Studio Support</a:t>
             </a:r>
           </a:p>
           <a:p>
             <a:pPr lvl="1"/>
             <a:r>
-              <a:rPr lang="en-US" dirty="0"/>
-              <a:t>Not Docker, not Hyper-V</a:t>
-            </a:r>
+              <a:rPr lang="en-US" dirty="0">
+                <a:hlinkClick r:id="rId6"/>
+              </a:rPr>
+              <a:t>Visual Studio Tools for Docker</a:t>
+            </a:r>
+            <a:endParaRPr lang="en-US" dirty="0"/>
           </a:p>
           <a:p>
             <a:pPr lvl="1"/>
             <a:r>
-              <a:rPr lang="en-US" dirty="0"/>
-              <a:t>Pico processes</a:t>
-            </a:r>
+              <a:rPr lang="en-US" dirty="0">
+                <a:hlinkClick r:id="rId7"/>
+              </a:rPr>
+              <a:t>VSTS Docker Extension</a:t>
+            </a:r>
+            <a:endParaRPr lang="en-US" dirty="0"/>
           </a:p>
         </p:txBody>
       </p:sp>
@@ -33076,7 +33570,7 @@
 </p:sld>
 </file>
 
-<file path=ppt/slides/slide7.xml><?xml version="1.0" encoding="utf-8"?>
+<file path=ppt/slides/slide9.xml><?xml version="1.0" encoding="utf-8"?>
 <p:sld xmlns:a="http://schemas.openxmlformats.org/drawingml/2006/main" xmlns:r="http://schemas.openxmlformats.org/officeDocument/2006/relationships" xmlns:p="http://schemas.openxmlformats.org/presentationml/2006/main">
   <p:cSld>
     <p:spTree>
@@ -34015,304 +34509,6 @@
     <p:extLst>
       <p:ext uri="{BB962C8B-B14F-4D97-AF65-F5344CB8AC3E}">
         <p14:creationId xmlns:p14="http://schemas.microsoft.com/office/powerpoint/2010/main" val="2182578633"/>
-      </p:ext>
-    </p:extLst>
-  </p:cSld>
-  <p:clrMapOvr>
-    <a:masterClrMapping/>
-  </p:clrMapOvr>
-  <p:transition spd="slow">
-    <p:push/>
-  </p:transition>
-</p:sld>
-</file>
-
-<file path=ppt/slides/slide8.xml><?xml version="1.0" encoding="utf-8"?>
-<p:sld xmlns:a="http://schemas.openxmlformats.org/drawingml/2006/main" xmlns:r="http://schemas.openxmlformats.org/officeDocument/2006/relationships" xmlns:p="http://schemas.openxmlformats.org/presentationml/2006/main">
-  <p:cSld>
-    <p:spTree>
-      <p:nvGrpSpPr>
-        <p:cNvPr id="1" name=""/>
-        <p:cNvGrpSpPr/>
-        <p:nvPr/>
-      </p:nvGrpSpPr>
-      <p:grpSpPr>
-        <a:xfrm>
-          <a:off x="0" y="0"/>
-          <a:ext cx="0" cy="0"/>
-          <a:chOff x="0" y="0"/>
-          <a:chExt cx="0" cy="0"/>
-        </a:xfrm>
-      </p:grpSpPr>
-      <p:sp>
-        <p:nvSpPr>
-          <p:cNvPr id="2" name="Title 1"/>
-          <p:cNvSpPr>
-            <a:spLocks noGrp="1"/>
-          </p:cNvSpPr>
-          <p:nvPr>
-            <p:ph type="title"/>
-          </p:nvPr>
-        </p:nvSpPr>
-        <p:spPr/>
-        <p:txBody>
-          <a:bodyPr/>
-          <a:lstStyle/>
-          <a:p>
-            <a:r>
-              <a:rPr lang="en-US" dirty="0"/>
-              <a:t>Linux on Windows</a:t>
-            </a:r>
-          </a:p>
-        </p:txBody>
-      </p:sp>
-      <p:sp>
-        <p:nvSpPr>
-          <p:cNvPr id="3" name="Text Placeholder 2"/>
-          <p:cNvSpPr>
-            <a:spLocks noGrp="1"/>
-          </p:cNvSpPr>
-          <p:nvPr>
-            <p:ph type="body" sz="quarter" idx="25"/>
-          </p:nvPr>
-        </p:nvSpPr>
-        <p:spPr/>
-        <p:txBody>
-          <a:bodyPr/>
-          <a:lstStyle/>
-          <a:p>
-            <a:r>
-              <a:rPr lang="en-US" dirty="0"/>
-              <a:t>Running Linux containers on Windows</a:t>
-            </a:r>
-          </a:p>
-        </p:txBody>
-      </p:sp>
-    </p:spTree>
-    <p:extLst>
-      <p:ext uri="{BB962C8B-B14F-4D97-AF65-F5344CB8AC3E}">
-        <p14:creationId xmlns:p14="http://schemas.microsoft.com/office/powerpoint/2010/main" val="2845066567"/>
-      </p:ext>
-    </p:extLst>
-  </p:cSld>
-  <p:clrMapOvr>
-    <a:masterClrMapping/>
-  </p:clrMapOvr>
-  <mc:AlternateContent xmlns:mc="http://schemas.openxmlformats.org/markup-compatibility/2006" xmlns:p14="http://schemas.microsoft.com/office/powerpoint/2010/main">
-    <mc:Choice Requires="p14">
-      <p:transition spd="med" p14:dur="700">
-        <p:fade/>
-      </p:transition>
-    </mc:Choice>
-    <mc:Fallback xmlns="">
-      <p:transition spd="med">
-        <p:fade/>
-      </p:transition>
-    </mc:Fallback>
-  </mc:AlternateContent>
-</p:sld>
-</file>
-
-<file path=ppt/slides/slide9.xml><?xml version="1.0" encoding="utf-8"?>
-<p:sld xmlns:a="http://schemas.openxmlformats.org/drawingml/2006/main" xmlns:r="http://schemas.openxmlformats.org/officeDocument/2006/relationships" xmlns:p="http://schemas.openxmlformats.org/presentationml/2006/main">
-  <p:cSld>
-    <p:spTree>
-      <p:nvGrpSpPr>
-        <p:cNvPr id="1" name=""/>
-        <p:cNvGrpSpPr/>
-        <p:nvPr/>
-      </p:nvGrpSpPr>
-      <p:grpSpPr>
-        <a:xfrm>
-          <a:off x="0" y="0"/>
-          <a:ext cx="0" cy="0"/>
-          <a:chOff x="0" y="0"/>
-          <a:chExt cx="0" cy="0"/>
-        </a:xfrm>
-      </p:grpSpPr>
-      <p:sp>
-        <p:nvSpPr>
-          <p:cNvPr id="4" name="Title 3"/>
-          <p:cNvSpPr>
-            <a:spLocks noGrp="1"/>
-          </p:cNvSpPr>
-          <p:nvPr>
-            <p:ph type="title"/>
-          </p:nvPr>
-        </p:nvSpPr>
-        <p:spPr/>
-        <p:txBody>
-          <a:bodyPr/>
-          <a:lstStyle/>
-          <a:p>
-            <a:r>
-              <a:rPr lang="en-US" dirty="0"/>
-              <a:t>Linux on Windows</a:t>
-            </a:r>
-          </a:p>
-        </p:txBody>
-      </p:sp>
-      <p:sp>
-        <p:nvSpPr>
-          <p:cNvPr id="5" name="Content Placeholder 4"/>
-          <p:cNvSpPr>
-            <a:spLocks noGrp="1"/>
-          </p:cNvSpPr>
-          <p:nvPr>
-            <p:ph sz="quarter" idx="12"/>
-          </p:nvPr>
-        </p:nvSpPr>
-        <p:spPr/>
-        <p:txBody>
-          <a:bodyPr/>
-          <a:lstStyle/>
-          <a:p>
-            <a:r>
-              <a:rPr lang="en-US" dirty="0"/>
-              <a:t>Use Hyper-V to run Linux with Docker</a:t>
-            </a:r>
-          </a:p>
-          <a:p>
-            <a:pPr lvl="1"/>
-            <a:r>
-              <a:rPr lang="en-US" dirty="0"/>
-              <a:t>Manual setup and maintenance</a:t>
-            </a:r>
-          </a:p>
-          <a:p>
-            <a:pPr lvl="1"/>
-            <a:r>
-              <a:rPr lang="en-US" dirty="0"/>
-              <a:t>Use </a:t>
-            </a:r>
-            <a:r>
-              <a:rPr lang="en-US" dirty="0">
-                <a:hlinkClick r:id="rId2"/>
-              </a:rPr>
-              <a:t>Docker Machine</a:t>
-            </a:r>
-            <a:r>
-              <a:rPr lang="en-US" dirty="0"/>
-              <a:t> (included in </a:t>
-            </a:r>
-            <a:r>
-              <a:rPr lang="en-US" dirty="0">
-                <a:hlinkClick r:id="rId3"/>
-              </a:rPr>
-              <a:t>Docker Toolbox</a:t>
-            </a:r>
-            <a:r>
-              <a:rPr lang="en-US" dirty="0"/>
-              <a:t>) with </a:t>
-            </a:r>
-            <a:r>
-              <a:rPr lang="en-US" dirty="0">
-                <a:hlinkClick r:id="rId4"/>
-              </a:rPr>
-              <a:t>Hyper-V driver</a:t>
-            </a:r>
-            <a:endParaRPr lang="en-US" dirty="0"/>
-          </a:p>
-          <a:p>
-            <a:pPr lvl="1"/>
-            <a:endParaRPr lang="en-US" dirty="0"/>
-          </a:p>
-          <a:p>
-            <a:pPr lvl="1"/>
-            <a:endParaRPr lang="en-US" dirty="0"/>
-          </a:p>
-          <a:p>
-            <a:pPr lvl="1"/>
-            <a:endParaRPr lang="en-US" dirty="0"/>
-          </a:p>
-          <a:p>
-            <a:pPr lvl="1"/>
-            <a:endParaRPr lang="en-US" dirty="0"/>
-          </a:p>
-          <a:p>
-            <a:pPr lvl="1"/>
-            <a:endParaRPr lang="en-US" dirty="0"/>
-          </a:p>
-          <a:p>
-            <a:pPr lvl="1"/>
-            <a:endParaRPr lang="en-US" dirty="0"/>
-          </a:p>
-          <a:p>
-            <a:pPr lvl="1"/>
-            <a:endParaRPr lang="en-US" dirty="0"/>
-          </a:p>
-          <a:p>
-            <a:pPr lvl="1"/>
-            <a:r>
-              <a:rPr lang="en-US" dirty="0"/>
-              <a:t>Use </a:t>
-            </a:r>
-            <a:r>
-              <a:rPr lang="en-US" dirty="0">
-                <a:hlinkClick r:id="rId5"/>
-              </a:rPr>
-              <a:t>Docker for Windows</a:t>
-            </a:r>
-            <a:r>
-              <a:rPr lang="en-US" dirty="0"/>
-              <a:t> (Beta)</a:t>
-            </a:r>
-          </a:p>
-          <a:p>
-            <a:r>
-              <a:rPr lang="en-US" dirty="0"/>
-              <a:t>Run Docker client on Windows or Linux</a:t>
-            </a:r>
-          </a:p>
-        </p:txBody>
-      </p:sp>
-      <p:sp>
-        <p:nvSpPr>
-          <p:cNvPr id="6" name="Text Placeholder 5"/>
-          <p:cNvSpPr>
-            <a:spLocks noGrp="1"/>
-          </p:cNvSpPr>
-          <p:nvPr>
-            <p:ph type="body" sz="quarter" idx="23"/>
-          </p:nvPr>
-        </p:nvSpPr>
-        <p:spPr/>
-        <p:txBody>
-          <a:bodyPr/>
-          <a:lstStyle/>
-          <a:p>
-            <a:endParaRPr lang="en-US" dirty="0"/>
-          </a:p>
-        </p:txBody>
-      </p:sp>
-      <p:pic>
-        <p:nvPicPr>
-          <p:cNvPr id="7" name="Picture 6"/>
-          <p:cNvPicPr>
-            <a:picLocks noChangeAspect="1"/>
-          </p:cNvPicPr>
-          <p:nvPr/>
-        </p:nvPicPr>
-        <p:blipFill>
-          <a:blip r:embed="rId6"/>
-          <a:stretch>
-            <a:fillRect/>
-          </a:stretch>
-        </p:blipFill>
-        <p:spPr>
-          <a:xfrm>
-            <a:off x="876300" y="2093075"/>
-            <a:ext cx="3342409" cy="1654008"/>
-          </a:xfrm>
-          <a:prstGeom prst="rect">
-            <a:avLst/>
-          </a:prstGeom>
-        </p:spPr>
-      </p:pic>
-    </p:spTree>
-    <p:extLst>
-      <p:ext uri="{BB962C8B-B14F-4D97-AF65-F5344CB8AC3E}">
-        <p14:creationId xmlns:p14="http://schemas.microsoft.com/office/powerpoint/2010/main" val="1085669086"/>
       </p:ext>
     </p:extLst>
   </p:cSld>

</xml_diff>

<commit_message>
Refresh slides and samples for Nano Server and containers
</commit_message>
<xml_diff>
--- a/slides/Containers-Microsoft-Universe.pptx
+++ b/slides/Containers-Microsoft-Universe.pptx
@@ -27,9 +27,12 @@
     <p:sldId id="340" r:id="rId21"/>
     <p:sldId id="341" r:id="rId22"/>
     <p:sldId id="342" r:id="rId23"/>
-    <p:sldId id="343" r:id="rId24"/>
-    <p:sldId id="344" r:id="rId25"/>
-    <p:sldId id="322" r:id="rId26"/>
+    <p:sldId id="347" r:id="rId24"/>
+    <p:sldId id="348" r:id="rId25"/>
+    <p:sldId id="349" r:id="rId26"/>
+    <p:sldId id="343" r:id="rId27"/>
+    <p:sldId id="344" r:id="rId28"/>
+    <p:sldId id="322" r:id="rId29"/>
   </p:sldIdLst>
   <p:sldSz cx="9144000" cy="5143500" type="screen16x9"/>
   <p:notesSz cx="6858000" cy="9144000"/>
@@ -184,6 +187,65 @@
     </a:lvl9pPr>
   </p:defaultTextStyle>
   <p:extLst>
+    <p:ext uri="{521415D9-36F7-43E2-AB2F-B90AF26B5E84}">
+      <p14:sectionLst xmlns:p14="http://schemas.microsoft.com/office/powerpoint/2010/main">
+        <p14:section name="Intro" id="{C559E0A4-AA95-41FE-A6E4-919DE0265B61}">
+          <p14:sldIdLst>
+            <p14:sldId id="297"/>
+            <p14:sldId id="266"/>
+            <p14:sldId id="323"/>
+          </p14:sldIdLst>
+        </p14:section>
+        <p14:section name="Overview" id="{25CFC70C-139B-4091-A53A-663017A2E8F0}">
+          <p14:sldIdLst>
+            <p14:sldId id="327"/>
+            <p14:sldId id="325"/>
+            <p14:sldId id="346"/>
+            <p14:sldId id="345"/>
+            <p14:sldId id="326"/>
+            <p14:sldId id="328"/>
+          </p14:sldIdLst>
+        </p14:section>
+        <p14:section name="Linux on Windows" id="{A559C975-F723-4435-8D71-0067758FBC61}">
+          <p14:sldIdLst>
+            <p14:sldId id="329"/>
+            <p14:sldId id="330"/>
+            <p14:sldId id="334"/>
+            <p14:sldId id="336"/>
+          </p14:sldIdLst>
+        </p14:section>
+        <p14:section name="Windows on Windows" id="{D5F7E770-A59A-4D3E-885C-098426A7C44A}">
+          <p14:sldIdLst>
+            <p14:sldId id="332"/>
+            <p14:sldId id="333"/>
+            <p14:sldId id="337"/>
+            <p14:sldId id="338"/>
+          </p14:sldIdLst>
+        </p14:section>
+        <p14:section name="Docker on Azure" id="{DBE68348-546D-4F8F-B4F9-FF618E6AA11D}">
+          <p14:sldIdLst>
+            <p14:sldId id="339"/>
+            <p14:sldId id="340"/>
+            <p14:sldId id="341"/>
+            <p14:sldId id="342"/>
+          </p14:sldIdLst>
+        </p14:section>
+        <p14:section name="Developer Tools" id="{8D3E26B5-4DF3-4CD5-BC29-40777AC2A022}">
+          <p14:sldIdLst>
+            <p14:sldId id="347"/>
+            <p14:sldId id="348"/>
+            <p14:sldId id="349"/>
+          </p14:sldIdLst>
+        </p14:section>
+        <p14:section name="Closing" id="{4761B1E4-8EE2-40CB-A150-1A6C59B51778}">
+          <p14:sldIdLst>
+            <p14:sldId id="343"/>
+            <p14:sldId id="344"/>
+            <p14:sldId id="322"/>
+          </p14:sldIdLst>
+        </p14:section>
+      </p14:sectionLst>
+    </p:ext>
     <p:ext uri="{EFAFB233-063F-42B5-8137-9DF3F51BA10A}">
       <p15:sldGuideLst xmlns:p15="http://schemas.microsoft.com/office/powerpoint/2012/main">
         <p15:guide id="1" orient="horz" pos="1620">
@@ -29970,6 +30032,21 @@
               <a:t>dotnet run</a:t>
             </a:r>
           </a:p>
+          <a:p>
+            <a:endParaRPr lang="en-US" noProof="1"/>
+          </a:p>
+          <a:p>
+            <a:r>
+              <a:rPr lang="en-US" noProof="1"/>
+              <a:t># Option: Show .NET Core with VSCode and </a:t>
+            </a:r>
+          </a:p>
+          <a:p>
+            <a:r>
+              <a:rPr lang="en-US" noProof="1"/>
+              <a:t>#         Volume mapping</a:t>
+            </a:r>
+          </a:p>
         </p:txBody>
       </p:sp>
       <p:sp>
@@ -30274,86 +30351,26 @@
           <a:p>
             <a:pPr lvl="1"/>
             <a:r>
-              <a:rPr lang="en-US" sz="1400" dirty="0" err="1">
+              <a:rPr lang="en-US" sz="1400" noProof="1">
                 <a:latin typeface="Lucida Console" panose="020B0609040504020204" pitchFamily="49" charset="0"/>
               </a:rPr>
-              <a:t>docker</a:t>
-            </a:r>
-            <a:r>
-              <a:rPr lang="en-US" sz="1400" dirty="0">
+              <a:t>docker run -it --rm </a:t>
+            </a:r>
+            <a:r>
+              <a:rPr lang="en-US" sz="1400" noProof="1">
+                <a:solidFill>
+                  <a:srgbClr val="FF0000"/>
+                </a:solidFill>
                 <a:latin typeface="Lucida Console" panose="020B0609040504020204" pitchFamily="49" charset="0"/>
               </a:rPr>
-              <a:t> run -it --</a:t>
-            </a:r>
-            <a:r>
-              <a:rPr lang="en-US" sz="1400" dirty="0" err="1">
+              <a:t>--isolation=hyperv</a:t>
+            </a:r>
+            <a:r>
+              <a:rPr lang="en-US" sz="1400" noProof="1">
                 <a:latin typeface="Lucida Console" panose="020B0609040504020204" pitchFamily="49" charset="0"/>
               </a:rPr>
-              <a:t>rm</a:t>
-            </a:r>
-            <a:r>
-              <a:rPr lang="en-US" sz="1400" dirty="0">
-                <a:latin typeface="Lucida Console" panose="020B0609040504020204" pitchFamily="49" charset="0"/>
-              </a:rPr>
-              <a:t> </a:t>
-            </a:r>
-            <a:r>
-              <a:rPr lang="en-US" sz="1400" dirty="0">
-                <a:solidFill>
-                  <a:srgbClr val="FF0000"/>
-                </a:solidFill>
-                <a:latin typeface="Lucida Console" panose="020B0609040504020204" pitchFamily="49" charset="0"/>
-              </a:rPr>
-              <a:t>--isolation=</a:t>
-            </a:r>
-            <a:r>
-              <a:rPr lang="en-US" sz="1400" dirty="0" err="1">
-                <a:solidFill>
-                  <a:srgbClr val="FF0000"/>
-                </a:solidFill>
-                <a:latin typeface="Lucida Console" panose="020B0609040504020204" pitchFamily="49" charset="0"/>
-              </a:rPr>
-              <a:t>hyperv</a:t>
-            </a:r>
-            <a:r>
-              <a:rPr lang="en-US" sz="1400" dirty="0">
-                <a:latin typeface="Lucida Console" panose="020B0609040504020204" pitchFamily="49" charset="0"/>
-              </a:rPr>
-              <a:t> </a:t>
-            </a:r>
-            <a:r>
-              <a:rPr lang="en-US" sz="1400" dirty="0" err="1">
-                <a:latin typeface="Lucida Console" panose="020B0609040504020204" pitchFamily="49" charset="0"/>
-              </a:rPr>
-              <a:t>microsoft</a:t>
-            </a:r>
-            <a:r>
-              <a:rPr lang="en-US" sz="1400" dirty="0">
-                <a:latin typeface="Lucida Console" panose="020B0609040504020204" pitchFamily="49" charset="0"/>
-              </a:rPr>
-              <a:t>/</a:t>
-            </a:r>
-            <a:r>
-              <a:rPr lang="en-US" sz="1400" dirty="0" err="1">
-                <a:latin typeface="Lucida Console" panose="020B0609040504020204" pitchFamily="49" charset="0"/>
-              </a:rPr>
-              <a:t>nanoserver</a:t>
-            </a:r>
-            <a:r>
-              <a:rPr lang="en-US" sz="1400" dirty="0">
-                <a:latin typeface="Lucida Console" panose="020B0609040504020204" pitchFamily="49" charset="0"/>
-              </a:rPr>
-              <a:t> </a:t>
-            </a:r>
-            <a:r>
-              <a:rPr lang="en-US" sz="1400" dirty="0" err="1">
-                <a:latin typeface="Lucida Console" panose="020B0609040504020204" pitchFamily="49" charset="0"/>
-              </a:rPr>
-              <a:t>cmd</a:t>
-            </a:r>
-            <a:endParaRPr lang="en-US" sz="1400" dirty="0">
-              <a:latin typeface="Lucida Console" panose="020B0609040504020204" pitchFamily="49" charset="0"/>
-            </a:endParaRPr>
+              <a:t> microsoft/nanoserver cmd</a:t>
+            </a:r>
           </a:p>
         </p:txBody>
       </p:sp>
@@ -30448,21 +30465,28 @@
           <a:p>
             <a:r>
               <a:rPr lang="en-US" dirty="0"/>
-              <a:t>Nano Server with Docker</a:t>
+              <a:t>Docker on Windows </a:t>
+            </a:r>
+            <a:br>
+              <a:rPr lang="en-US" dirty="0"/>
+            </a:br>
+            <a:r>
+              <a:rPr lang="en-US" dirty="0"/>
+              <a:t>Server 2016</a:t>
             </a:r>
           </a:p>
           <a:p>
             <a:pPr lvl="1"/>
             <a:r>
               <a:rPr lang="en-US" dirty="0"/>
-              <a:t>Setup (PowerShell)</a:t>
+              <a:t>Full Server</a:t>
             </a:r>
           </a:p>
           <a:p>
             <a:pPr lvl="1"/>
             <a:r>
               <a:rPr lang="en-US" dirty="0"/>
-              <a:t>Hyper-V</a:t>
+              <a:t>Nano Server</a:t>
             </a:r>
           </a:p>
           <a:p>
@@ -30482,7 +30506,7 @@
             <a:pPr lvl="1"/>
             <a:r>
               <a:rPr lang="en-US" dirty="0"/>
-              <a:t>Remote Docker client</a:t>
+              <a:t>Remote Docker (Linux and Windows) client</a:t>
             </a:r>
           </a:p>
           <a:p>
@@ -30633,19 +30657,19 @@
           <a:p>
             <a:r>
               <a:rPr lang="en-US" i="1" noProof="1"/>
-              <a:t># Ping Docker host on Nano Server</a:t>
+              <a:t># Ping Docker host on Windows Server</a:t>
             </a:r>
           </a:p>
           <a:p>
             <a:r>
               <a:rPr lang="en-US" noProof="1"/>
-              <a:t>docker -H tcp://169.254.165.219:2375 info</a:t>
+              <a:t>docker -H tcp://1.2.3.4:2375 info</a:t>
             </a:r>
           </a:p>
           <a:p>
             <a:r>
               <a:rPr lang="en-US" noProof="1"/>
-              <a:t>set DOCKER_HOST=tcp://169.254.165.219:2375</a:t>
+              <a:t>set DOCKER_HOST=tcp://1.2.3.4:2375</a:t>
             </a:r>
           </a:p>
           <a:p>
@@ -30678,7 +30702,7 @@
           <a:p>
             <a:r>
               <a:rPr lang="en-US" noProof="1"/>
-              <a:t>docker run -it --rm nanoserver cmd /C dir</a:t>
+              <a:t>docker run -it --rm microsoft/nanoserver cmd /C dir</a:t>
             </a:r>
           </a:p>
           <a:p>
@@ -30695,7 +30719,6 @@
               <a:rPr lang="en-US" noProof="1"/>
               <a:t>docker run -d -p 80:80 microsoft/iis cmd ping localhost -t</a:t>
             </a:r>
-            <a:endParaRPr lang="en-US" noProof="1"/>
           </a:p>
           <a:p>
             <a:endParaRPr lang="en-US" noProof="1"/>
@@ -30744,19 +30767,19 @@
           <a:p>
             <a:r>
               <a:rPr lang="en-US" noProof="1"/>
-              <a:t>cd \install</a:t>
+              <a:t>	cd \install</a:t>
             </a:r>
           </a:p>
           <a:p>
             <a:r>
               <a:rPr lang="en-US" noProof="1"/>
-              <a:t>dism /online /apply-unattend:.\unattend.xml</a:t>
+              <a:t>	dism /online /apply-unattend:.\unattend.xml</a:t>
             </a:r>
           </a:p>
           <a:p>
             <a:r>
               <a:rPr lang="en-US" noProof="1"/>
-              <a:t>net start w3svc</a:t>
+              <a:t>	net start w3svc</a:t>
             </a:r>
           </a:p>
           <a:p>
@@ -30777,7 +30800,7 @@
           <a:p>
             <a:r>
               <a:rPr lang="en-US" noProof="1"/>
-              <a:t>c:\docker\docker.exe run --rm -v c:\temp:c:\somedir nanoserver cmd /C type \somedir\greeting.txt </a:t>
+              <a:t>c:\docker\docker.exe run --rm -v c:\temp:c:\somedir microsoft/nanoserver cmd /C type \somedir\greeting.txt </a:t>
             </a:r>
           </a:p>
           <a:p>
@@ -30828,7 +30851,14 @@
             <a:pPr lvl="1"/>
             <a:r>
               <a:rPr lang="en-US" dirty="0"/>
-              <a:t>Nano Server on Hyper-V with Container support</a:t>
+              <a:t>Windows Server with </a:t>
+            </a:r>
+            <a:br>
+              <a:rPr lang="en-US" dirty="0"/>
+            </a:br>
+            <a:r>
+              <a:rPr lang="en-US" dirty="0"/>
+              <a:t>Container support</a:t>
             </a:r>
           </a:p>
         </p:txBody>
@@ -30848,7 +30878,25 @@
           <a:bodyPr/>
           <a:lstStyle/>
           <a:p>
-            <a:endParaRPr lang="de-AT"/>
+            <a:r>
+              <a:rPr lang="de-AT" dirty="0"/>
+              <a:t>See also sample </a:t>
+            </a:r>
+            <a:r>
+              <a:rPr lang="de-AT" dirty="0" err="1"/>
+              <a:t>Dockerfile</a:t>
+            </a:r>
+            <a:r>
+              <a:rPr lang="de-AT" dirty="0"/>
+              <a:t> </a:t>
+            </a:r>
+            <a:r>
+              <a:rPr lang="de-AT" dirty="0">
+                <a:hlinkClick r:id="rId3"/>
+              </a:rPr>
+              <a:t>https://github.com/rstropek/DockerVS2015Intro/blob/master/dockerDemos/07-win-container-nano-server/Dockerfile</a:t>
+            </a:r>
+            <a:endParaRPr lang="de-AT" dirty="0"/>
           </a:p>
         </p:txBody>
       </p:sp>
@@ -31711,13 +31759,8 @@
           <a:p>
             <a:r>
               <a:rPr lang="en-US" i="1" dirty="0"/>
-              <a:t>	# Show result </a:t>
-            </a:r>
-            <a:r>
-              <a:rPr lang="en-US" i="1"/>
-              <a:t>in Azure Portal</a:t>
-            </a:r>
-            <a:endParaRPr lang="en-US" i="1" dirty="0"/>
+              <a:t>	# Show result in Azure Portal</a:t>
+            </a:r>
           </a:p>
         </p:txBody>
       </p:sp>
@@ -31888,7 +31931,7 @@
           <a:p>
             <a:r>
               <a:rPr lang="en-US" dirty="0"/>
-              <a:t>Summary</a:t>
+              <a:t>Developer Tools</a:t>
             </a:r>
           </a:p>
         </p:txBody>
@@ -31908,14 +31951,17 @@
           <a:bodyPr/>
           <a:lstStyle/>
           <a:p>
-            <a:endParaRPr lang="en-US" dirty="0"/>
+            <a:r>
+              <a:rPr lang="en-US" dirty="0"/>
+              <a:t>Visual Studio support</a:t>
+            </a:r>
           </a:p>
         </p:txBody>
       </p:sp>
     </p:spTree>
     <p:extLst>
       <p:ext uri="{BB962C8B-B14F-4D97-AF65-F5344CB8AC3E}">
-        <p14:creationId xmlns:p14="http://schemas.microsoft.com/office/powerpoint/2010/main" val="2272855957"/>
+        <p14:creationId xmlns:p14="http://schemas.microsoft.com/office/powerpoint/2010/main" val="615500890"/>
       </p:ext>
     </p:extLst>
   </p:cSld>
@@ -31971,6 +32017,615 @@
           <a:p>
             <a:r>
               <a:rPr lang="de-AT" dirty="0"/>
+              <a:t>Visual Studio</a:t>
+            </a:r>
+          </a:p>
+        </p:txBody>
+      </p:sp>
+      <p:pic>
+        <p:nvPicPr>
+          <p:cNvPr id="9" name="Content Placeholder 8"/>
+          <p:cNvPicPr>
+            <a:picLocks noGrp="1" noChangeAspect="1"/>
+          </p:cNvPicPr>
+          <p:nvPr>
+            <p:ph sz="quarter" idx="22"/>
+          </p:nvPr>
+        </p:nvPicPr>
+        <p:blipFill>
+          <a:blip r:embed="rId2"/>
+          <a:stretch>
+            <a:fillRect/>
+          </a:stretch>
+        </p:blipFill>
+        <p:spPr>
+          <a:xfrm>
+            <a:off x="357477" y="684246"/>
+            <a:ext cx="5327650" cy="1750387"/>
+          </a:xfrm>
+          <a:prstGeom prst="rect">
+            <a:avLst/>
+          </a:prstGeom>
+        </p:spPr>
+      </p:pic>
+      <p:sp>
+        <p:nvSpPr>
+          <p:cNvPr id="6" name="Text Placeholder 5"/>
+          <p:cNvSpPr>
+            <a:spLocks noGrp="1"/>
+          </p:cNvSpPr>
+          <p:nvPr>
+            <p:ph type="body" sz="quarter" idx="23"/>
+          </p:nvPr>
+        </p:nvSpPr>
+        <p:spPr/>
+        <p:txBody>
+          <a:bodyPr/>
+          <a:lstStyle/>
+          <a:p>
+            <a:endParaRPr lang="de-AT"/>
+          </a:p>
+        </p:txBody>
+      </p:sp>
+      <p:sp>
+        <p:nvSpPr>
+          <p:cNvPr id="7" name="Text Placeholder 6"/>
+          <p:cNvSpPr>
+            <a:spLocks noGrp="1"/>
+          </p:cNvSpPr>
+          <p:nvPr>
+            <p:ph type="body" sz="quarter" idx="24"/>
+          </p:nvPr>
+        </p:nvSpPr>
+        <p:spPr/>
+        <p:txBody>
+          <a:bodyPr/>
+          <a:lstStyle/>
+          <a:p>
+            <a:r>
+              <a:rPr lang="de-AT" dirty="0">
+                <a:hlinkClick r:id="rId3"/>
+              </a:rPr>
+              <a:t>Docker Tools </a:t>
+            </a:r>
+            <a:r>
+              <a:rPr lang="de-AT" dirty="0" err="1">
+                <a:hlinkClick r:id="rId3"/>
+              </a:rPr>
+              <a:t>for</a:t>
+            </a:r>
+            <a:r>
+              <a:rPr lang="de-AT" dirty="0">
+                <a:hlinkClick r:id="rId3"/>
+              </a:rPr>
+              <a:t> </a:t>
+            </a:r>
+            <a:br>
+              <a:rPr lang="de-AT" dirty="0">
+                <a:hlinkClick r:id="rId3"/>
+              </a:rPr>
+            </a:br>
+            <a:r>
+              <a:rPr lang="de-AT" dirty="0">
+                <a:hlinkClick r:id="rId3"/>
+              </a:rPr>
+              <a:t>Visual Studio</a:t>
+            </a:r>
+            <a:endParaRPr lang="de-AT" dirty="0"/>
+          </a:p>
+          <a:p>
+            <a:r>
+              <a:rPr lang="de-AT" dirty="0"/>
+              <a:t>Docker </a:t>
+            </a:r>
+            <a:r>
+              <a:rPr lang="de-AT" dirty="0" err="1"/>
+              <a:t>support</a:t>
+            </a:r>
+            <a:r>
+              <a:rPr lang="de-AT" dirty="0"/>
+              <a:t> </a:t>
+            </a:r>
+            <a:r>
+              <a:rPr lang="de-AT" dirty="0" err="1"/>
+              <a:t>for</a:t>
+            </a:r>
+            <a:r>
+              <a:rPr lang="de-AT" dirty="0"/>
+              <a:t> </a:t>
+            </a:r>
+            <a:br>
+              <a:rPr lang="de-AT" dirty="0"/>
+            </a:br>
+            <a:r>
+              <a:rPr lang="de-AT" dirty="0"/>
+              <a:t>Visual Studio Code</a:t>
+            </a:r>
+          </a:p>
+        </p:txBody>
+      </p:sp>
+      <p:sp>
+        <p:nvSpPr>
+          <p:cNvPr id="8" name="Text Placeholder 7"/>
+          <p:cNvSpPr>
+            <a:spLocks noGrp="1"/>
+          </p:cNvSpPr>
+          <p:nvPr>
+            <p:ph type="body" sz="quarter" idx="25"/>
+          </p:nvPr>
+        </p:nvSpPr>
+        <p:spPr/>
+        <p:txBody>
+          <a:bodyPr/>
+          <a:lstStyle/>
+          <a:p>
+            <a:endParaRPr lang="de-AT"/>
+          </a:p>
+        </p:txBody>
+      </p:sp>
+      <p:sp>
+        <p:nvSpPr>
+          <p:cNvPr id="10" name="Rectangle 9"/>
+          <p:cNvSpPr/>
+          <p:nvPr/>
+        </p:nvSpPr>
+        <p:spPr>
+          <a:xfrm>
+            <a:off x="391391" y="1551709"/>
+            <a:ext cx="1808017" cy="377536"/>
+          </a:xfrm>
+          <a:prstGeom prst="rect">
+            <a:avLst/>
+          </a:prstGeom>
+          <a:noFill/>
+          <a:ln>
+            <a:solidFill>
+              <a:srgbClr val="FF0000"/>
+            </a:solidFill>
+          </a:ln>
+        </p:spPr>
+        <p:style>
+          <a:lnRef idx="2">
+            <a:schemeClr val="accent1">
+              <a:shade val="50000"/>
+            </a:schemeClr>
+          </a:lnRef>
+          <a:fillRef idx="1">
+            <a:schemeClr val="accent1"/>
+          </a:fillRef>
+          <a:effectRef idx="0">
+            <a:schemeClr val="accent1"/>
+          </a:effectRef>
+          <a:fontRef idx="minor">
+            <a:schemeClr val="lt1"/>
+          </a:fontRef>
+        </p:style>
+        <p:txBody>
+          <a:bodyPr rtlCol="0" anchor="ctr"/>
+          <a:lstStyle/>
+          <a:p>
+            <a:pPr algn="ctr"/>
+            <a:endParaRPr lang="de-AT"/>
+          </a:p>
+        </p:txBody>
+      </p:sp>
+      <p:pic>
+        <p:nvPicPr>
+          <p:cNvPr id="11" name="Picture 10"/>
+          <p:cNvPicPr>
+            <a:picLocks noChangeAspect="1"/>
+          </p:cNvPicPr>
+          <p:nvPr/>
+        </p:nvPicPr>
+        <p:blipFill>
+          <a:blip r:embed="rId4"/>
+          <a:stretch>
+            <a:fillRect/>
+          </a:stretch>
+        </p:blipFill>
+        <p:spPr>
+          <a:xfrm>
+            <a:off x="357477" y="2596024"/>
+            <a:ext cx="6812973" cy="2323166"/>
+          </a:xfrm>
+          <a:prstGeom prst="rect">
+            <a:avLst/>
+          </a:prstGeom>
+        </p:spPr>
+      </p:pic>
+      <p:sp>
+        <p:nvSpPr>
+          <p:cNvPr id="12" name="Rectangle 11"/>
+          <p:cNvSpPr/>
+          <p:nvPr/>
+        </p:nvSpPr>
+        <p:spPr>
+          <a:xfrm>
+            <a:off x="616527" y="3302095"/>
+            <a:ext cx="2673928" cy="597959"/>
+          </a:xfrm>
+          <a:prstGeom prst="rect">
+            <a:avLst/>
+          </a:prstGeom>
+          <a:noFill/>
+          <a:ln>
+            <a:solidFill>
+              <a:srgbClr val="FF0000"/>
+            </a:solidFill>
+          </a:ln>
+        </p:spPr>
+        <p:style>
+          <a:lnRef idx="2">
+            <a:schemeClr val="accent1">
+              <a:shade val="50000"/>
+            </a:schemeClr>
+          </a:lnRef>
+          <a:fillRef idx="1">
+            <a:schemeClr val="accent1"/>
+          </a:fillRef>
+          <a:effectRef idx="0">
+            <a:schemeClr val="accent1"/>
+          </a:effectRef>
+          <a:fontRef idx="minor">
+            <a:schemeClr val="lt1"/>
+          </a:fontRef>
+        </p:style>
+        <p:txBody>
+          <a:bodyPr rtlCol="0" anchor="ctr"/>
+          <a:lstStyle/>
+          <a:p>
+            <a:pPr algn="ctr"/>
+            <a:endParaRPr lang="de-AT"/>
+          </a:p>
+        </p:txBody>
+      </p:sp>
+    </p:spTree>
+    <p:extLst>
+      <p:ext uri="{BB962C8B-B14F-4D97-AF65-F5344CB8AC3E}">
+        <p14:creationId xmlns:p14="http://schemas.microsoft.com/office/powerpoint/2010/main" val="1724829574"/>
+      </p:ext>
+    </p:extLst>
+  </p:cSld>
+  <p:clrMapOvr>
+    <a:masterClrMapping/>
+  </p:clrMapOvr>
+  <p:transition spd="slow">
+    <p:push/>
+  </p:transition>
+</p:sld>
+</file>
+
+<file path=ppt/slides/slide24.xml><?xml version="1.0" encoding="utf-8"?>
+<p:sld xmlns:a="http://schemas.openxmlformats.org/drawingml/2006/main" xmlns:r="http://schemas.openxmlformats.org/officeDocument/2006/relationships" xmlns:p="http://schemas.openxmlformats.org/presentationml/2006/main">
+  <p:cSld>
+    <p:spTree>
+      <p:nvGrpSpPr>
+        <p:cNvPr id="1" name=""/>
+        <p:cNvGrpSpPr/>
+        <p:nvPr/>
+      </p:nvGrpSpPr>
+      <p:grpSpPr>
+        <a:xfrm>
+          <a:off x="0" y="0"/>
+          <a:ext cx="0" cy="0"/>
+          <a:chOff x="0" y="0"/>
+          <a:chExt cx="0" cy="0"/>
+        </a:xfrm>
+      </p:grpSpPr>
+      <p:sp>
+        <p:nvSpPr>
+          <p:cNvPr id="4" name="Title 3"/>
+          <p:cNvSpPr>
+            <a:spLocks noGrp="1"/>
+          </p:cNvSpPr>
+          <p:nvPr>
+            <p:ph type="title"/>
+          </p:nvPr>
+        </p:nvSpPr>
+        <p:spPr/>
+        <p:txBody>
+          <a:bodyPr/>
+          <a:lstStyle/>
+          <a:p>
+            <a:r>
+              <a:rPr lang="de-AT" dirty="0"/>
+              <a:t>TFS/VSTS</a:t>
+            </a:r>
+          </a:p>
+        </p:txBody>
+      </p:sp>
+      <p:sp>
+        <p:nvSpPr>
+          <p:cNvPr id="6" name="Text Placeholder 5"/>
+          <p:cNvSpPr>
+            <a:spLocks noGrp="1"/>
+          </p:cNvSpPr>
+          <p:nvPr>
+            <p:ph type="body" sz="quarter" idx="23"/>
+          </p:nvPr>
+        </p:nvSpPr>
+        <p:spPr/>
+        <p:txBody>
+          <a:bodyPr/>
+          <a:lstStyle/>
+          <a:p>
+            <a:endParaRPr lang="de-AT"/>
+          </a:p>
+        </p:txBody>
+      </p:sp>
+      <p:sp>
+        <p:nvSpPr>
+          <p:cNvPr id="7" name="Text Placeholder 6"/>
+          <p:cNvSpPr>
+            <a:spLocks noGrp="1"/>
+          </p:cNvSpPr>
+          <p:nvPr>
+            <p:ph type="body" sz="quarter" idx="24"/>
+          </p:nvPr>
+        </p:nvSpPr>
+        <p:spPr/>
+        <p:txBody>
+          <a:bodyPr/>
+          <a:lstStyle/>
+          <a:p>
+            <a:r>
+              <a:rPr lang="de-AT" dirty="0">
+                <a:hlinkClick r:id="rId2"/>
+              </a:rPr>
+              <a:t>Docker </a:t>
+            </a:r>
+            <a:r>
+              <a:rPr lang="de-AT" dirty="0" err="1">
+                <a:hlinkClick r:id="rId2"/>
+              </a:rPr>
+              <a:t>extensions</a:t>
+            </a:r>
+            <a:r>
+              <a:rPr lang="de-AT" dirty="0">
+                <a:hlinkClick r:id="rId2"/>
+              </a:rPr>
+              <a:t> </a:t>
+            </a:r>
+            <a:r>
+              <a:rPr lang="de-AT" dirty="0" err="1">
+                <a:hlinkClick r:id="rId2"/>
+              </a:rPr>
+              <a:t>for</a:t>
+            </a:r>
+            <a:r>
+              <a:rPr lang="de-AT" dirty="0">
+                <a:hlinkClick r:id="rId2"/>
+              </a:rPr>
+              <a:t> TFS/VSTS</a:t>
+            </a:r>
+            <a:endParaRPr lang="de-AT" dirty="0"/>
+          </a:p>
+        </p:txBody>
+      </p:sp>
+      <p:sp>
+        <p:nvSpPr>
+          <p:cNvPr id="8" name="Text Placeholder 7"/>
+          <p:cNvSpPr>
+            <a:spLocks noGrp="1"/>
+          </p:cNvSpPr>
+          <p:nvPr>
+            <p:ph type="body" sz="quarter" idx="25"/>
+          </p:nvPr>
+        </p:nvSpPr>
+        <p:spPr/>
+        <p:txBody>
+          <a:bodyPr/>
+          <a:lstStyle/>
+          <a:p>
+            <a:endParaRPr lang="de-AT"/>
+          </a:p>
+        </p:txBody>
+      </p:sp>
+      <p:pic>
+        <p:nvPicPr>
+          <p:cNvPr id="3" name="Content Placeholder 2"/>
+          <p:cNvPicPr>
+            <a:picLocks noGrp="1" noChangeAspect="1"/>
+          </p:cNvPicPr>
+          <p:nvPr>
+            <p:ph sz="quarter" idx="22"/>
+          </p:nvPr>
+        </p:nvPicPr>
+        <p:blipFill>
+          <a:blip r:embed="rId3"/>
+          <a:stretch>
+            <a:fillRect/>
+          </a:stretch>
+        </p:blipFill>
+        <p:spPr>
+          <a:xfrm>
+            <a:off x="527782" y="684213"/>
+            <a:ext cx="5208712" cy="4214812"/>
+          </a:xfrm>
+          <a:prstGeom prst="rect">
+            <a:avLst/>
+          </a:prstGeom>
+        </p:spPr>
+      </p:pic>
+      <p:sp>
+        <p:nvSpPr>
+          <p:cNvPr id="13" name="Rectangle 12"/>
+          <p:cNvSpPr/>
+          <p:nvPr/>
+        </p:nvSpPr>
+        <p:spPr>
+          <a:xfrm>
+            <a:off x="422564" y="2473036"/>
+            <a:ext cx="3564081" cy="2327563"/>
+          </a:xfrm>
+          <a:prstGeom prst="rect">
+            <a:avLst/>
+          </a:prstGeom>
+          <a:noFill/>
+          <a:ln>
+            <a:solidFill>
+              <a:srgbClr val="FF0000"/>
+            </a:solidFill>
+          </a:ln>
+        </p:spPr>
+        <p:style>
+          <a:lnRef idx="2">
+            <a:schemeClr val="accent1">
+              <a:shade val="50000"/>
+            </a:schemeClr>
+          </a:lnRef>
+          <a:fillRef idx="1">
+            <a:schemeClr val="accent1"/>
+          </a:fillRef>
+          <a:effectRef idx="0">
+            <a:schemeClr val="accent1"/>
+          </a:effectRef>
+          <a:fontRef idx="minor">
+            <a:schemeClr val="lt1"/>
+          </a:fontRef>
+        </p:style>
+        <p:txBody>
+          <a:bodyPr rtlCol="0" anchor="ctr"/>
+          <a:lstStyle/>
+          <a:p>
+            <a:pPr algn="ctr"/>
+            <a:endParaRPr lang="de-AT"/>
+          </a:p>
+        </p:txBody>
+      </p:sp>
+    </p:spTree>
+    <p:extLst>
+      <p:ext uri="{BB962C8B-B14F-4D97-AF65-F5344CB8AC3E}">
+        <p14:creationId xmlns:p14="http://schemas.microsoft.com/office/powerpoint/2010/main" val="2449036244"/>
+      </p:ext>
+    </p:extLst>
+  </p:cSld>
+  <p:clrMapOvr>
+    <a:masterClrMapping/>
+  </p:clrMapOvr>
+  <p:transition spd="slow">
+    <p:push/>
+  </p:transition>
+</p:sld>
+</file>
+
+<file path=ppt/slides/slide25.xml><?xml version="1.0" encoding="utf-8"?>
+<p:sld xmlns:a="http://schemas.openxmlformats.org/drawingml/2006/main" xmlns:r="http://schemas.openxmlformats.org/officeDocument/2006/relationships" xmlns:p="http://schemas.openxmlformats.org/presentationml/2006/main">
+  <p:cSld>
+    <p:spTree>
+      <p:nvGrpSpPr>
+        <p:cNvPr id="1" name=""/>
+        <p:cNvGrpSpPr/>
+        <p:nvPr/>
+      </p:nvGrpSpPr>
+      <p:grpSpPr>
+        <a:xfrm>
+          <a:off x="0" y="0"/>
+          <a:ext cx="0" cy="0"/>
+          <a:chOff x="0" y="0"/>
+          <a:chExt cx="0" cy="0"/>
+        </a:xfrm>
+      </p:grpSpPr>
+      <p:sp>
+        <p:nvSpPr>
+          <p:cNvPr id="2" name="Title 1"/>
+          <p:cNvSpPr>
+            <a:spLocks noGrp="1"/>
+          </p:cNvSpPr>
+          <p:nvPr>
+            <p:ph type="title"/>
+          </p:nvPr>
+        </p:nvSpPr>
+        <p:spPr/>
+        <p:txBody>
+          <a:bodyPr/>
+          <a:lstStyle/>
+          <a:p>
+            <a:r>
+              <a:rPr lang="en-US" dirty="0"/>
+              <a:t>Summary</a:t>
+            </a:r>
+          </a:p>
+        </p:txBody>
+      </p:sp>
+      <p:sp>
+        <p:nvSpPr>
+          <p:cNvPr id="3" name="Text Placeholder 2"/>
+          <p:cNvSpPr>
+            <a:spLocks noGrp="1"/>
+          </p:cNvSpPr>
+          <p:nvPr>
+            <p:ph type="body" sz="quarter" idx="25"/>
+          </p:nvPr>
+        </p:nvSpPr>
+        <p:spPr/>
+        <p:txBody>
+          <a:bodyPr/>
+          <a:lstStyle/>
+          <a:p>
+            <a:endParaRPr lang="en-US" dirty="0"/>
+          </a:p>
+        </p:txBody>
+      </p:sp>
+    </p:spTree>
+    <p:extLst>
+      <p:ext uri="{BB962C8B-B14F-4D97-AF65-F5344CB8AC3E}">
+        <p14:creationId xmlns:p14="http://schemas.microsoft.com/office/powerpoint/2010/main" val="2272855957"/>
+      </p:ext>
+    </p:extLst>
+  </p:cSld>
+  <p:clrMapOvr>
+    <a:masterClrMapping/>
+  </p:clrMapOvr>
+  <mc:AlternateContent xmlns:mc="http://schemas.openxmlformats.org/markup-compatibility/2006" xmlns:p14="http://schemas.microsoft.com/office/powerpoint/2010/main">
+    <mc:Choice Requires="p14">
+      <p:transition spd="med" p14:dur="700">
+        <p:fade/>
+      </p:transition>
+    </mc:Choice>
+    <mc:Fallback xmlns="">
+      <p:transition spd="med">
+        <p:fade/>
+      </p:transition>
+    </mc:Fallback>
+  </mc:AlternateContent>
+</p:sld>
+</file>
+
+<file path=ppt/slides/slide26.xml><?xml version="1.0" encoding="utf-8"?>
+<p:sld xmlns:a="http://schemas.openxmlformats.org/drawingml/2006/main" xmlns:r="http://schemas.openxmlformats.org/officeDocument/2006/relationships" xmlns:p="http://schemas.openxmlformats.org/presentationml/2006/main">
+  <p:cSld>
+    <p:spTree>
+      <p:nvGrpSpPr>
+        <p:cNvPr id="1" name=""/>
+        <p:cNvGrpSpPr/>
+        <p:nvPr/>
+      </p:nvGrpSpPr>
+      <p:grpSpPr>
+        <a:xfrm>
+          <a:off x="0" y="0"/>
+          <a:ext cx="0" cy="0"/>
+          <a:chOff x="0" y="0"/>
+          <a:chExt cx="0" cy="0"/>
+        </a:xfrm>
+      </p:grpSpPr>
+      <p:sp>
+        <p:nvSpPr>
+          <p:cNvPr id="4" name="Title 3"/>
+          <p:cNvSpPr>
+            <a:spLocks noGrp="1"/>
+          </p:cNvSpPr>
+          <p:nvPr>
+            <p:ph type="title"/>
+          </p:nvPr>
+        </p:nvSpPr>
+        <p:spPr/>
+        <p:txBody>
+          <a:bodyPr/>
+          <a:lstStyle/>
+          <a:p>
+            <a:r>
+              <a:rPr lang="de-AT" dirty="0"/>
               <a:t>Summary</a:t>
             </a:r>
           </a:p>
@@ -32016,16 +32671,10 @@
               </a:rPr>
             </a:br>
             <a:r>
-              <a:rPr lang="en-US" dirty="0" err="1">
-                <a:sym typeface="Webdings" panose="05030102010509060703" pitchFamily="18" charset="2"/>
-              </a:rPr>
-              <a:t>Windows</a:t>
-            </a:r>
-            <a:r>
               <a:rPr lang="en-US" dirty="0">
                 <a:sym typeface="Webdings" panose="05030102010509060703" pitchFamily="18" charset="2"/>
               </a:rPr>
-              <a:t> on Windows</a:t>
+              <a:t>Windows on Windows</a:t>
             </a:r>
             <a:br>
               <a:rPr lang="en-US" dirty="0">
@@ -32111,7 +32760,7 @@
 </p:sld>
 </file>
 
-<file path=ppt/slides/slide24.xml><?xml version="1.0" encoding="utf-8"?>
+<file path=ppt/slides/slide27.xml><?xml version="1.0" encoding="utf-8"?>
 <p:sld xmlns:a="http://schemas.openxmlformats.org/drawingml/2006/main" xmlns:r="http://schemas.openxmlformats.org/officeDocument/2006/relationships" xmlns:p="http://schemas.openxmlformats.org/presentationml/2006/main">
   <p:cSld>
     <p:spTree>
@@ -32526,10 +33175,9 @@
           <a:lstStyle/>
           <a:p>
             <a:r>
-              <a:rPr lang="de-AT" dirty="0" err="1"/>
+              <a:rPr lang="en-US" dirty="0"/>
               <a:t>Overview</a:t>
             </a:r>
-            <a:endParaRPr lang="de-AT" dirty="0"/>
           </a:p>
         </p:txBody>
       </p:sp>
@@ -32548,7 +33196,10 @@
           <a:bodyPr/>
           <a:lstStyle/>
           <a:p>
-            <a:endParaRPr lang="de-AT" dirty="0"/>
+            <a:r>
+              <a:rPr lang="en-US" dirty="0"/>
+              <a:t>Available Options and Tools</a:t>
+            </a:r>
           </a:p>
         </p:txBody>
       </p:sp>
@@ -32759,7 +33410,14 @@
           <a:lstStyle/>
           <a:p>
             <a:r>
-              <a:rPr lang="de-AT" dirty="0"/>
+              <a:rPr lang="en-US" dirty="0"/>
+              <a:t>Docker Client in </a:t>
+            </a:r>
+            <a:br>
+              <a:rPr lang="en-US" dirty="0"/>
+            </a:br>
+            <a:r>
+              <a:rPr lang="en-US" dirty="0"/>
               <a:t>Windows Shell</a:t>
             </a:r>
           </a:p>
@@ -32785,27 +33443,23 @@
           </a:p>
           <a:p>
             <a:r>
-              <a:rPr lang="de-AT" dirty="0" err="1"/>
-              <a:t>Bash</a:t>
-            </a:r>
-            <a:r>
-              <a:rPr lang="de-AT" dirty="0"/>
-              <a:t> on Ubuntu on Windows</a:t>
+              <a:rPr lang="en-US" dirty="0"/>
+              <a:t>Bash on Ubuntu on Windows</a:t>
             </a:r>
           </a:p>
           <a:p>
             <a:pPr lvl="1"/>
             <a:r>
-              <a:rPr lang="de-AT" dirty="0"/>
+              <a:rPr lang="en-US" dirty="0"/>
               <a:t>Advantage: </a:t>
             </a:r>
             <a:r>
-              <a:rPr lang="de-AT" dirty="0" err="1">
+              <a:rPr lang="en-US" dirty="0">
                 <a:hlinkClick r:id="rId2"/>
               </a:rPr>
               <a:t>Completion</a:t>
             </a:r>
-            <a:endParaRPr lang="de-AT" dirty="0"/>
+            <a:endParaRPr lang="en-US" dirty="0"/>
           </a:p>
         </p:txBody>
       </p:sp>
@@ -33458,76 +34112,135 @@
               </a:rPr>
               <a:t>Docker Hub</a:t>
             </a:r>
-            <a:endParaRPr lang="en-US" dirty="0"/>
-          </a:p>
-          <a:p>
             <a:r>
               <a:rPr lang="en-US" dirty="0"/>
-              <a:t>Containers on Azure</a:t>
-            </a:r>
-          </a:p>
-          <a:p>
-            <a:pPr lvl="1"/>
-            <a:r>
-              <a:rPr lang="en-US" dirty="0"/>
-              <a:t>Templates and drivers from Microsoft (details later)</a:t>
-            </a:r>
-          </a:p>
-          <a:p>
-            <a:pPr lvl="1"/>
+              <a:t> (e.g. </a:t>
+            </a:r>
             <a:r>
               <a:rPr lang="en-US" dirty="0">
                 <a:hlinkClick r:id="rId3"/>
               </a:rPr>
-              <a:t>Docker Machine</a:t>
+              <a:t>Azure CLI</a:t>
             </a:r>
             <a:r>
               <a:rPr lang="en-US" dirty="0"/>
-              <a:t> with </a:t>
+              <a:t>, </a:t>
             </a:r>
             <a:r>
               <a:rPr lang="en-US" dirty="0">
                 <a:hlinkClick r:id="rId4"/>
               </a:rPr>
-              <a:t>Azure driver</a:t>
-            </a:r>
-            <a:endParaRPr lang="en-US" dirty="0"/>
-          </a:p>
-          <a:p>
-            <a:pPr lvl="1"/>
+              <a:t>.NET Core</a:t>
+            </a:r>
             <a:r>
               <a:rPr lang="en-US" dirty="0"/>
-              <a:t>Run clusters (DC/OS, Docker Swarm, Kubernetes) with </a:t>
+              <a:t>, </a:t>
             </a:r>
             <a:r>
               <a:rPr lang="en-US" dirty="0">
                 <a:hlinkClick r:id="rId5"/>
               </a:rPr>
-              <a:t>Azure Container Service</a:t>
-            </a:r>
-            <a:endParaRPr lang="en-US" dirty="0"/>
-          </a:p>
-          <a:p>
+              <a:t>PowerShell</a:t>
+            </a:r>
             <a:r>
               <a:rPr lang="en-US" dirty="0"/>
-              <a:t>Visual Studio Support</a:t>
-            </a:r>
-          </a:p>
-          <a:p>
-            <a:pPr lvl="1"/>
+              <a:t>, </a:t>
+            </a:r>
             <a:r>
               <a:rPr lang="en-US" dirty="0">
                 <a:hlinkClick r:id="rId6"/>
               </a:rPr>
-              <a:t>Visual Studio Tools for Docker</a:t>
-            </a:r>
-            <a:endParaRPr lang="en-US" dirty="0"/>
+              <a:t>IIS</a:t>
+            </a:r>
+            <a:r>
+              <a:rPr lang="en-US" dirty="0"/>
+              <a:t>)</a:t>
+            </a:r>
+          </a:p>
+          <a:p>
+            <a:r>
+              <a:rPr lang="en-US" dirty="0"/>
+              <a:t>Containers on Azure</a:t>
+            </a:r>
           </a:p>
           <a:p>
             <a:pPr lvl="1"/>
+            <a:r>
+              <a:rPr lang="en-US" dirty="0"/>
+              <a:t>Templates (e.g. </a:t>
+            </a:r>
             <a:r>
               <a:rPr lang="en-US" dirty="0">
                 <a:hlinkClick r:id="rId7"/>
+              </a:rPr>
+              <a:t>Docker on </a:t>
+            </a:r>
+            <a:r>
+              <a:rPr lang="en-US" dirty="0" err="1">
+                <a:hlinkClick r:id="rId7"/>
+              </a:rPr>
+              <a:t>Unbuntu</a:t>
+            </a:r>
+            <a:r>
+              <a:rPr lang="en-US" dirty="0"/>
+              <a:t>) and drivers from Microsoft (details later)</a:t>
+            </a:r>
+          </a:p>
+          <a:p>
+            <a:pPr lvl="1"/>
+            <a:r>
+              <a:rPr lang="en-US" dirty="0">
+                <a:hlinkClick r:id="rId8"/>
+              </a:rPr>
+              <a:t>Docker Machine</a:t>
+            </a:r>
+            <a:r>
+              <a:rPr lang="en-US" dirty="0"/>
+              <a:t> with </a:t>
+            </a:r>
+            <a:r>
+              <a:rPr lang="en-US" dirty="0">
+                <a:hlinkClick r:id="rId9"/>
+              </a:rPr>
+              <a:t>Azure driver</a:t>
+            </a:r>
+            <a:endParaRPr lang="en-US" dirty="0"/>
+          </a:p>
+          <a:p>
+            <a:pPr lvl="1"/>
+            <a:r>
+              <a:rPr lang="en-US" dirty="0"/>
+              <a:t>Run clusters (DC/OS, Docker Swarm, Kubernetes) with </a:t>
+            </a:r>
+            <a:r>
+              <a:rPr lang="en-US" dirty="0">
+                <a:hlinkClick r:id="rId10"/>
+              </a:rPr>
+              <a:t>Azure Container Service</a:t>
+            </a:r>
+            <a:endParaRPr lang="en-US" dirty="0"/>
+          </a:p>
+          <a:p>
+            <a:r>
+              <a:rPr lang="en-US" dirty="0"/>
+              <a:t>Visual Studio Support</a:t>
+            </a:r>
+          </a:p>
+          <a:p>
+            <a:pPr lvl="1"/>
+            <a:r>
+              <a:rPr lang="en-US" dirty="0">
+                <a:hlinkClick r:id="rId11"/>
+              </a:rPr>
+              <a:t>Visual Studio Tools for Docker</a:t>
+            </a:r>
+            <a:endParaRPr lang="en-US" dirty="0"/>
+          </a:p>
+          <a:p>
+            <a:pPr lvl="1"/>
+            <a:r>
+              <a:rPr lang="en-US" dirty="0">
+                <a:hlinkClick r:id="rId12"/>
               </a:rPr>
               <a:t>VSTS Docker Extension</a:t>
             </a:r>

</xml_diff>

<commit_message>
Refresh Windows Container slides
</commit_message>
<xml_diff>
--- a/slides/Containers-Microsoft-Universe.pptx
+++ b/slides/Containers-Microsoft-Universe.pptx
@@ -15,25 +15,27 @@
     <p:sldId id="345" r:id="rId9"/>
     <p:sldId id="326" r:id="rId10"/>
     <p:sldId id="328" r:id="rId11"/>
-    <p:sldId id="329" r:id="rId12"/>
-    <p:sldId id="330" r:id="rId13"/>
-    <p:sldId id="334" r:id="rId14"/>
-    <p:sldId id="336" r:id="rId15"/>
-    <p:sldId id="332" r:id="rId16"/>
-    <p:sldId id="333" r:id="rId17"/>
-    <p:sldId id="337" r:id="rId18"/>
-    <p:sldId id="338" r:id="rId19"/>
-    <p:sldId id="350" r:id="rId20"/>
-    <p:sldId id="339" r:id="rId21"/>
-    <p:sldId id="340" r:id="rId22"/>
-    <p:sldId id="341" r:id="rId23"/>
-    <p:sldId id="342" r:id="rId24"/>
-    <p:sldId id="347" r:id="rId25"/>
-    <p:sldId id="348" r:id="rId26"/>
-    <p:sldId id="349" r:id="rId27"/>
-    <p:sldId id="343" r:id="rId28"/>
-    <p:sldId id="344" r:id="rId29"/>
-    <p:sldId id="322" r:id="rId30"/>
+    <p:sldId id="352" r:id="rId12"/>
+    <p:sldId id="353" r:id="rId13"/>
+    <p:sldId id="329" r:id="rId14"/>
+    <p:sldId id="330" r:id="rId15"/>
+    <p:sldId id="334" r:id="rId16"/>
+    <p:sldId id="336" r:id="rId17"/>
+    <p:sldId id="332" r:id="rId18"/>
+    <p:sldId id="333" r:id="rId19"/>
+    <p:sldId id="337" r:id="rId20"/>
+    <p:sldId id="338" r:id="rId21"/>
+    <p:sldId id="350" r:id="rId22"/>
+    <p:sldId id="339" r:id="rId23"/>
+    <p:sldId id="340" r:id="rId24"/>
+    <p:sldId id="341" r:id="rId25"/>
+    <p:sldId id="342" r:id="rId26"/>
+    <p:sldId id="347" r:id="rId27"/>
+    <p:sldId id="348" r:id="rId28"/>
+    <p:sldId id="349" r:id="rId29"/>
+    <p:sldId id="343" r:id="rId30"/>
+    <p:sldId id="344" r:id="rId31"/>
+    <p:sldId id="322" r:id="rId32"/>
   </p:sldIdLst>
   <p:sldSz cx="9144000" cy="5143500" type="screen16x9"/>
   <p:notesSz cx="6858000" cy="9144000"/>
@@ -205,6 +207,8 @@
             <p14:sldId id="345"/>
             <p14:sldId id="326"/>
             <p14:sldId id="328"/>
+            <p14:sldId id="352"/>
+            <p14:sldId id="353"/>
           </p14:sldIdLst>
         </p14:section>
         <p14:section name="Linux on Windows" id="{A559C975-F723-4435-8D71-0067758FBC61}">
@@ -29381,7 +29385,7 @@
           <a:p>
             <a:r>
               <a:rPr lang="en-US" dirty="0"/>
-              <a:t>In The MS Universe</a:t>
+              <a:t>in the Microsoft Universe</a:t>
             </a:r>
           </a:p>
         </p:txBody>
@@ -29464,6 +29468,320 @@
       </p:grpSpPr>
       <p:sp>
         <p:nvSpPr>
+          <p:cNvPr id="6" name="Text Placeholder 5"/>
+          <p:cNvSpPr>
+            <a:spLocks noGrp="1"/>
+          </p:cNvSpPr>
+          <p:nvPr>
+            <p:ph type="body" sz="quarter" idx="16"/>
+          </p:nvPr>
+        </p:nvSpPr>
+        <p:spPr/>
+        <p:txBody>
+          <a:bodyPr/>
+          <a:lstStyle/>
+          <a:p>
+            <a:r>
+              <a:rPr lang="en-US"/>
+              <a:t>Isoluation</a:t>
+            </a:r>
+            <a:endParaRPr lang="en-US"/>
+          </a:p>
+        </p:txBody>
+      </p:sp>
+      <p:sp>
+        <p:nvSpPr>
+          <p:cNvPr id="7" name="Text Placeholder 6"/>
+          <p:cNvSpPr>
+            <a:spLocks noGrp="1"/>
+          </p:cNvSpPr>
+          <p:nvPr>
+            <p:ph type="body" sz="quarter" idx="24"/>
+          </p:nvPr>
+        </p:nvSpPr>
+        <p:spPr/>
+        <p:txBody>
+          <a:bodyPr/>
+          <a:lstStyle/>
+          <a:p>
+            <a:endParaRPr lang="en-US"/>
+          </a:p>
+        </p:txBody>
+      </p:sp>
+      <p:sp>
+        <p:nvSpPr>
+          <p:cNvPr id="8" name="Text Placeholder 7"/>
+          <p:cNvSpPr>
+            <a:spLocks noGrp="1"/>
+          </p:cNvSpPr>
+          <p:nvPr>
+            <p:ph type="body" sz="quarter" idx="25"/>
+          </p:nvPr>
+        </p:nvSpPr>
+        <p:spPr/>
+        <p:txBody>
+          <a:bodyPr/>
+          <a:lstStyle/>
+          <a:p>
+            <a:r>
+              <a:rPr lang="en-US"/>
+              <a:t>Windows </a:t>
+            </a:r>
+            <a:r>
+              <a:rPr lang="en-US"/>
+              <a:t>Hyper-V Containers</a:t>
+            </a:r>
+            <a:endParaRPr lang="en-US"/>
+          </a:p>
+        </p:txBody>
+      </p:sp>
+      <p:sp>
+        <p:nvSpPr>
+          <p:cNvPr id="9" name="Text Placeholder 8"/>
+          <p:cNvSpPr>
+            <a:spLocks noGrp="1"/>
+          </p:cNvSpPr>
+          <p:nvPr>
+            <p:ph type="body" sz="quarter" idx="26"/>
+          </p:nvPr>
+        </p:nvSpPr>
+        <p:spPr/>
+        <p:txBody>
+          <a:bodyPr/>
+          <a:lstStyle/>
+          <a:p>
+            <a:endParaRPr lang="en-US"/>
+          </a:p>
+        </p:txBody>
+      </p:sp>
+    </p:spTree>
+    <p:extLst>
+      <p:ext uri="{BB962C8B-B14F-4D97-AF65-F5344CB8AC3E}">
+        <p14:creationId xmlns:p14="http://schemas.microsoft.com/office/powerpoint/2010/main" val="792884403"/>
+      </p:ext>
+    </p:extLst>
+  </p:cSld>
+  <p:clrMapOvr>
+    <a:masterClrMapping/>
+  </p:clrMapOvr>
+  <p:transition spd="slow">
+    <p:push/>
+  </p:transition>
+</p:sld>
+</file>
+
+<file path=ppt/slides/slide11.xml><?xml version="1.0" encoding="utf-8"?>
+<p:sld xmlns:a="http://schemas.openxmlformats.org/drawingml/2006/main" xmlns:r="http://schemas.openxmlformats.org/officeDocument/2006/relationships" xmlns:p="http://schemas.openxmlformats.org/presentationml/2006/main" show="0">
+  <p:cSld>
+    <p:spTree>
+      <p:nvGrpSpPr>
+        <p:cNvPr id="1" name=""/>
+        <p:cNvGrpSpPr/>
+        <p:nvPr/>
+      </p:nvGrpSpPr>
+      <p:grpSpPr>
+        <a:xfrm>
+          <a:off x="0" y="0"/>
+          <a:ext cx="0" cy="0"/>
+          <a:chOff x="0" y="0"/>
+          <a:chExt cx="0" cy="0"/>
+        </a:xfrm>
+      </p:grpSpPr>
+      <p:sp>
+        <p:nvSpPr>
+          <p:cNvPr id="6" name="Title 5"/>
+          <p:cNvSpPr>
+            <a:spLocks noGrp="1"/>
+          </p:cNvSpPr>
+          <p:nvPr>
+            <p:ph type="title"/>
+          </p:nvPr>
+        </p:nvSpPr>
+        <p:spPr/>
+        <p:txBody>
+          <a:bodyPr/>
+          <a:lstStyle/>
+          <a:p>
+            <a:r>
+              <a:rPr lang="en-US"/>
+              <a:t>Isoluation</a:t>
+            </a:r>
+            <a:endParaRPr lang="en-US" dirty="0"/>
+          </a:p>
+        </p:txBody>
+      </p:sp>
+      <p:sp>
+        <p:nvSpPr>
+          <p:cNvPr id="7" name="Content Placeholder 6"/>
+          <p:cNvSpPr>
+            <a:spLocks noGrp="1"/>
+          </p:cNvSpPr>
+          <p:nvPr>
+            <p:ph sz="quarter" idx="22"/>
+          </p:nvPr>
+        </p:nvSpPr>
+        <p:spPr/>
+        <p:txBody>
+          <a:bodyPr/>
+          <a:lstStyle/>
+          <a:p>
+            <a:r>
+              <a:rPr lang="en-US" noProof="1"/>
+              <a:t># Run Hyper-V container</a:t>
+            </a:r>
+          </a:p>
+          <a:p>
+            <a:r>
+              <a:rPr lang="en-US" noProof="1"/>
+              <a:t>docker run -it --rm --isolation=hyperv microsoft/nanoserver </a:t>
+            </a:r>
+          </a:p>
+          <a:p>
+            <a:r>
+              <a:rPr lang="en-US" noProof="1"/>
+              <a:t>	cmd /c ping localhost –t</a:t>
+            </a:r>
+          </a:p>
+          <a:p>
+            <a:endParaRPr lang="en-US" noProof="1"/>
+          </a:p>
+          <a:p>
+            <a:r>
+              <a:rPr lang="en-US" noProof="1"/>
+              <a:t># Show vmwp.exe process on host -&gt; virtual machine</a:t>
+            </a:r>
+          </a:p>
+          <a:p>
+            <a:endParaRPr lang="en-US" noProof="1"/>
+          </a:p>
+          <a:p>
+            <a:endParaRPr lang="en-US" noProof="1"/>
+          </a:p>
+          <a:p>
+            <a:r>
+              <a:rPr lang="en-US" noProof="1"/>
+              <a:t># Run Windows Server container</a:t>
+            </a:r>
+          </a:p>
+          <a:p>
+            <a:r>
+              <a:rPr lang="en-US" noProof="1"/>
+              <a:t>docker run -it --rm --isolation=hyperv microsoft/nanoserver </a:t>
+            </a:r>
+          </a:p>
+          <a:p>
+            <a:r>
+              <a:rPr lang="en-US" noProof="1"/>
+              <a:t>	cmd /c ping localhost –t</a:t>
+            </a:r>
+          </a:p>
+          <a:p>
+            <a:endParaRPr lang="en-US" noProof="1"/>
+          </a:p>
+          <a:p>
+            <a:r>
+              <a:rPr lang="en-US" noProof="1"/>
+              <a:t># Show ping process on host -&gt; kernel reuse</a:t>
+            </a:r>
+          </a:p>
+        </p:txBody>
+      </p:sp>
+      <p:sp>
+        <p:nvSpPr>
+          <p:cNvPr id="8" name="Text Placeholder 7"/>
+          <p:cNvSpPr>
+            <a:spLocks noGrp="1"/>
+          </p:cNvSpPr>
+          <p:nvPr>
+            <p:ph type="body" sz="quarter" idx="23"/>
+          </p:nvPr>
+        </p:nvSpPr>
+        <p:spPr/>
+        <p:txBody>
+          <a:bodyPr/>
+          <a:lstStyle/>
+          <a:p>
+            <a:r>
+              <a:rPr lang="en-US"/>
+              <a:t>Windows Hyper-V Containers</a:t>
+            </a:r>
+            <a:endParaRPr lang="en-US" dirty="0"/>
+          </a:p>
+        </p:txBody>
+      </p:sp>
+      <p:sp>
+        <p:nvSpPr>
+          <p:cNvPr id="9" name="Text Placeholder 8"/>
+          <p:cNvSpPr>
+            <a:spLocks noGrp="1"/>
+          </p:cNvSpPr>
+          <p:nvPr>
+            <p:ph type="body" sz="quarter" idx="24"/>
+          </p:nvPr>
+        </p:nvSpPr>
+        <p:spPr/>
+        <p:txBody>
+          <a:bodyPr/>
+          <a:lstStyle/>
+          <a:p>
+            <a:endParaRPr lang="en-US" dirty="0"/>
+          </a:p>
+        </p:txBody>
+      </p:sp>
+      <p:sp>
+        <p:nvSpPr>
+          <p:cNvPr id="10" name="Text Placeholder 9"/>
+          <p:cNvSpPr>
+            <a:spLocks noGrp="1"/>
+          </p:cNvSpPr>
+          <p:nvPr>
+            <p:ph type="body" sz="quarter" idx="25"/>
+          </p:nvPr>
+        </p:nvSpPr>
+        <p:spPr/>
+        <p:txBody>
+          <a:bodyPr/>
+          <a:lstStyle/>
+          <a:p>
+            <a:endParaRPr lang="en-US" dirty="0"/>
+          </a:p>
+        </p:txBody>
+      </p:sp>
+    </p:spTree>
+    <p:extLst>
+      <p:ext uri="{BB962C8B-B14F-4D97-AF65-F5344CB8AC3E}">
+        <p14:creationId xmlns:p14="http://schemas.microsoft.com/office/powerpoint/2010/main" val="1686931475"/>
+      </p:ext>
+    </p:extLst>
+  </p:cSld>
+  <p:clrMapOvr>
+    <a:masterClrMapping/>
+  </p:clrMapOvr>
+  <p:transition spd="slow">
+    <p:push/>
+  </p:transition>
+</p:sld>
+</file>
+
+<file path=ppt/slides/slide12.xml><?xml version="1.0" encoding="utf-8"?>
+<p:sld xmlns:a="http://schemas.openxmlformats.org/drawingml/2006/main" xmlns:r="http://schemas.openxmlformats.org/officeDocument/2006/relationships" xmlns:p="http://schemas.openxmlformats.org/presentationml/2006/main">
+  <p:cSld>
+    <p:spTree>
+      <p:nvGrpSpPr>
+        <p:cNvPr id="1" name=""/>
+        <p:cNvGrpSpPr/>
+        <p:nvPr/>
+      </p:nvGrpSpPr>
+      <p:grpSpPr>
+        <a:xfrm>
+          <a:off x="0" y="0"/>
+          <a:ext cx="0" cy="0"/>
+          <a:chOff x="0" y="0"/>
+          <a:chExt cx="0" cy="0"/>
+        </a:xfrm>
+      </p:grpSpPr>
+      <p:sp>
+        <p:nvSpPr>
           <p:cNvPr id="2" name="Title 1"/>
           <p:cNvSpPr>
             <a:spLocks noGrp="1"/>
@@ -29531,7 +29849,7 @@
 </p:sld>
 </file>
 
-<file path=ppt/slides/slide11.xml><?xml version="1.0" encoding="utf-8"?>
+<file path=ppt/slides/slide13.xml><?xml version="1.0" encoding="utf-8"?>
 <p:sld xmlns:a="http://schemas.openxmlformats.org/drawingml/2006/main" xmlns:r="http://schemas.openxmlformats.org/officeDocument/2006/relationships" xmlns:p="http://schemas.openxmlformats.org/presentationml/2006/main">
   <p:cSld>
     <p:spTree>
@@ -29699,7 +30017,7 @@
 </p:sld>
 </file>
 
-<file path=ppt/slides/slide12.xml><?xml version="1.0" encoding="utf-8"?>
+<file path=ppt/slides/slide14.xml><?xml version="1.0" encoding="utf-8"?>
 <p:sld xmlns:a="http://schemas.openxmlformats.org/drawingml/2006/main" xmlns:r="http://schemas.openxmlformats.org/officeDocument/2006/relationships" xmlns:p="http://schemas.openxmlformats.org/presentationml/2006/main">
   <p:cSld>
     <p:spTree>
@@ -29868,7 +30186,7 @@
 </p:sld>
 </file>
 
-<file path=ppt/slides/slide13.xml><?xml version="1.0" encoding="utf-8"?>
+<file path=ppt/slides/slide15.xml><?xml version="1.0" encoding="utf-8"?>
 <p:sld xmlns:a="http://schemas.openxmlformats.org/drawingml/2006/main" xmlns:r="http://schemas.openxmlformats.org/officeDocument/2006/relationships" xmlns:p="http://schemas.openxmlformats.org/presentationml/2006/main" show="0">
   <p:cSld>
     <p:spTree>
@@ -30165,7 +30483,7 @@
 </p:sld>
 </file>
 
-<file path=ppt/slides/slide14.xml><?xml version="1.0" encoding="utf-8"?>
+<file path=ppt/slides/slide16.xml><?xml version="1.0" encoding="utf-8"?>
 <p:sld xmlns:a="http://schemas.openxmlformats.org/drawingml/2006/main" xmlns:r="http://schemas.openxmlformats.org/officeDocument/2006/relationships" xmlns:p="http://schemas.openxmlformats.org/presentationml/2006/main">
   <p:cSld>
     <p:spTree>
@@ -30251,7 +30569,7 @@
 </p:sld>
 </file>
 
-<file path=ppt/slides/slide15.xml><?xml version="1.0" encoding="utf-8"?>
+<file path=ppt/slides/slide17.xml><?xml version="1.0" encoding="utf-8"?>
 <p:sld xmlns:a="http://schemas.openxmlformats.org/drawingml/2006/main" xmlns:r="http://schemas.openxmlformats.org/officeDocument/2006/relationships" xmlns:p="http://schemas.openxmlformats.org/presentationml/2006/main" showMasterPhAnim="0">
   <p:cSld>
     <p:spTree>
@@ -30968,7 +31286,7 @@
 </p:sld>
 </file>
 
-<file path=ppt/slides/slide16.xml><?xml version="1.0" encoding="utf-8"?>
+<file path=ppt/slides/slide18.xml><?xml version="1.0" encoding="utf-8"?>
 <p:sld xmlns:a="http://schemas.openxmlformats.org/drawingml/2006/main" xmlns:r="http://schemas.openxmlformats.org/officeDocument/2006/relationships" xmlns:p="http://schemas.openxmlformats.org/presentationml/2006/main">
   <p:cSld>
     <p:spTree>
@@ -31067,7 +31385,6 @@
               <a:rPr lang="en-US" dirty="0"/>
               <a:t>Remote Docker (Linux and Windows) client</a:t>
             </a:r>
-            <a:endParaRPr lang="en-US" dirty="0"/>
           </a:p>
           <a:p>
             <a:r>
@@ -31168,7 +31485,7 @@
 </p:sld>
 </file>
 
-<file path=ppt/slides/slide17.xml><?xml version="1.0" encoding="utf-8"?>
+<file path=ppt/slides/slide19.xml><?xml version="1.0" encoding="utf-8"?>
 <p:sld xmlns:a="http://schemas.openxmlformats.org/drawingml/2006/main" xmlns:r="http://schemas.openxmlformats.org/officeDocument/2006/relationships" xmlns:p="http://schemas.openxmlformats.org/presentationml/2006/main" show="0">
   <p:cSld>
     <p:spTree>
@@ -31418,313 +31735,6 @@
   <p:transition spd="slow">
     <p:push/>
   </p:transition>
-</p:sld>
-</file>
-
-<file path=ppt/slides/slide18.xml><?xml version="1.0" encoding="utf-8"?>
-<p:sld xmlns:a="http://schemas.openxmlformats.org/drawingml/2006/main" xmlns:r="http://schemas.openxmlformats.org/officeDocument/2006/relationships" xmlns:p="http://schemas.openxmlformats.org/presentationml/2006/main">
-  <p:cSld>
-    <p:spTree>
-      <p:nvGrpSpPr>
-        <p:cNvPr id="1" name=""/>
-        <p:cNvGrpSpPr/>
-        <p:nvPr/>
-      </p:nvGrpSpPr>
-      <p:grpSpPr>
-        <a:xfrm>
-          <a:off x="0" y="0"/>
-          <a:ext cx="0" cy="0"/>
-          <a:chOff x="0" y="0"/>
-          <a:chExt cx="0" cy="0"/>
-        </a:xfrm>
-      </p:grpSpPr>
-      <p:sp>
-        <p:nvSpPr>
-          <p:cNvPr id="2" name="Title 1"/>
-          <p:cNvSpPr>
-            <a:spLocks noGrp="1"/>
-          </p:cNvSpPr>
-          <p:nvPr>
-            <p:ph type="title"/>
-          </p:nvPr>
-        </p:nvSpPr>
-        <p:spPr/>
-        <p:txBody>
-          <a:bodyPr/>
-          <a:lstStyle/>
-          <a:p>
-            <a:r>
-              <a:rPr lang="en-US"/>
-              <a:t>Windows </a:t>
-            </a:r>
-            <a:r>
-              <a:rPr lang="en-US"/>
-              <a:t>on Windows</a:t>
-            </a:r>
-            <a:endParaRPr lang="en-US"/>
-          </a:p>
-        </p:txBody>
-      </p:sp>
-      <p:sp>
-        <p:nvSpPr>
-          <p:cNvPr id="3" name="Content Placeholder 2"/>
-          <p:cNvSpPr>
-            <a:spLocks noGrp="1"/>
-          </p:cNvSpPr>
-          <p:nvPr>
-            <p:ph sz="quarter" idx="12"/>
-          </p:nvPr>
-        </p:nvSpPr>
-        <p:spPr/>
-        <p:txBody>
-          <a:bodyPr/>
-          <a:lstStyle/>
-          <a:p>
-            <a:r>
-              <a:rPr lang="en-US" dirty="0"/>
-              <a:t>Configuration via </a:t>
-            </a:r>
-            <a:r>
-              <a:rPr lang="en-US" i="1" dirty="0" err="1"/>
-              <a:t>daemon.json</a:t>
-            </a:r>
-            <a:endParaRPr lang="en-US" i="1" dirty="0"/>
-          </a:p>
-          <a:p>
-            <a:pPr lvl="1"/>
-            <a:r>
-              <a:rPr lang="en-US" dirty="0"/>
-              <a:t>Details see </a:t>
-            </a:r>
-            <a:r>
-              <a:rPr lang="en-US" dirty="0">
-                <a:hlinkClick r:id="rId2"/>
-              </a:rPr>
-              <a:t>Microsoft docs</a:t>
-            </a:r>
-            <a:endParaRPr lang="en-US" dirty="0"/>
-          </a:p>
-          <a:p>
-            <a:pPr>
-              <a:spcBef>
-                <a:spcPts val="600"/>
-              </a:spcBef>
-            </a:pPr>
-            <a:r>
-              <a:rPr lang="en-US" dirty="0"/>
-              <a:t>Support for </a:t>
-            </a:r>
-            <a:r>
-              <a:rPr lang="en-US" dirty="0" err="1"/>
-              <a:t>Dockerfiles</a:t>
-            </a:r>
-            <a:endParaRPr lang="en-US" dirty="0"/>
-          </a:p>
-          <a:p>
-            <a:pPr lvl="1"/>
-            <a:r>
-              <a:rPr lang="en-US" dirty="0"/>
-              <a:t>Windows shell</a:t>
-            </a:r>
-          </a:p>
-          <a:p>
-            <a:pPr lvl="1"/>
-            <a:r>
-              <a:rPr lang="en-US" dirty="0" err="1"/>
-              <a:t>Powershell</a:t>
-            </a:r>
-            <a:r>
-              <a:rPr lang="en-US" dirty="0"/>
-              <a:t> support</a:t>
-            </a:r>
-          </a:p>
-          <a:p>
-            <a:pPr lvl="1"/>
-            <a:r>
-              <a:rPr lang="en-US" dirty="0"/>
-              <a:t>Details see </a:t>
-            </a:r>
-            <a:r>
-              <a:rPr lang="en-US" dirty="0">
-                <a:hlinkClick r:id="rId3"/>
-              </a:rPr>
-              <a:t>Microsoft docs</a:t>
-            </a:r>
-            <a:endParaRPr lang="en-US" dirty="0"/>
-          </a:p>
-          <a:p>
-            <a:pPr>
-              <a:spcBef>
-                <a:spcPts val="600"/>
-              </a:spcBef>
-            </a:pPr>
-            <a:r>
-              <a:rPr lang="en-US" dirty="0"/>
-              <a:t>Swarm-support is coming</a:t>
-            </a:r>
-          </a:p>
-          <a:p>
-            <a:pPr lvl="1"/>
-            <a:r>
-              <a:rPr lang="en-US" dirty="0"/>
-              <a:t>Available to Windows 10 insiders already</a:t>
-            </a:r>
-          </a:p>
-          <a:p>
-            <a:pPr lvl="1"/>
-            <a:r>
-              <a:rPr lang="en-US" dirty="0"/>
-              <a:t>Details see </a:t>
-            </a:r>
-            <a:r>
-              <a:rPr lang="en-US" dirty="0">
-                <a:hlinkClick r:id="rId4"/>
-              </a:rPr>
-              <a:t>blog post</a:t>
-            </a:r>
-            <a:endParaRPr lang="en-US" dirty="0"/>
-          </a:p>
-          <a:p>
-            <a:pPr>
-              <a:spcBef>
-                <a:spcPts val="600"/>
-              </a:spcBef>
-            </a:pPr>
-            <a:r>
-              <a:rPr lang="en-US" dirty="0">
-                <a:hlinkClick r:id="rId5"/>
-              </a:rPr>
-              <a:t>PowerShell for Docker</a:t>
-            </a:r>
-            <a:endParaRPr lang="en-US" dirty="0"/>
-          </a:p>
-          <a:p>
-            <a:pPr lvl="1"/>
-            <a:r>
-              <a:rPr lang="en-US" dirty="0"/>
-              <a:t>Alternative to Docker CLI</a:t>
-            </a:r>
-          </a:p>
-        </p:txBody>
-      </p:sp>
-      <p:sp>
-        <p:nvSpPr>
-          <p:cNvPr id="4" name="Text Placeholder 3"/>
-          <p:cNvSpPr>
-            <a:spLocks noGrp="1"/>
-          </p:cNvSpPr>
-          <p:nvPr>
-            <p:ph type="body" sz="quarter" idx="23"/>
-          </p:nvPr>
-        </p:nvSpPr>
-        <p:spPr/>
-        <p:txBody>
-          <a:bodyPr/>
-          <a:lstStyle/>
-          <a:p>
-            <a:endParaRPr lang="en-US"/>
-          </a:p>
-        </p:txBody>
-      </p:sp>
-    </p:spTree>
-    <p:extLst>
-      <p:ext uri="{BB962C8B-B14F-4D97-AF65-F5344CB8AC3E}">
-        <p14:creationId xmlns:p14="http://schemas.microsoft.com/office/powerpoint/2010/main" val="2328424072"/>
-      </p:ext>
-    </p:extLst>
-  </p:cSld>
-  <p:clrMapOvr>
-    <a:masterClrMapping/>
-  </p:clrMapOvr>
-  <p:transition spd="slow">
-    <p:push/>
-  </p:transition>
-</p:sld>
-</file>
-
-<file path=ppt/slides/slide19.xml><?xml version="1.0" encoding="utf-8"?>
-<p:sld xmlns:a="http://schemas.openxmlformats.org/drawingml/2006/main" xmlns:r="http://schemas.openxmlformats.org/officeDocument/2006/relationships" xmlns:p="http://schemas.openxmlformats.org/presentationml/2006/main">
-  <p:cSld>
-    <p:spTree>
-      <p:nvGrpSpPr>
-        <p:cNvPr id="1" name=""/>
-        <p:cNvGrpSpPr/>
-        <p:nvPr/>
-      </p:nvGrpSpPr>
-      <p:grpSpPr>
-        <a:xfrm>
-          <a:off x="0" y="0"/>
-          <a:ext cx="0" cy="0"/>
-          <a:chOff x="0" y="0"/>
-          <a:chExt cx="0" cy="0"/>
-        </a:xfrm>
-      </p:grpSpPr>
-      <p:sp>
-        <p:nvSpPr>
-          <p:cNvPr id="2" name="Title 1"/>
-          <p:cNvSpPr>
-            <a:spLocks noGrp="1"/>
-          </p:cNvSpPr>
-          <p:nvPr>
-            <p:ph type="title"/>
-          </p:nvPr>
-        </p:nvSpPr>
-        <p:spPr/>
-        <p:txBody>
-          <a:bodyPr/>
-          <a:lstStyle/>
-          <a:p>
-            <a:r>
-              <a:rPr lang="en-US" dirty="0"/>
-              <a:t>Docker on Azure</a:t>
-            </a:r>
-          </a:p>
-        </p:txBody>
-      </p:sp>
-      <p:sp>
-        <p:nvSpPr>
-          <p:cNvPr id="3" name="Text Placeholder 2"/>
-          <p:cNvSpPr>
-            <a:spLocks noGrp="1"/>
-          </p:cNvSpPr>
-          <p:nvPr>
-            <p:ph type="body" sz="quarter" idx="25"/>
-          </p:nvPr>
-        </p:nvSpPr>
-        <p:spPr/>
-        <p:txBody>
-          <a:bodyPr/>
-          <a:lstStyle/>
-          <a:p>
-            <a:r>
-              <a:rPr lang="en-US" dirty="0"/>
-              <a:t>Running containers in Azure</a:t>
-            </a:r>
-          </a:p>
-        </p:txBody>
-      </p:sp>
-    </p:spTree>
-    <p:extLst>
-      <p:ext uri="{BB962C8B-B14F-4D97-AF65-F5344CB8AC3E}">
-        <p14:creationId xmlns:p14="http://schemas.microsoft.com/office/powerpoint/2010/main" val="2753095540"/>
-      </p:ext>
-    </p:extLst>
-  </p:cSld>
-  <p:clrMapOvr>
-    <a:masterClrMapping/>
-  </p:clrMapOvr>
-  <mc:AlternateContent xmlns:mc="http://schemas.openxmlformats.org/markup-compatibility/2006" xmlns:p14="http://schemas.microsoft.com/office/powerpoint/2010/main">
-    <mc:Choice Requires="p14">
-      <p:transition spd="med" p14:dur="700">
-        <p:fade/>
-      </p:transition>
-    </mc:Choice>
-    <mc:Fallback xmlns="">
-      <p:transition spd="med">
-        <p:fade/>
-      </p:transition>
-    </mc:Fallback>
-  </mc:AlternateContent>
 </p:sld>
 </file>
 
@@ -31973,7 +31983,7 @@
       </p:grpSpPr>
       <p:sp>
         <p:nvSpPr>
-          <p:cNvPr id="4" name="Title 3"/>
+          <p:cNvPr id="2" name="Title 1"/>
           <p:cNvSpPr>
             <a:spLocks noGrp="1"/>
           </p:cNvSpPr>
@@ -31987,15 +31997,15 @@
           <a:lstStyle/>
           <a:p>
             <a:r>
-              <a:rPr lang="en-US" dirty="0"/>
-              <a:t>Docker on Azure</a:t>
+              <a:rPr lang="en-US"/>
+              <a:t>Windows on Windows</a:t>
             </a:r>
           </a:p>
         </p:txBody>
       </p:sp>
       <p:sp>
         <p:nvSpPr>
-          <p:cNvPr id="5" name="Content Placeholder 4"/>
+          <p:cNvPr id="3" name="Content Placeholder 2"/>
           <p:cNvSpPr>
             <a:spLocks noGrp="1"/>
           </p:cNvSpPr>
@@ -32010,103 +32020,134 @@
           <a:p>
             <a:r>
               <a:rPr lang="en-US" dirty="0"/>
-              <a:t>Docker support in </a:t>
-            </a:r>
-            <a:r>
-              <a:rPr lang="en-US" i="1" dirty="0"/>
-              <a:t>Azure Resource Manager</a:t>
-            </a:r>
+              <a:t>Configuration via </a:t>
+            </a:r>
+            <a:r>
+              <a:rPr lang="en-US" i="1" dirty="0" err="1"/>
+              <a:t>daemon.json</a:t>
+            </a:r>
+            <a:endParaRPr lang="en-US" i="1" dirty="0"/>
+          </a:p>
+          <a:p>
+            <a:pPr lvl="1"/>
             <a:r>
               <a:rPr lang="en-US" dirty="0"/>
-              <a:t> (ARM)</a:t>
-            </a:r>
-            <a:endParaRPr lang="en-US" dirty="0">
-              <a:hlinkClick r:id="rId2"/>
-            </a:endParaRPr>
-          </a:p>
-          <a:p>
-            <a:pPr lvl="1"/>
+              <a:t>Details see </a:t>
+            </a:r>
             <a:r>
               <a:rPr lang="en-US" dirty="0">
                 <a:hlinkClick r:id="rId2"/>
               </a:rPr>
-              <a:t>Extension for Docker on Linux</a:t>
+              <a:t>Microsoft docs</a:t>
             </a:r>
             <a:endParaRPr lang="en-US" dirty="0"/>
           </a:p>
           <a:p>
+            <a:pPr>
+              <a:spcBef>
+                <a:spcPts val="600"/>
+              </a:spcBef>
+            </a:pPr>
+            <a:r>
+              <a:rPr lang="en-US" dirty="0"/>
+              <a:t>Support for </a:t>
+            </a:r>
+            <a:r>
+              <a:rPr lang="en-US" dirty="0" err="1"/>
+              <a:t>Dockerfiles</a:t>
+            </a:r>
+            <a:endParaRPr lang="en-US" dirty="0"/>
+          </a:p>
+          <a:p>
             <a:pPr lvl="1"/>
+            <a:r>
+              <a:rPr lang="en-US" dirty="0"/>
+              <a:t>Windows shell</a:t>
+            </a:r>
+          </a:p>
+          <a:p>
+            <a:pPr lvl="1"/>
+            <a:r>
+              <a:rPr lang="en-US" dirty="0" err="1"/>
+              <a:t>Powershell</a:t>
+            </a:r>
+            <a:r>
+              <a:rPr lang="en-US" dirty="0"/>
+              <a:t> support</a:t>
+            </a:r>
+          </a:p>
+          <a:p>
+            <a:pPr lvl="1"/>
+            <a:r>
+              <a:rPr lang="en-US" dirty="0"/>
+              <a:t>Details see </a:t>
+            </a:r>
             <a:r>
               <a:rPr lang="en-US" dirty="0">
                 <a:hlinkClick r:id="rId3"/>
               </a:rPr>
-              <a:t>Ready-made ARM-templates</a:t>
-            </a:r>
+              <a:t>Microsoft docs</a:t>
+            </a:r>
+            <a:endParaRPr lang="en-US" dirty="0"/>
+          </a:p>
+          <a:p>
+            <a:pPr>
+              <a:spcBef>
+                <a:spcPts val="600"/>
+              </a:spcBef>
+            </a:pPr>
             <a:r>
               <a:rPr lang="en-US" dirty="0"/>
-              <a:t> (e.g. </a:t>
+              <a:t>Swarm-support is coming</a:t>
+            </a:r>
+          </a:p>
+          <a:p>
+            <a:pPr lvl="1"/>
+            <a:r>
+              <a:rPr lang="en-US" dirty="0"/>
+              <a:t>Available to Windows 10 insiders already</a:t>
+            </a:r>
+          </a:p>
+          <a:p>
+            <a:pPr lvl="1"/>
+            <a:r>
+              <a:rPr lang="en-US" dirty="0"/>
+              <a:t>Details see </a:t>
             </a:r>
             <a:r>
               <a:rPr lang="en-US" dirty="0">
                 <a:hlinkClick r:id="rId4"/>
               </a:rPr>
-              <a:t>Docker on Ubuntu</a:t>
-            </a:r>
-            <a:r>
-              <a:rPr lang="en-US" dirty="0"/>
-              <a:t>)</a:t>
-            </a:r>
-          </a:p>
-          <a:p>
-            <a:pPr marL="13800"/>
+              <a:t>blog post</a:t>
+            </a:r>
+            <a:endParaRPr lang="en-US" dirty="0"/>
+          </a:p>
+          <a:p>
+            <a:pPr>
+              <a:spcBef>
+                <a:spcPts val="600"/>
+              </a:spcBef>
+            </a:pPr>
             <a:r>
               <a:rPr lang="en-US" dirty="0">
                 <a:hlinkClick r:id="rId5"/>
               </a:rPr>
-              <a:t>Azure driver</a:t>
-            </a:r>
+              <a:t>PowerShell for Docker</a:t>
+            </a:r>
+            <a:endParaRPr lang="en-US" dirty="0"/>
+          </a:p>
+          <a:p>
+            <a:pPr lvl="1"/>
             <a:r>
               <a:rPr lang="en-US" dirty="0"/>
-              <a:t> for </a:t>
-            </a:r>
-            <a:r>
-              <a:rPr lang="en-US" i="1" dirty="0"/>
-              <a:t>Docker Machine</a:t>
-            </a:r>
-          </a:p>
-          <a:p>
-            <a:r>
-              <a:rPr lang="en-US" dirty="0">
-                <a:hlinkClick r:id="rId6"/>
-              </a:rPr>
-              <a:t>Azure Container Services (ACS)</a:t>
-            </a:r>
-            <a:endParaRPr lang="en-US" dirty="0"/>
-          </a:p>
-          <a:p>
-            <a:r>
-              <a:rPr lang="en-US" dirty="0"/>
-              <a:t>Storage</a:t>
-            </a:r>
-            <a:endParaRPr lang="en-US" dirty="0">
-              <a:hlinkClick r:id="rId7"/>
-            </a:endParaRPr>
-          </a:p>
-          <a:p>
-            <a:pPr lvl="1"/>
-            <a:r>
-              <a:rPr lang="en-US" dirty="0">
-                <a:hlinkClick r:id="rId7"/>
-              </a:rPr>
-              <a:t>Docker Volume Driver for Azure File Storage</a:t>
-            </a:r>
-            <a:endParaRPr lang="en-US" dirty="0"/>
+              <a:t>Alternative to Docker CLI</a:t>
+            </a:r>
           </a:p>
         </p:txBody>
       </p:sp>
       <p:sp>
         <p:nvSpPr>
-          <p:cNvPr id="6" name="Text Placeholder 5"/>
+          <p:cNvPr id="4" name="Text Placeholder 3"/>
           <p:cNvSpPr>
             <a:spLocks noGrp="1"/>
           </p:cNvSpPr>
@@ -32119,14 +32160,14 @@
           <a:bodyPr/>
           <a:lstStyle/>
           <a:p>
-            <a:endParaRPr lang="en-US" dirty="0"/>
+            <a:endParaRPr lang="en-US"/>
           </a:p>
         </p:txBody>
       </p:sp>
     </p:spTree>
     <p:extLst>
       <p:ext uri="{BB962C8B-B14F-4D97-AF65-F5344CB8AC3E}">
-        <p14:creationId xmlns:p14="http://schemas.microsoft.com/office/powerpoint/2010/main" val="3067379427"/>
+        <p14:creationId xmlns:p14="http://schemas.microsoft.com/office/powerpoint/2010/main" val="2328424072"/>
       </p:ext>
     </p:extLst>
   </p:cSld>
@@ -32158,12 +32199,12 @@
       </p:grpSpPr>
       <p:sp>
         <p:nvSpPr>
-          <p:cNvPr id="5" name="Text Placeholder 4"/>
+          <p:cNvPr id="2" name="Title 1"/>
           <p:cNvSpPr>
             <a:spLocks noGrp="1"/>
           </p:cNvSpPr>
           <p:nvPr>
-            <p:ph type="body" sz="quarter" idx="16"/>
+            <p:ph type="title"/>
           </p:nvPr>
         </p:nvSpPr>
         <p:spPr/>
@@ -32173,70 +32214,14 @@
           <a:p>
             <a:r>
               <a:rPr lang="en-US" dirty="0"/>
-              <a:t>Containers in Azure</a:t>
+              <a:t>Docker on Azure</a:t>
             </a:r>
           </a:p>
         </p:txBody>
       </p:sp>
       <p:sp>
         <p:nvSpPr>
-          <p:cNvPr id="6" name="Text Placeholder 5"/>
-          <p:cNvSpPr>
-            <a:spLocks noGrp="1"/>
-          </p:cNvSpPr>
-          <p:nvPr>
-            <p:ph type="body" sz="quarter" idx="24"/>
-          </p:nvPr>
-        </p:nvSpPr>
-        <p:spPr/>
-        <p:txBody>
-          <a:bodyPr/>
-          <a:lstStyle/>
-          <a:p>
-            <a:r>
-              <a:rPr lang="en-US" dirty="0"/>
-              <a:t>Docker Machine</a:t>
-            </a:r>
-          </a:p>
-          <a:p>
-            <a:pPr lvl="1"/>
-            <a:r>
-              <a:rPr lang="en-US" dirty="0"/>
-              <a:t>Azure Driver</a:t>
-            </a:r>
-          </a:p>
-          <a:p>
-            <a:r>
-              <a:rPr lang="en-US" dirty="0"/>
-              <a:t>ARM with Docker</a:t>
-            </a:r>
-          </a:p>
-          <a:p>
-            <a:pPr lvl="1"/>
-            <a:r>
-              <a:rPr lang="en-US" dirty="0"/>
-              <a:t>Using </a:t>
-            </a:r>
-            <a:r>
-              <a:rPr lang="en-US" dirty="0" err="1"/>
-              <a:t>Quickstart</a:t>
-            </a:r>
-            <a:r>
-              <a:rPr lang="en-US" dirty="0"/>
-              <a:t> Template</a:t>
-            </a:r>
-          </a:p>
-          <a:p>
-            <a:r>
-              <a:rPr lang="en-US" dirty="0"/>
-              <a:t>Volume driver for Files</a:t>
-            </a:r>
-          </a:p>
-        </p:txBody>
-      </p:sp>
-      <p:sp>
-        <p:nvSpPr>
-          <p:cNvPr id="7" name="Text Placeholder 6"/>
+          <p:cNvPr id="3" name="Text Placeholder 2"/>
           <p:cNvSpPr>
             <a:spLocks noGrp="1"/>
           </p:cNvSpPr>
@@ -32249,47 +32234,40 @@
           <a:bodyPr/>
           <a:lstStyle/>
           <a:p>
-            <a:endParaRPr lang="en-US" dirty="0"/>
-          </a:p>
-        </p:txBody>
-      </p:sp>
-      <p:sp>
-        <p:nvSpPr>
-          <p:cNvPr id="8" name="Text Placeholder 7"/>
-          <p:cNvSpPr>
-            <a:spLocks noGrp="1"/>
-          </p:cNvSpPr>
-          <p:nvPr>
-            <p:ph type="body" sz="quarter" idx="26"/>
-          </p:nvPr>
-        </p:nvSpPr>
-        <p:spPr/>
-        <p:txBody>
-          <a:bodyPr/>
-          <a:lstStyle/>
-          <a:p>
-            <a:endParaRPr lang="en-US" dirty="0"/>
+            <a:r>
+              <a:rPr lang="en-US" dirty="0"/>
+              <a:t>Running containers in Azure</a:t>
+            </a:r>
           </a:p>
         </p:txBody>
       </p:sp>
     </p:spTree>
     <p:extLst>
       <p:ext uri="{BB962C8B-B14F-4D97-AF65-F5344CB8AC3E}">
-        <p14:creationId xmlns:p14="http://schemas.microsoft.com/office/powerpoint/2010/main" val="2339745574"/>
+        <p14:creationId xmlns:p14="http://schemas.microsoft.com/office/powerpoint/2010/main" val="2753095540"/>
       </p:ext>
     </p:extLst>
   </p:cSld>
   <p:clrMapOvr>
     <a:masterClrMapping/>
   </p:clrMapOvr>
-  <p:transition spd="slow">
-    <p:push/>
-  </p:transition>
+  <mc:AlternateContent xmlns:mc="http://schemas.openxmlformats.org/markup-compatibility/2006" xmlns:p14="http://schemas.microsoft.com/office/powerpoint/2010/main">
+    <mc:Choice Requires="p14">
+      <p:transition spd="med" p14:dur="700">
+        <p:fade/>
+      </p:transition>
+    </mc:Choice>
+    <mc:Fallback xmlns="">
+      <p:transition spd="med">
+        <p:fade/>
+      </p:transition>
+    </mc:Fallback>
+  </mc:AlternateContent>
 </p:sld>
 </file>
 
 <file path=ppt/slides/slide22.xml><?xml version="1.0" encoding="utf-8"?>
-<p:sld xmlns:a="http://schemas.openxmlformats.org/drawingml/2006/main" xmlns:r="http://schemas.openxmlformats.org/officeDocument/2006/relationships" xmlns:p="http://schemas.openxmlformats.org/presentationml/2006/main" show="0">
+<p:sld xmlns:a="http://schemas.openxmlformats.org/drawingml/2006/main" xmlns:r="http://schemas.openxmlformats.org/officeDocument/2006/relationships" xmlns:p="http://schemas.openxmlformats.org/presentationml/2006/main">
   <p:cSld>
     <p:spTree>
       <p:nvGrpSpPr>
@@ -32307,7 +32285,7 @@
       </p:grpSpPr>
       <p:sp>
         <p:nvSpPr>
-          <p:cNvPr id="6" name="Title 5"/>
+          <p:cNvPr id="4" name="Title 3"/>
           <p:cNvSpPr>
             <a:spLocks noGrp="1"/>
           </p:cNvSpPr>
@@ -32321,20 +32299,20 @@
           <a:lstStyle/>
           <a:p>
             <a:r>
-              <a:rPr lang="de-AT" dirty="0"/>
-              <a:t>Demo</a:t>
+              <a:rPr lang="en-US" dirty="0"/>
+              <a:t>Docker on Azure</a:t>
             </a:r>
           </a:p>
         </p:txBody>
       </p:sp>
       <p:sp>
         <p:nvSpPr>
-          <p:cNvPr id="7" name="Content Placeholder 6"/>
+          <p:cNvPr id="5" name="Content Placeholder 4"/>
           <p:cNvSpPr>
             <a:spLocks noGrp="1"/>
           </p:cNvSpPr>
           <p:nvPr>
-            <p:ph sz="quarter" idx="22"/>
+            <p:ph sz="quarter" idx="12"/>
           </p:nvPr>
         </p:nvSpPr>
         <p:spPr/>
@@ -32343,156 +32321,104 @@
           <a:lstStyle/>
           <a:p>
             <a:r>
-              <a:rPr lang="de-AT" dirty="0" err="1"/>
-              <a:t>docker-machine</a:t>
-            </a:r>
-            <a:r>
-              <a:rPr lang="de-AT" dirty="0"/>
-              <a:t> </a:t>
-            </a:r>
-            <a:r>
-              <a:rPr lang="de-AT" dirty="0" err="1"/>
-              <a:t>create</a:t>
-            </a:r>
-            <a:r>
-              <a:rPr lang="de-AT" dirty="0"/>
-              <a:t> --driver </a:t>
-            </a:r>
-            <a:r>
-              <a:rPr lang="de-AT" dirty="0" err="1"/>
-              <a:t>azure</a:t>
-            </a:r>
-            <a:r>
-              <a:rPr lang="de-AT" dirty="0"/>
-              <a:t> --</a:t>
-            </a:r>
-            <a:r>
-              <a:rPr lang="de-AT" dirty="0" err="1"/>
-              <a:t>azure-subscription-id</a:t>
-            </a:r>
-            <a:r>
-              <a:rPr lang="de-AT" dirty="0"/>
-              <a:t> 00000000-0000-0000-0000-000000000000 doc16-demo</a:t>
-            </a:r>
-          </a:p>
-          <a:p>
-            <a:r>
-              <a:rPr lang="de-AT" i="1" dirty="0"/>
-              <a:t># Show </a:t>
-            </a:r>
-            <a:r>
-              <a:rPr lang="de-AT" i="1" dirty="0" err="1"/>
-              <a:t>result</a:t>
-            </a:r>
-            <a:r>
-              <a:rPr lang="de-AT" i="1" dirty="0"/>
-              <a:t> in Azure Portal</a:t>
-            </a:r>
-          </a:p>
-          <a:p>
-            <a:endParaRPr lang="sv-SE" dirty="0"/>
-          </a:p>
-          <a:p>
-            <a:r>
-              <a:rPr lang="sv-SE" i="1" dirty="0"/>
-              <a:t># Create volume on Azure files</a:t>
-            </a:r>
-          </a:p>
-          <a:p>
-            <a:r>
-              <a:rPr lang="sv-SE" dirty="0"/>
-              <a:t>docker volume ls</a:t>
-            </a:r>
-          </a:p>
-          <a:p>
-            <a:r>
-              <a:rPr lang="en-US" dirty="0" err="1"/>
-              <a:t>docker</a:t>
-            </a:r>
-            <a:r>
               <a:rPr lang="en-US" dirty="0"/>
-              <a:t> volume create -d </a:t>
-            </a:r>
-            <a:r>
-              <a:rPr lang="en-US" dirty="0" err="1"/>
-              <a:t>azurefile</a:t>
+              <a:t>Docker support in </a:t>
+            </a:r>
+            <a:r>
+              <a:rPr lang="en-US" i="1" dirty="0"/>
+              <a:t>Azure Resource Manager</a:t>
             </a:r>
             <a:r>
               <a:rPr lang="en-US" dirty="0"/>
-              <a:t> --name </a:t>
-            </a:r>
-            <a:r>
-              <a:rPr lang="en-US" dirty="0" err="1"/>
-              <a:t>myvol</a:t>
+              <a:t> (ARM)</a:t>
+            </a:r>
+            <a:endParaRPr lang="en-US" dirty="0">
+              <a:hlinkClick r:id="rId2"/>
+            </a:endParaRPr>
+          </a:p>
+          <a:p>
+            <a:pPr lvl="1"/>
+            <a:r>
+              <a:rPr lang="en-US" dirty="0">
+                <a:hlinkClick r:id="rId2"/>
+              </a:rPr>
+              <a:t>Extension for Docker on Linux</a:t>
+            </a:r>
+            <a:endParaRPr lang="en-US" dirty="0"/>
+          </a:p>
+          <a:p>
+            <a:pPr lvl="1"/>
+            <a:r>
+              <a:rPr lang="en-US" dirty="0">
+                <a:hlinkClick r:id="rId3"/>
+              </a:rPr>
+              <a:t>Ready-made ARM-templates</a:t>
             </a:r>
             <a:r>
               <a:rPr lang="en-US" dirty="0"/>
-              <a:t> -o share=doc16</a:t>
-            </a:r>
-          </a:p>
-          <a:p>
-            <a:r>
-              <a:rPr lang="sv-SE" dirty="0"/>
-              <a:t>docker volume ls</a:t>
-            </a:r>
-          </a:p>
-          <a:p>
-            <a:r>
-              <a:rPr lang="en-US" dirty="0" err="1"/>
-              <a:t>docker</a:t>
+              <a:t> (e.g. </a:t>
+            </a:r>
+            <a:r>
+              <a:rPr lang="en-US" dirty="0">
+                <a:hlinkClick r:id="rId4"/>
+              </a:rPr>
+              <a:t>Docker on Ubuntu</a:t>
             </a:r>
             <a:r>
               <a:rPr lang="en-US" dirty="0"/>
-              <a:t> run -it --</a:t>
-            </a:r>
-            <a:r>
-              <a:rPr lang="en-US" dirty="0" err="1"/>
-              <a:t>rm</a:t>
+              <a:t>)</a:t>
+            </a:r>
+          </a:p>
+          <a:p>
+            <a:pPr marL="13800"/>
+            <a:r>
+              <a:rPr lang="en-US" dirty="0">
+                <a:hlinkClick r:id="rId5"/>
+              </a:rPr>
+              <a:t>Azure driver</a:t>
             </a:r>
             <a:r>
               <a:rPr lang="en-US" dirty="0"/>
-              <a:t> -v </a:t>
-            </a:r>
-            <a:r>
-              <a:rPr lang="en-US" dirty="0" err="1"/>
-              <a:t>myvol</a:t>
-            </a:r>
+              <a:t> for </a:t>
+            </a:r>
+            <a:r>
+              <a:rPr lang="en-US" i="1" dirty="0"/>
+              <a:t>Docker Machine</a:t>
+            </a:r>
+          </a:p>
+          <a:p>
+            <a:r>
+              <a:rPr lang="en-US" dirty="0">
+                <a:hlinkClick r:id="rId6"/>
+              </a:rPr>
+              <a:t>Azure Container Services (ACS)</a:t>
+            </a:r>
+            <a:endParaRPr lang="en-US" dirty="0"/>
+          </a:p>
+          <a:p>
             <a:r>
               <a:rPr lang="en-US" dirty="0"/>
-              <a:t>:/data </a:t>
-            </a:r>
-            <a:r>
-              <a:rPr lang="en-US" dirty="0" err="1"/>
-              <a:t>ubuntu</a:t>
-            </a:r>
-            <a:r>
-              <a:rPr lang="en-US" dirty="0"/>
-              <a:t> /bin/bash</a:t>
-            </a:r>
-          </a:p>
-          <a:p>
-            <a:r>
-              <a:rPr lang="en-US" dirty="0"/>
-              <a:t>	cd /data</a:t>
-            </a:r>
-          </a:p>
-          <a:p>
-            <a:r>
-              <a:rPr lang="en-US" dirty="0"/>
-              <a:t>	echo Hello &gt; greeting.txt</a:t>
-            </a:r>
-          </a:p>
-          <a:p>
-            <a:r>
-              <a:rPr lang="en-US" i="1" dirty="0"/>
-              <a:t>	# Show result in Azure Portal</a:t>
-            </a:r>
+              <a:t>Storage</a:t>
+            </a:r>
+            <a:endParaRPr lang="en-US" dirty="0">
+              <a:hlinkClick r:id="rId7"/>
+            </a:endParaRPr>
+          </a:p>
+          <a:p>
+            <a:pPr lvl="1"/>
+            <a:r>
+              <a:rPr lang="en-US" dirty="0">
+                <a:hlinkClick r:id="rId7"/>
+              </a:rPr>
+              <a:t>Docker Volume Driver for Azure File Storage</a:t>
+            </a:r>
+            <a:endParaRPr lang="en-US" dirty="0"/>
           </a:p>
         </p:txBody>
       </p:sp>
       <p:sp>
         <p:nvSpPr>
-          <p:cNvPr id="8" name="Text Placeholder 7"/>
+          <p:cNvPr id="6" name="Text Placeholder 5"/>
           <p:cNvSpPr>
             <a:spLocks noGrp="1"/>
           </p:cNvSpPr>
@@ -32505,112 +32431,14 @@
           <a:bodyPr/>
           <a:lstStyle/>
           <a:p>
-            <a:endParaRPr lang="de-AT"/>
-          </a:p>
-        </p:txBody>
-      </p:sp>
-      <p:sp>
-        <p:nvSpPr>
-          <p:cNvPr id="9" name="Text Placeholder 8"/>
-          <p:cNvSpPr>
-            <a:spLocks noGrp="1"/>
-          </p:cNvSpPr>
-          <p:nvPr>
-            <p:ph type="body" sz="quarter" idx="24"/>
-          </p:nvPr>
-        </p:nvSpPr>
-        <p:spPr/>
-        <p:txBody>
-          <a:bodyPr/>
-          <a:lstStyle/>
-          <a:p>
-            <a:r>
-              <a:rPr lang="de-AT" dirty="0" err="1"/>
-              <a:t>Prerequisites</a:t>
-            </a:r>
-            <a:endParaRPr lang="de-AT" dirty="0"/>
-          </a:p>
-          <a:p>
-            <a:pPr lvl="1"/>
-            <a:r>
-              <a:rPr lang="de-AT" dirty="0"/>
-              <a:t>Docker </a:t>
-            </a:r>
-            <a:r>
-              <a:rPr lang="de-AT" dirty="0" err="1"/>
-              <a:t>Machine</a:t>
-            </a:r>
-            <a:r>
-              <a:rPr lang="de-AT" dirty="0"/>
-              <a:t> </a:t>
-            </a:r>
-            <a:r>
-              <a:rPr lang="de-AT" dirty="0" err="1"/>
-              <a:t>installed</a:t>
-            </a:r>
-            <a:endParaRPr lang="de-AT" dirty="0"/>
-          </a:p>
-          <a:p>
-            <a:pPr lvl="1"/>
-            <a:r>
-              <a:rPr lang="de-AT" dirty="0"/>
-              <a:t>Docker Driver </a:t>
-            </a:r>
-            <a:r>
-              <a:rPr lang="de-AT" dirty="0" err="1"/>
-              <a:t>for</a:t>
-            </a:r>
-            <a:r>
-              <a:rPr lang="de-AT" dirty="0"/>
-              <a:t> Azure Files </a:t>
-            </a:r>
-            <a:r>
-              <a:rPr lang="de-AT" dirty="0" err="1"/>
-              <a:t>installed</a:t>
-            </a:r>
-            <a:r>
-              <a:rPr lang="de-AT" dirty="0"/>
-              <a:t> </a:t>
-            </a:r>
-            <a:r>
-              <a:rPr lang="de-AT" dirty="0" err="1"/>
-              <a:t>and</a:t>
-            </a:r>
-            <a:r>
-              <a:rPr lang="de-AT" dirty="0"/>
-              <a:t> </a:t>
-            </a:r>
-            <a:r>
-              <a:rPr lang="de-AT" dirty="0" err="1"/>
-              <a:t>configured</a:t>
-            </a:r>
-            <a:endParaRPr lang="de-AT" dirty="0"/>
-          </a:p>
-        </p:txBody>
-      </p:sp>
-      <p:sp>
-        <p:nvSpPr>
-          <p:cNvPr id="10" name="Text Placeholder 9"/>
-          <p:cNvSpPr>
-            <a:spLocks noGrp="1"/>
-          </p:cNvSpPr>
-          <p:nvPr>
-            <p:ph type="body" sz="quarter" idx="25"/>
-          </p:nvPr>
-        </p:nvSpPr>
-        <p:spPr/>
-        <p:txBody>
-          <a:bodyPr/>
-          <a:lstStyle/>
-          <a:p>
-            <a:endParaRPr lang="de-AT"/>
+            <a:endParaRPr lang="en-US" dirty="0"/>
           </a:p>
         </p:txBody>
       </p:sp>
     </p:spTree>
     <p:extLst>
       <p:ext uri="{BB962C8B-B14F-4D97-AF65-F5344CB8AC3E}">
-        <p14:creationId xmlns:p14="http://schemas.microsoft.com/office/powerpoint/2010/main" val="3933312432"/>
+        <p14:creationId xmlns:p14="http://schemas.microsoft.com/office/powerpoint/2010/main" val="3067379427"/>
       </p:ext>
     </p:extLst>
   </p:cSld>
@@ -32642,6 +32470,490 @@
       </p:grpSpPr>
       <p:sp>
         <p:nvSpPr>
+          <p:cNvPr id="5" name="Text Placeholder 4"/>
+          <p:cNvSpPr>
+            <a:spLocks noGrp="1"/>
+          </p:cNvSpPr>
+          <p:nvPr>
+            <p:ph type="body" sz="quarter" idx="16"/>
+          </p:nvPr>
+        </p:nvSpPr>
+        <p:spPr/>
+        <p:txBody>
+          <a:bodyPr/>
+          <a:lstStyle/>
+          <a:p>
+            <a:r>
+              <a:rPr lang="en-US" dirty="0"/>
+              <a:t>Containers in Azure</a:t>
+            </a:r>
+          </a:p>
+        </p:txBody>
+      </p:sp>
+      <p:sp>
+        <p:nvSpPr>
+          <p:cNvPr id="6" name="Text Placeholder 5"/>
+          <p:cNvSpPr>
+            <a:spLocks noGrp="1"/>
+          </p:cNvSpPr>
+          <p:nvPr>
+            <p:ph type="body" sz="quarter" idx="24"/>
+          </p:nvPr>
+        </p:nvSpPr>
+        <p:spPr/>
+        <p:txBody>
+          <a:bodyPr/>
+          <a:lstStyle/>
+          <a:p>
+            <a:r>
+              <a:rPr lang="en-US" dirty="0"/>
+              <a:t>Docker Machine</a:t>
+            </a:r>
+          </a:p>
+          <a:p>
+            <a:pPr lvl="1"/>
+            <a:r>
+              <a:rPr lang="en-US" dirty="0"/>
+              <a:t>Azure Driver</a:t>
+            </a:r>
+          </a:p>
+          <a:p>
+            <a:r>
+              <a:rPr lang="en-US" dirty="0"/>
+              <a:t>ARM with Docker</a:t>
+            </a:r>
+          </a:p>
+          <a:p>
+            <a:pPr lvl="1"/>
+            <a:r>
+              <a:rPr lang="en-US" dirty="0"/>
+              <a:t>Using </a:t>
+            </a:r>
+            <a:r>
+              <a:rPr lang="en-US" dirty="0" err="1"/>
+              <a:t>Quickstart</a:t>
+            </a:r>
+            <a:r>
+              <a:rPr lang="en-US" dirty="0"/>
+              <a:t> Template</a:t>
+            </a:r>
+          </a:p>
+          <a:p>
+            <a:r>
+              <a:rPr lang="en-US" dirty="0"/>
+              <a:t>Volume driver for Files</a:t>
+            </a:r>
+          </a:p>
+        </p:txBody>
+      </p:sp>
+      <p:sp>
+        <p:nvSpPr>
+          <p:cNvPr id="7" name="Text Placeholder 6"/>
+          <p:cNvSpPr>
+            <a:spLocks noGrp="1"/>
+          </p:cNvSpPr>
+          <p:nvPr>
+            <p:ph type="body" sz="quarter" idx="25"/>
+          </p:nvPr>
+        </p:nvSpPr>
+        <p:spPr/>
+        <p:txBody>
+          <a:bodyPr/>
+          <a:lstStyle/>
+          <a:p>
+            <a:endParaRPr lang="en-US" dirty="0"/>
+          </a:p>
+        </p:txBody>
+      </p:sp>
+      <p:sp>
+        <p:nvSpPr>
+          <p:cNvPr id="8" name="Text Placeholder 7"/>
+          <p:cNvSpPr>
+            <a:spLocks noGrp="1"/>
+          </p:cNvSpPr>
+          <p:nvPr>
+            <p:ph type="body" sz="quarter" idx="26"/>
+          </p:nvPr>
+        </p:nvSpPr>
+        <p:spPr/>
+        <p:txBody>
+          <a:bodyPr/>
+          <a:lstStyle/>
+          <a:p>
+            <a:endParaRPr lang="en-US" dirty="0"/>
+          </a:p>
+        </p:txBody>
+      </p:sp>
+    </p:spTree>
+    <p:extLst>
+      <p:ext uri="{BB962C8B-B14F-4D97-AF65-F5344CB8AC3E}">
+        <p14:creationId xmlns:p14="http://schemas.microsoft.com/office/powerpoint/2010/main" val="2339745574"/>
+      </p:ext>
+    </p:extLst>
+  </p:cSld>
+  <p:clrMapOvr>
+    <a:masterClrMapping/>
+  </p:clrMapOvr>
+  <p:transition spd="slow">
+    <p:push/>
+  </p:transition>
+</p:sld>
+</file>
+
+<file path=ppt/slides/slide24.xml><?xml version="1.0" encoding="utf-8"?>
+<p:sld xmlns:a="http://schemas.openxmlformats.org/drawingml/2006/main" xmlns:r="http://schemas.openxmlformats.org/officeDocument/2006/relationships" xmlns:p="http://schemas.openxmlformats.org/presentationml/2006/main" show="0">
+  <p:cSld>
+    <p:spTree>
+      <p:nvGrpSpPr>
+        <p:cNvPr id="1" name=""/>
+        <p:cNvGrpSpPr/>
+        <p:nvPr/>
+      </p:nvGrpSpPr>
+      <p:grpSpPr>
+        <a:xfrm>
+          <a:off x="0" y="0"/>
+          <a:ext cx="0" cy="0"/>
+          <a:chOff x="0" y="0"/>
+          <a:chExt cx="0" cy="0"/>
+        </a:xfrm>
+      </p:grpSpPr>
+      <p:sp>
+        <p:nvSpPr>
+          <p:cNvPr id="6" name="Title 5"/>
+          <p:cNvSpPr>
+            <a:spLocks noGrp="1"/>
+          </p:cNvSpPr>
+          <p:nvPr>
+            <p:ph type="title"/>
+          </p:nvPr>
+        </p:nvSpPr>
+        <p:spPr/>
+        <p:txBody>
+          <a:bodyPr/>
+          <a:lstStyle/>
+          <a:p>
+            <a:r>
+              <a:rPr lang="de-AT" dirty="0"/>
+              <a:t>Demo</a:t>
+            </a:r>
+          </a:p>
+        </p:txBody>
+      </p:sp>
+      <p:sp>
+        <p:nvSpPr>
+          <p:cNvPr id="7" name="Content Placeholder 6"/>
+          <p:cNvSpPr>
+            <a:spLocks noGrp="1"/>
+          </p:cNvSpPr>
+          <p:nvPr>
+            <p:ph sz="quarter" idx="22"/>
+          </p:nvPr>
+        </p:nvSpPr>
+        <p:spPr/>
+        <p:txBody>
+          <a:bodyPr/>
+          <a:lstStyle/>
+          <a:p>
+            <a:r>
+              <a:rPr lang="de-AT" dirty="0" err="1"/>
+              <a:t>docker-machine</a:t>
+            </a:r>
+            <a:r>
+              <a:rPr lang="de-AT" dirty="0"/>
+              <a:t> </a:t>
+            </a:r>
+            <a:r>
+              <a:rPr lang="de-AT" dirty="0" err="1"/>
+              <a:t>create</a:t>
+            </a:r>
+            <a:r>
+              <a:rPr lang="de-AT" dirty="0"/>
+              <a:t> --driver </a:t>
+            </a:r>
+            <a:r>
+              <a:rPr lang="de-AT" dirty="0" err="1"/>
+              <a:t>azure</a:t>
+            </a:r>
+            <a:r>
+              <a:rPr lang="de-AT" dirty="0"/>
+              <a:t> --</a:t>
+            </a:r>
+            <a:r>
+              <a:rPr lang="de-AT" dirty="0" err="1"/>
+              <a:t>azure-subscription-id</a:t>
+            </a:r>
+            <a:r>
+              <a:rPr lang="de-AT" dirty="0"/>
+              <a:t> 00000000-0000-0000-0000-000000000000 doc16-demo</a:t>
+            </a:r>
+          </a:p>
+          <a:p>
+            <a:r>
+              <a:rPr lang="de-AT" i="1" dirty="0"/>
+              <a:t># Show </a:t>
+            </a:r>
+            <a:r>
+              <a:rPr lang="de-AT" i="1" dirty="0" err="1"/>
+              <a:t>result</a:t>
+            </a:r>
+            <a:r>
+              <a:rPr lang="de-AT" i="1" dirty="0"/>
+              <a:t> in Azure Portal</a:t>
+            </a:r>
+          </a:p>
+          <a:p>
+            <a:endParaRPr lang="sv-SE" dirty="0"/>
+          </a:p>
+          <a:p>
+            <a:r>
+              <a:rPr lang="sv-SE" i="1" dirty="0"/>
+              <a:t># Create volume on Azure files</a:t>
+            </a:r>
+          </a:p>
+          <a:p>
+            <a:r>
+              <a:rPr lang="sv-SE" dirty="0"/>
+              <a:t>docker volume ls</a:t>
+            </a:r>
+          </a:p>
+          <a:p>
+            <a:r>
+              <a:rPr lang="en-US" dirty="0" err="1"/>
+              <a:t>docker</a:t>
+            </a:r>
+            <a:r>
+              <a:rPr lang="en-US" dirty="0"/>
+              <a:t> volume create -d </a:t>
+            </a:r>
+            <a:r>
+              <a:rPr lang="en-US" dirty="0" err="1"/>
+              <a:t>azurefile</a:t>
+            </a:r>
+            <a:r>
+              <a:rPr lang="en-US" dirty="0"/>
+              <a:t> --name </a:t>
+            </a:r>
+            <a:r>
+              <a:rPr lang="en-US" dirty="0" err="1"/>
+              <a:t>myvol</a:t>
+            </a:r>
+            <a:r>
+              <a:rPr lang="en-US" dirty="0"/>
+              <a:t> -o share=doc16</a:t>
+            </a:r>
+          </a:p>
+          <a:p>
+            <a:r>
+              <a:rPr lang="sv-SE" dirty="0"/>
+              <a:t>docker volume ls</a:t>
+            </a:r>
+          </a:p>
+          <a:p>
+            <a:r>
+              <a:rPr lang="en-US" dirty="0" err="1"/>
+              <a:t>docker</a:t>
+            </a:r>
+            <a:r>
+              <a:rPr lang="en-US" dirty="0"/>
+              <a:t> run -it --</a:t>
+            </a:r>
+            <a:r>
+              <a:rPr lang="en-US" dirty="0" err="1"/>
+              <a:t>rm</a:t>
+            </a:r>
+            <a:r>
+              <a:rPr lang="en-US" dirty="0"/>
+              <a:t> -v </a:t>
+            </a:r>
+            <a:r>
+              <a:rPr lang="en-US" dirty="0" err="1"/>
+              <a:t>myvol</a:t>
+            </a:r>
+            <a:r>
+              <a:rPr lang="en-US" dirty="0"/>
+              <a:t>:/data </a:t>
+            </a:r>
+            <a:r>
+              <a:rPr lang="en-US" dirty="0" err="1"/>
+              <a:t>ubuntu</a:t>
+            </a:r>
+            <a:r>
+              <a:rPr lang="en-US" dirty="0"/>
+              <a:t> /bin/bash</a:t>
+            </a:r>
+          </a:p>
+          <a:p>
+            <a:r>
+              <a:rPr lang="en-US" dirty="0"/>
+              <a:t>	cd /data</a:t>
+            </a:r>
+          </a:p>
+          <a:p>
+            <a:r>
+              <a:rPr lang="en-US" dirty="0"/>
+              <a:t>	echo Hello &gt; greeting.txt</a:t>
+            </a:r>
+          </a:p>
+          <a:p>
+            <a:r>
+              <a:rPr lang="en-US" i="1" dirty="0"/>
+              <a:t>	# Show result in Azure Portal</a:t>
+            </a:r>
+          </a:p>
+        </p:txBody>
+      </p:sp>
+      <p:sp>
+        <p:nvSpPr>
+          <p:cNvPr id="8" name="Text Placeholder 7"/>
+          <p:cNvSpPr>
+            <a:spLocks noGrp="1"/>
+          </p:cNvSpPr>
+          <p:nvPr>
+            <p:ph type="body" sz="quarter" idx="23"/>
+          </p:nvPr>
+        </p:nvSpPr>
+        <p:spPr/>
+        <p:txBody>
+          <a:bodyPr/>
+          <a:lstStyle/>
+          <a:p>
+            <a:endParaRPr lang="de-AT"/>
+          </a:p>
+        </p:txBody>
+      </p:sp>
+      <p:sp>
+        <p:nvSpPr>
+          <p:cNvPr id="9" name="Text Placeholder 8"/>
+          <p:cNvSpPr>
+            <a:spLocks noGrp="1"/>
+          </p:cNvSpPr>
+          <p:nvPr>
+            <p:ph type="body" sz="quarter" idx="24"/>
+          </p:nvPr>
+        </p:nvSpPr>
+        <p:spPr/>
+        <p:txBody>
+          <a:bodyPr/>
+          <a:lstStyle/>
+          <a:p>
+            <a:r>
+              <a:rPr lang="de-AT" dirty="0" err="1"/>
+              <a:t>Prerequisites</a:t>
+            </a:r>
+            <a:endParaRPr lang="de-AT" dirty="0"/>
+          </a:p>
+          <a:p>
+            <a:pPr lvl="1"/>
+            <a:r>
+              <a:rPr lang="de-AT" dirty="0"/>
+              <a:t>Docker </a:t>
+            </a:r>
+            <a:r>
+              <a:rPr lang="de-AT" dirty="0" err="1"/>
+              <a:t>Machine</a:t>
+            </a:r>
+            <a:r>
+              <a:rPr lang="de-AT" dirty="0"/>
+              <a:t> </a:t>
+            </a:r>
+            <a:r>
+              <a:rPr lang="de-AT" dirty="0" err="1"/>
+              <a:t>installed</a:t>
+            </a:r>
+            <a:endParaRPr lang="de-AT" dirty="0"/>
+          </a:p>
+          <a:p>
+            <a:pPr lvl="1"/>
+            <a:r>
+              <a:rPr lang="de-AT" dirty="0"/>
+              <a:t>Docker Driver </a:t>
+            </a:r>
+            <a:r>
+              <a:rPr lang="de-AT" dirty="0" err="1"/>
+              <a:t>for</a:t>
+            </a:r>
+            <a:r>
+              <a:rPr lang="de-AT" dirty="0"/>
+              <a:t> Azure Files </a:t>
+            </a:r>
+            <a:r>
+              <a:rPr lang="de-AT" dirty="0" err="1"/>
+              <a:t>installed</a:t>
+            </a:r>
+            <a:r>
+              <a:rPr lang="de-AT" dirty="0"/>
+              <a:t> </a:t>
+            </a:r>
+            <a:r>
+              <a:rPr lang="de-AT" dirty="0" err="1"/>
+              <a:t>and</a:t>
+            </a:r>
+            <a:r>
+              <a:rPr lang="de-AT" dirty="0"/>
+              <a:t> </a:t>
+            </a:r>
+            <a:r>
+              <a:rPr lang="de-AT" dirty="0" err="1"/>
+              <a:t>configured</a:t>
+            </a:r>
+            <a:endParaRPr lang="de-AT" dirty="0"/>
+          </a:p>
+        </p:txBody>
+      </p:sp>
+      <p:sp>
+        <p:nvSpPr>
+          <p:cNvPr id="10" name="Text Placeholder 9"/>
+          <p:cNvSpPr>
+            <a:spLocks noGrp="1"/>
+          </p:cNvSpPr>
+          <p:nvPr>
+            <p:ph type="body" sz="quarter" idx="25"/>
+          </p:nvPr>
+        </p:nvSpPr>
+        <p:spPr/>
+        <p:txBody>
+          <a:bodyPr/>
+          <a:lstStyle/>
+          <a:p>
+            <a:endParaRPr lang="de-AT"/>
+          </a:p>
+        </p:txBody>
+      </p:sp>
+    </p:spTree>
+    <p:extLst>
+      <p:ext uri="{BB962C8B-B14F-4D97-AF65-F5344CB8AC3E}">
+        <p14:creationId xmlns:p14="http://schemas.microsoft.com/office/powerpoint/2010/main" val="3933312432"/>
+      </p:ext>
+    </p:extLst>
+  </p:cSld>
+  <p:clrMapOvr>
+    <a:masterClrMapping/>
+  </p:clrMapOvr>
+  <p:transition spd="slow">
+    <p:push/>
+  </p:transition>
+</p:sld>
+</file>
+
+<file path=ppt/slides/slide25.xml><?xml version="1.0" encoding="utf-8"?>
+<p:sld xmlns:a="http://schemas.openxmlformats.org/drawingml/2006/main" xmlns:r="http://schemas.openxmlformats.org/officeDocument/2006/relationships" xmlns:p="http://schemas.openxmlformats.org/presentationml/2006/main">
+  <p:cSld>
+    <p:spTree>
+      <p:nvGrpSpPr>
+        <p:cNvPr id="1" name=""/>
+        <p:cNvGrpSpPr/>
+        <p:nvPr/>
+      </p:nvGrpSpPr>
+      <p:grpSpPr>
+        <a:xfrm>
+          <a:off x="0" y="0"/>
+          <a:ext cx="0" cy="0"/>
+          <a:chOff x="0" y="0"/>
+          <a:chExt cx="0" cy="0"/>
+        </a:xfrm>
+      </p:grpSpPr>
+      <p:sp>
+        <p:nvSpPr>
           <p:cNvPr id="2" name="Title 1"/>
           <p:cNvSpPr>
             <a:spLocks noGrp="1"/>
@@ -32709,7 +33021,7 @@
 </p:sld>
 </file>
 
-<file path=ppt/slides/slide24.xml><?xml version="1.0" encoding="utf-8"?>
+<file path=ppt/slides/slide26.xml><?xml version="1.0" encoding="utf-8"?>
 <p:sld xmlns:a="http://schemas.openxmlformats.org/drawingml/2006/main" xmlns:r="http://schemas.openxmlformats.org/officeDocument/2006/relationships" xmlns:p="http://schemas.openxmlformats.org/presentationml/2006/main">
   <p:cSld>
     <p:spTree>
@@ -33021,7 +33333,7 @@
 </p:sld>
 </file>
 
-<file path=ppt/slides/slide25.xml><?xml version="1.0" encoding="utf-8"?>
+<file path=ppt/slides/slide27.xml><?xml version="1.0" encoding="utf-8"?>
 <p:sld xmlns:a="http://schemas.openxmlformats.org/drawingml/2006/main" xmlns:r="http://schemas.openxmlformats.org/officeDocument/2006/relationships" xmlns:p="http://schemas.openxmlformats.org/presentationml/2006/main">
   <p:cSld>
     <p:spTree>
@@ -33235,7 +33547,7 @@
 </p:sld>
 </file>
 
-<file path=ppt/slides/slide26.xml><?xml version="1.0" encoding="utf-8"?>
+<file path=ppt/slides/slide28.xml><?xml version="1.0" encoding="utf-8"?>
 <p:sld xmlns:a="http://schemas.openxmlformats.org/drawingml/2006/main" xmlns:r="http://schemas.openxmlformats.org/officeDocument/2006/relationships" xmlns:p="http://schemas.openxmlformats.org/presentationml/2006/main">
   <p:cSld>
     <p:spTree>
@@ -33318,7 +33630,7 @@
 </p:sld>
 </file>
 
-<file path=ppt/slides/slide27.xml><?xml version="1.0" encoding="utf-8"?>
+<file path=ppt/slides/slide29.xml><?xml version="1.0" encoding="utf-8"?>
 <p:sld xmlns:a="http://schemas.openxmlformats.org/drawingml/2006/main" xmlns:r="http://schemas.openxmlformats.org/officeDocument/2006/relationships" xmlns:p="http://schemas.openxmlformats.org/presentationml/2006/main">
   <p:cSld>
     <p:spTree>
@@ -33446,13 +33758,7 @@
               <a:rPr lang="en-US">
                 <a:sym typeface="Webdings" panose="05030102010509060703" pitchFamily="18" charset="2"/>
               </a:rPr>
-              <a:t>Windows Server 2016 for Windows pro</a:t>
-            </a:r>
-            <a:r>
-              <a:rPr lang="en-US">
-                <a:sym typeface="Webdings" panose="05030102010509060703" pitchFamily="18" charset="2"/>
-              </a:rPr>
-              <a:t>d</a:t>
+              <a:t>Windows Server 2016 for Windows prod</a:t>
             </a:r>
             <a:endParaRPr lang="en-US" dirty="0">
               <a:sym typeface="Webdings" panose="05030102010509060703" pitchFamily="18" charset="2"/>
@@ -33504,7 +33810,129 @@
 </p:sld>
 </file>
 
-<file path=ppt/slides/slide28.xml><?xml version="1.0" encoding="utf-8"?>
+<file path=ppt/slides/slide3.xml><?xml version="1.0" encoding="utf-8"?>
+<p:sld xmlns:a="http://schemas.openxmlformats.org/drawingml/2006/main" xmlns:r="http://schemas.openxmlformats.org/officeDocument/2006/relationships" xmlns:p="http://schemas.openxmlformats.org/presentationml/2006/main">
+  <p:cSld>
+    <p:spTree>
+      <p:nvGrpSpPr>
+        <p:cNvPr id="1" name=""/>
+        <p:cNvGrpSpPr/>
+        <p:nvPr/>
+      </p:nvGrpSpPr>
+      <p:grpSpPr>
+        <a:xfrm>
+          <a:off x="0" y="0"/>
+          <a:ext cx="0" cy="0"/>
+          <a:chOff x="0" y="0"/>
+          <a:chExt cx="0" cy="0"/>
+        </a:xfrm>
+      </p:grpSpPr>
+      <p:sp>
+        <p:nvSpPr>
+          <p:cNvPr id="7" name="Title 6"/>
+          <p:cNvSpPr>
+            <a:spLocks noGrp="1"/>
+          </p:cNvSpPr>
+          <p:nvPr>
+            <p:ph type="title"/>
+          </p:nvPr>
+        </p:nvSpPr>
+        <p:spPr/>
+        <p:txBody>
+          <a:bodyPr/>
+          <a:lstStyle/>
+          <a:p>
+            <a:r>
+              <a:rPr lang="en-US" dirty="0"/>
+              <a:t>Questions for this Session</a:t>
+            </a:r>
+          </a:p>
+        </p:txBody>
+      </p:sp>
+      <p:sp>
+        <p:nvSpPr>
+          <p:cNvPr id="8" name="Content Placeholder 7"/>
+          <p:cNvSpPr>
+            <a:spLocks noGrp="1"/>
+          </p:cNvSpPr>
+          <p:nvPr>
+            <p:ph sz="quarter" idx="12"/>
+          </p:nvPr>
+        </p:nvSpPr>
+        <p:spPr/>
+        <p:txBody>
+          <a:bodyPr/>
+          <a:lstStyle/>
+          <a:p>
+            <a:r>
+              <a:rPr lang="en-US" dirty="0"/>
+              <a:t>Options, options, options</a:t>
+            </a:r>
+          </a:p>
+          <a:p>
+            <a:pPr lvl="1"/>
+            <a:r>
+              <a:rPr lang="en-US" dirty="0"/>
+              <a:t>When to use what?</a:t>
+            </a:r>
+          </a:p>
+          <a:p>
+            <a:r>
+              <a:rPr lang="en-US" dirty="0"/>
+              <a:t>Demos, demos, demos</a:t>
+            </a:r>
+          </a:p>
+          <a:p>
+            <a:pPr lvl="1"/>
+            <a:r>
+              <a:rPr lang="en-US" dirty="0"/>
+              <a:t>See things in action</a:t>
+            </a:r>
+          </a:p>
+          <a:p>
+            <a:r>
+              <a:rPr lang="en-US" dirty="0"/>
+              <a:t>Overview, not a deep-dive</a:t>
+            </a:r>
+          </a:p>
+        </p:txBody>
+      </p:sp>
+      <p:sp>
+        <p:nvSpPr>
+          <p:cNvPr id="9" name="Text Placeholder 8"/>
+          <p:cNvSpPr>
+            <a:spLocks noGrp="1"/>
+          </p:cNvSpPr>
+          <p:nvPr>
+            <p:ph type="body" sz="quarter" idx="23"/>
+          </p:nvPr>
+        </p:nvSpPr>
+        <p:spPr/>
+        <p:txBody>
+          <a:bodyPr/>
+          <a:lstStyle/>
+          <a:p>
+            <a:endParaRPr lang="en-US" dirty="0"/>
+          </a:p>
+        </p:txBody>
+      </p:sp>
+    </p:spTree>
+    <p:extLst>
+      <p:ext uri="{BB962C8B-B14F-4D97-AF65-F5344CB8AC3E}">
+        <p14:creationId xmlns:p14="http://schemas.microsoft.com/office/powerpoint/2010/main" val="872711031"/>
+      </p:ext>
+    </p:extLst>
+  </p:cSld>
+  <p:clrMapOvr>
+    <a:masterClrMapping/>
+  </p:clrMapOvr>
+  <p:transition spd="slow">
+    <p:push/>
+  </p:transition>
+</p:sld>
+</file>
+
+<file path=ppt/slides/slide30.xml><?xml version="1.0" encoding="utf-8"?>
 <p:sld xmlns:a="http://schemas.openxmlformats.org/drawingml/2006/main" xmlns:r="http://schemas.openxmlformats.org/officeDocument/2006/relationships" xmlns:p="http://schemas.openxmlformats.org/presentationml/2006/main">
   <p:cSld>
     <p:spTree>
@@ -33761,128 +34189,6 @@
       </p:transition>
     </mc:Fallback>
   </mc:AlternateContent>
-</p:sld>
-</file>
-
-<file path=ppt/slides/slide3.xml><?xml version="1.0" encoding="utf-8"?>
-<p:sld xmlns:a="http://schemas.openxmlformats.org/drawingml/2006/main" xmlns:r="http://schemas.openxmlformats.org/officeDocument/2006/relationships" xmlns:p="http://schemas.openxmlformats.org/presentationml/2006/main">
-  <p:cSld>
-    <p:spTree>
-      <p:nvGrpSpPr>
-        <p:cNvPr id="1" name=""/>
-        <p:cNvGrpSpPr/>
-        <p:nvPr/>
-      </p:nvGrpSpPr>
-      <p:grpSpPr>
-        <a:xfrm>
-          <a:off x="0" y="0"/>
-          <a:ext cx="0" cy="0"/>
-          <a:chOff x="0" y="0"/>
-          <a:chExt cx="0" cy="0"/>
-        </a:xfrm>
-      </p:grpSpPr>
-      <p:sp>
-        <p:nvSpPr>
-          <p:cNvPr id="7" name="Title 6"/>
-          <p:cNvSpPr>
-            <a:spLocks noGrp="1"/>
-          </p:cNvSpPr>
-          <p:nvPr>
-            <p:ph type="title"/>
-          </p:nvPr>
-        </p:nvSpPr>
-        <p:spPr/>
-        <p:txBody>
-          <a:bodyPr/>
-          <a:lstStyle/>
-          <a:p>
-            <a:r>
-              <a:rPr lang="en-US" dirty="0"/>
-              <a:t>Questions for this Session</a:t>
-            </a:r>
-          </a:p>
-        </p:txBody>
-      </p:sp>
-      <p:sp>
-        <p:nvSpPr>
-          <p:cNvPr id="8" name="Content Placeholder 7"/>
-          <p:cNvSpPr>
-            <a:spLocks noGrp="1"/>
-          </p:cNvSpPr>
-          <p:nvPr>
-            <p:ph sz="quarter" idx="12"/>
-          </p:nvPr>
-        </p:nvSpPr>
-        <p:spPr/>
-        <p:txBody>
-          <a:bodyPr/>
-          <a:lstStyle/>
-          <a:p>
-            <a:r>
-              <a:rPr lang="en-US" dirty="0"/>
-              <a:t>Options, options, options</a:t>
-            </a:r>
-          </a:p>
-          <a:p>
-            <a:pPr lvl="1"/>
-            <a:r>
-              <a:rPr lang="en-US" dirty="0"/>
-              <a:t>When to use what?</a:t>
-            </a:r>
-          </a:p>
-          <a:p>
-            <a:r>
-              <a:rPr lang="en-US" dirty="0"/>
-              <a:t>Demos, demos, demos</a:t>
-            </a:r>
-          </a:p>
-          <a:p>
-            <a:pPr lvl="1"/>
-            <a:r>
-              <a:rPr lang="en-US" dirty="0"/>
-              <a:t>See things in action</a:t>
-            </a:r>
-          </a:p>
-          <a:p>
-            <a:r>
-              <a:rPr lang="en-US" dirty="0"/>
-              <a:t>Overview, not a deep-dive</a:t>
-            </a:r>
-          </a:p>
-        </p:txBody>
-      </p:sp>
-      <p:sp>
-        <p:nvSpPr>
-          <p:cNvPr id="9" name="Text Placeholder 8"/>
-          <p:cNvSpPr>
-            <a:spLocks noGrp="1"/>
-          </p:cNvSpPr>
-          <p:nvPr>
-            <p:ph type="body" sz="quarter" idx="23"/>
-          </p:nvPr>
-        </p:nvSpPr>
-        <p:spPr/>
-        <p:txBody>
-          <a:bodyPr/>
-          <a:lstStyle/>
-          <a:p>
-            <a:endParaRPr lang="en-US" dirty="0"/>
-          </a:p>
-        </p:txBody>
-      </p:sp>
-    </p:spTree>
-    <p:extLst>
-      <p:ext uri="{BB962C8B-B14F-4D97-AF65-F5344CB8AC3E}">
-        <p14:creationId xmlns:p14="http://schemas.microsoft.com/office/powerpoint/2010/main" val="872711031"/>
-      </p:ext>
-    </p:extLst>
-  </p:cSld>
-  <p:clrMapOvr>
-    <a:masterClrMapping/>
-  </p:clrMapOvr>
-  <p:transition spd="slow">
-    <p:push/>
-  </p:transition>
 </p:sld>
 </file>
 
@@ -34898,93 +35204,116 @@
             </a:r>
             <a:r>
               <a:rPr lang="en-US" dirty="0"/>
-              <a:t>)</a:t>
-            </a:r>
-          </a:p>
-          <a:p>
-            <a:r>
-              <a:rPr lang="en-US" dirty="0"/>
-              <a:t>Containers on Azure</a:t>
-            </a:r>
-          </a:p>
-          <a:p>
-            <a:pPr lvl="1"/>
-            <a:r>
-              <a:rPr lang="en-US" dirty="0"/>
-              <a:t>Templates (e.g. </a:t>
+              <a:t>, </a:t>
             </a:r>
             <a:r>
               <a:rPr lang="en-US" dirty="0">
                 <a:hlinkClick r:id="rId7"/>
               </a:rPr>
-              <a:t>Docker on </a:t>
-            </a:r>
-            <a:r>
-              <a:rPr lang="en-US" dirty="0" err="1">
-                <a:hlinkClick r:id="rId7"/>
-              </a:rPr>
-              <a:t>Unbuntu</a:t>
+              <a:t>SQL Server on Linux</a:t>
             </a:r>
             <a:r>
               <a:rPr lang="en-US" dirty="0"/>
-              <a:t>) and drivers from Microsoft (details later)</a:t>
+              <a:t>, etc.)</a:t>
+            </a:r>
+          </a:p>
+          <a:p>
+            <a:r>
+              <a:rPr lang="en-US" dirty="0"/>
+              <a:t>Containers on Azure</a:t>
             </a:r>
           </a:p>
           <a:p>
             <a:pPr lvl="1"/>
+            <a:r>
+              <a:rPr lang="en-US" dirty="0"/>
+              <a:t>Templates (e.g. </a:t>
+            </a:r>
             <a:r>
               <a:rPr lang="en-US" dirty="0">
                 <a:hlinkClick r:id="rId8"/>
               </a:rPr>
-              <a:t>Docker Machine</a:t>
+              <a:t>Docker on </a:t>
+            </a:r>
+            <a:r>
+              <a:rPr lang="en-US" dirty="0" err="1">
+                <a:hlinkClick r:id="rId8"/>
+              </a:rPr>
+              <a:t>Unbuntu</a:t>
             </a:r>
             <a:r>
               <a:rPr lang="en-US" dirty="0"/>
-              <a:t> with </a:t>
-            </a:r>
+              <a:t>) and drivers from Microsoft (details later)</a:t>
+            </a:r>
+          </a:p>
+          <a:p>
+            <a:pPr lvl="1"/>
             <a:r>
               <a:rPr lang="en-US" dirty="0">
                 <a:hlinkClick r:id="rId9"/>
               </a:rPr>
-              <a:t>Azure driver</a:t>
-            </a:r>
-            <a:endParaRPr lang="en-US" dirty="0"/>
-          </a:p>
-          <a:p>
-            <a:pPr lvl="1"/>
+              <a:t>Docker Machine</a:t>
+            </a:r>
             <a:r>
               <a:rPr lang="en-US" dirty="0"/>
-              <a:t>Run clusters (DC/OS, Docker Swarm, Kubernetes) with </a:t>
+              <a:t> with </a:t>
             </a:r>
             <a:r>
               <a:rPr lang="en-US" dirty="0">
                 <a:hlinkClick r:id="rId10"/>
               </a:rPr>
-              <a:t>Azure Container Service</a:t>
+              <a:t>Azure driver</a:t>
             </a:r>
             <a:endParaRPr lang="en-US" dirty="0"/>
           </a:p>
           <a:p>
+            <a:pPr lvl="1"/>
             <a:r>
               <a:rPr lang="en-US" dirty="0"/>
-              <a:t>Visual Studio Support</a:t>
-            </a:r>
-          </a:p>
-          <a:p>
-            <a:pPr lvl="1"/>
+              <a:t>Run clusters (DC/OS, Docker Swarm, Kubernetes) with </a:t>
+            </a:r>
             <a:r>
               <a:rPr lang="en-US" dirty="0">
                 <a:hlinkClick r:id="rId11"/>
               </a:rPr>
-              <a:t>Visual Studio Tools for Docker</a:t>
+              <a:t>Azure Container Service</a:t>
             </a:r>
             <a:endParaRPr lang="en-US" dirty="0"/>
+          </a:p>
+          <a:p>
+            <a:r>
+              <a:rPr lang="en-US" dirty="0"/>
+              <a:t>Visual Studio Support</a:t>
+            </a:r>
           </a:p>
           <a:p>
             <a:pPr lvl="1"/>
             <a:r>
               <a:rPr lang="en-US" dirty="0">
                 <a:hlinkClick r:id="rId12"/>
+              </a:rPr>
+              <a:t>Visual Studio Tools for Docker</a:t>
+            </a:r>
+            <a:r>
+              <a:rPr lang="en-US" dirty="0"/>
+              <a:t> (</a:t>
+            </a:r>
+            <a:r>
+              <a:rPr lang="en-US" dirty="0">
+                <a:hlinkClick r:id="rId13"/>
+              </a:rPr>
+              <a:t>VS2017</a:t>
+            </a:r>
+            <a:r>
+              <a:rPr lang="en-US" dirty="0"/>
+              <a:t>)</a:t>
+            </a:r>
+          </a:p>
+          <a:p>
+            <a:pPr lvl="1"/>
+            <a:r>
+              <a:rPr lang="en-US" dirty="0">
+                <a:hlinkClick r:id="rId14"/>
               </a:rPr>
               <a:t>VSTS Docker Extension</a:t>
             </a:r>
@@ -35136,7 +35465,7 @@
               <a:rPr lang="en-US" dirty="0">
                 <a:hlinkClick r:id="rId2"/>
               </a:rPr>
-              <a:t>MSDN</a:t>
+              <a:t>docs</a:t>
             </a:r>
             <a:endParaRPr lang="en-US" dirty="0"/>
           </a:p>

</xml_diff>